<commit_message>
Aggiustata la grafica delle slides
</commit_message>
<xml_diff>
--- a/IDENTICAZIONE SISTEMA DI CARICHE PUNTIFORMI DA MISURE DI.pptx
+++ b/IDENTICAZIONE SISTEMA DI CARICHE PUNTIFORMI DA MISURE DI.pptx
@@ -211,7 +211,7 @@
           <a:p>
             <a:fld id="{0B626E60-15AC-294D-A4F1-F70323F0F9DF}" type="datetimeFigureOut">
               <a:rPr lang="en-US" smtClean="0"/>
-              <a:t>12/4/2017</a:t>
+              <a:t>12/4/17</a:t>
             </a:fld>
             <a:endParaRPr lang="en-US"/>
           </a:p>
@@ -370,7 +370,7 @@
           <a:p>
             <a:fld id="{B84B1DCE-DD70-5840-A766-ADE0E79E6240}" type="slidenum">
               <a:rPr lang="en-US" smtClean="0"/>
-              <a:t>‹N›</a:t>
+              <a:t>‹#›</a:t>
             </a:fld>
             <a:endParaRPr lang="en-US"/>
           </a:p>
@@ -1140,7 +1140,7 @@
           <a:p>
             <a:fld id="{D400A843-E78D-45FE-BBE0-0DFBB922583B}" type="datetimeFigureOut">
               <a:rPr lang="it-IT" smtClean="0"/>
-              <a:t>04/12/2017</a:t>
+              <a:t>04/12/17</a:t>
             </a:fld>
             <a:endParaRPr lang="it-IT"/>
           </a:p>
@@ -1182,7 +1182,7 @@
           <a:p>
             <a:fld id="{1B29E90A-79A6-4357-BA0E-73A707E87A6D}" type="slidenum">
               <a:rPr lang="it-IT" smtClean="0"/>
-              <a:t>‹N›</a:t>
+              <a:t>‹#›</a:t>
             </a:fld>
             <a:endParaRPr lang="it-IT"/>
           </a:p>
@@ -1343,7 +1343,7 @@
           <a:p>
             <a:fld id="{D400A843-E78D-45FE-BBE0-0DFBB922583B}" type="datetimeFigureOut">
               <a:rPr lang="it-IT" smtClean="0"/>
-              <a:t>04/12/2017</a:t>
+              <a:t>04/12/17</a:t>
             </a:fld>
             <a:endParaRPr lang="it-IT"/>
           </a:p>
@@ -1385,7 +1385,7 @@
           <a:p>
             <a:fld id="{1B29E90A-79A6-4357-BA0E-73A707E87A6D}" type="slidenum">
               <a:rPr lang="it-IT" smtClean="0"/>
-              <a:t>‹N›</a:t>
+              <a:t>‹#›</a:t>
             </a:fld>
             <a:endParaRPr lang="it-IT"/>
           </a:p>
@@ -1594,7 +1594,7 @@
           <a:p>
             <a:fld id="{D400A843-E78D-45FE-BBE0-0DFBB922583B}" type="datetimeFigureOut">
               <a:rPr lang="it-IT" smtClean="0"/>
-              <a:t>04/12/2017</a:t>
+              <a:t>04/12/17</a:t>
             </a:fld>
             <a:endParaRPr lang="it-IT"/>
           </a:p>
@@ -1636,7 +1636,7 @@
           <a:p>
             <a:fld id="{1B29E90A-79A6-4357-BA0E-73A707E87A6D}" type="slidenum">
               <a:rPr lang="it-IT" smtClean="0"/>
-              <a:t>‹N›</a:t>
+              <a:t>‹#›</a:t>
             </a:fld>
             <a:endParaRPr lang="it-IT"/>
           </a:p>
@@ -1763,7 +1763,7 @@
           <a:p>
             <a:fld id="{D400A843-E78D-45FE-BBE0-0DFBB922583B}" type="datetimeFigureOut">
               <a:rPr lang="it-IT" smtClean="0"/>
-              <a:t>04/12/2017</a:t>
+              <a:t>04/12/17</a:t>
             </a:fld>
             <a:endParaRPr lang="it-IT"/>
           </a:p>
@@ -1805,7 +1805,7 @@
           <a:p>
             <a:fld id="{1B29E90A-79A6-4357-BA0E-73A707E87A6D}" type="slidenum">
               <a:rPr lang="it-IT" smtClean="0"/>
-              <a:t>‹N›</a:t>
+              <a:t>‹#›</a:t>
             </a:fld>
             <a:endParaRPr lang="it-IT"/>
           </a:p>
@@ -2101,7 +2101,7 @@
           <a:p>
             <a:fld id="{D400A843-E78D-45FE-BBE0-0DFBB922583B}" type="datetimeFigureOut">
               <a:rPr lang="it-IT" smtClean="0"/>
-              <a:t>04/12/2017</a:t>
+              <a:t>04/12/17</a:t>
             </a:fld>
             <a:endParaRPr lang="it-IT"/>
           </a:p>
@@ -2143,7 +2143,7 @@
           <a:p>
             <a:fld id="{1B29E90A-79A6-4357-BA0E-73A707E87A6D}" type="slidenum">
               <a:rPr lang="it-IT" smtClean="0"/>
-              <a:t>‹N›</a:t>
+              <a:t>‹#›</a:t>
             </a:fld>
             <a:endParaRPr lang="it-IT"/>
           </a:p>
@@ -2371,7 +2371,7 @@
           <a:p>
             <a:fld id="{D400A843-E78D-45FE-BBE0-0DFBB922583B}" type="datetimeFigureOut">
               <a:rPr lang="it-IT" smtClean="0"/>
-              <a:t>04/12/2017</a:t>
+              <a:t>04/12/17</a:t>
             </a:fld>
             <a:endParaRPr lang="it-IT"/>
           </a:p>
@@ -2413,7 +2413,7 @@
           <a:p>
             <a:fld id="{1B29E90A-79A6-4357-BA0E-73A707E87A6D}" type="slidenum">
               <a:rPr lang="it-IT" smtClean="0"/>
-              <a:t>‹N›</a:t>
+              <a:t>‹#›</a:t>
             </a:fld>
             <a:endParaRPr lang="it-IT"/>
           </a:p>
@@ -2745,7 +2745,7 @@
           <a:p>
             <a:fld id="{D400A843-E78D-45FE-BBE0-0DFBB922583B}" type="datetimeFigureOut">
               <a:rPr lang="it-IT" smtClean="0"/>
-              <a:t>04/12/2017</a:t>
+              <a:t>04/12/17</a:t>
             </a:fld>
             <a:endParaRPr lang="it-IT"/>
           </a:p>
@@ -2787,7 +2787,7 @@
           <a:p>
             <a:fld id="{1B29E90A-79A6-4357-BA0E-73A707E87A6D}" type="slidenum">
               <a:rPr lang="it-IT" smtClean="0"/>
-              <a:t>‹N›</a:t>
+              <a:t>‹#›</a:t>
             </a:fld>
             <a:endParaRPr lang="it-IT"/>
           </a:p>
@@ -2858,7 +2858,7 @@
           <a:p>
             <a:fld id="{D400A843-E78D-45FE-BBE0-0DFBB922583B}" type="datetimeFigureOut">
               <a:rPr lang="it-IT" smtClean="0"/>
-              <a:t>04/12/2017</a:t>
+              <a:t>04/12/17</a:t>
             </a:fld>
             <a:endParaRPr lang="it-IT"/>
           </a:p>
@@ -2900,7 +2900,7 @@
           <a:p>
             <a:fld id="{1B29E90A-79A6-4357-BA0E-73A707E87A6D}" type="slidenum">
               <a:rPr lang="it-IT" smtClean="0"/>
-              <a:t>‹N›</a:t>
+              <a:t>‹#›</a:t>
             </a:fld>
             <a:endParaRPr lang="it-IT"/>
           </a:p>
@@ -3024,7 +3024,7 @@
           <a:p>
             <a:fld id="{D400A843-E78D-45FE-BBE0-0DFBB922583B}" type="datetimeFigureOut">
               <a:rPr lang="it-IT" smtClean="0"/>
-              <a:t>04/12/2017</a:t>
+              <a:t>04/12/17</a:t>
             </a:fld>
             <a:endParaRPr lang="it-IT"/>
           </a:p>
@@ -3074,7 +3074,7 @@
           <a:p>
             <a:fld id="{1B29E90A-79A6-4357-BA0E-73A707E87A6D}" type="slidenum">
               <a:rPr lang="it-IT" smtClean="0"/>
-              <a:t>‹N›</a:t>
+              <a:t>‹#›</a:t>
             </a:fld>
             <a:endParaRPr lang="it-IT"/>
           </a:p>
@@ -3373,7 +3373,7 @@
           <a:p>
             <a:fld id="{D400A843-E78D-45FE-BBE0-0DFBB922583B}" type="datetimeFigureOut">
               <a:rPr lang="it-IT" smtClean="0"/>
-              <a:t>04/12/2017</a:t>
+              <a:t>04/12/17</a:t>
             </a:fld>
             <a:endParaRPr lang="it-IT"/>
           </a:p>
@@ -3436,7 +3436,7 @@
           <a:p>
             <a:fld id="{1B29E90A-79A6-4357-BA0E-73A707E87A6D}" type="slidenum">
               <a:rPr lang="it-IT" smtClean="0"/>
-              <a:t>‹N›</a:t>
+              <a:t>‹#›</a:t>
             </a:fld>
             <a:endParaRPr lang="it-IT"/>
           </a:p>
@@ -3747,7 +3747,7 @@
           <a:p>
             <a:fld id="{D400A843-E78D-45FE-BBE0-0DFBB922583B}" type="datetimeFigureOut">
               <a:rPr lang="it-IT" smtClean="0"/>
-              <a:t>04/12/2017</a:t>
+              <a:t>04/12/17</a:t>
             </a:fld>
             <a:endParaRPr lang="it-IT"/>
           </a:p>
@@ -3789,7 +3789,7 @@
           <a:p>
             <a:fld id="{1B29E90A-79A6-4357-BA0E-73A707E87A6D}" type="slidenum">
               <a:rPr lang="it-IT" smtClean="0"/>
-              <a:t>‹N›</a:t>
+              <a:t>‹#›</a:t>
             </a:fld>
             <a:endParaRPr lang="it-IT"/>
           </a:p>
@@ -4029,7 +4029,7 @@
           <a:p>
             <a:fld id="{D400A843-E78D-45FE-BBE0-0DFBB922583B}" type="datetimeFigureOut">
               <a:rPr lang="it-IT" smtClean="0"/>
-              <a:t>04/12/2017</a:t>
+              <a:t>04/12/17</a:t>
             </a:fld>
             <a:endParaRPr lang="it-IT"/>
           </a:p>
@@ -4103,7 +4103,7 @@
           <a:p>
             <a:fld id="{1B29E90A-79A6-4357-BA0E-73A707E87A6D}" type="slidenum">
               <a:rPr lang="it-IT" smtClean="0"/>
-              <a:t>‹N›</a:t>
+              <a:t>‹#›</a:t>
             </a:fld>
             <a:endParaRPr lang="it-IT"/>
           </a:p>
@@ -4828,7 +4828,7 @@
                         <m:fPr>
                           <m:ctrlPr>
                             <a:rPr lang="mr-IN" i="1" smtClean="0">
-                              <a:latin typeface="Cambria Math" panose="02040503050406030204" pitchFamily="18" charset="0"/>
+                              <a:latin typeface="Cambria Math" charset="0"/>
                             </a:rPr>
                           </m:ctrlPr>
                         </m:fPr>
@@ -4838,7 +4838,7 @@
                               <m:degHide m:val="on"/>
                               <m:ctrlPr>
                                 <a:rPr lang="mr-IN" i="1" smtClean="0">
-                                  <a:latin typeface="Cambria Math" panose="02040503050406030204" pitchFamily="18" charset="0"/>
+                                  <a:latin typeface="Cambria Math" charset="0"/>
                                 </a:rPr>
                               </m:ctrlPr>
                             </m:radPr>
@@ -5273,12 +5273,12 @@
         <p:spPr>
           <a:xfrm>
             <a:off x="1097280" y="1988896"/>
-            <a:ext cx="10058400" cy="950232"/>
+            <a:ext cx="10058400" cy="1359946"/>
           </a:xfrm>
         </p:spPr>
         <p:txBody>
           <a:bodyPr>
-            <a:normAutofit fontScale="92500" lnSpcReduction="20000"/>
+            <a:normAutofit/>
           </a:bodyPr>
           <a:lstStyle/>
           <a:p>
@@ -5288,21 +5288,8 @@
                   <a:schemeClr val="tx1"/>
                 </a:solidFill>
               </a:rPr>
-              <a:t>Il primo problema è stato risolto utilizzando le penalità, il valore della funzione viene penalizzato e dunque aumentato drasticamente per i vertici del politopo che ricadono fuori dal vincolo in modo tale da forzare l’algoritmo alla prossima iterazione a ribaltare il politopo all’interno della regione dei </a:t>
-            </a:r>
-            <a:r>
-              <a:rPr lang="it-IT" smtClean="0">
-                <a:solidFill>
-                  <a:schemeClr val="tx1"/>
-                </a:solidFill>
-              </a:rPr>
-              <a:t>punti ammissibili.</a:t>
-            </a:r>
-            <a:endParaRPr lang="it-IT" dirty="0" smtClean="0">
-              <a:solidFill>
-                <a:schemeClr val="tx1"/>
-              </a:solidFill>
-            </a:endParaRPr>
+              <a:t>Il primo problema è stato risolto utilizzando le penalità, il valore della funzione viene penalizzato e dunque aumentato drasticamente per i vertici del politopo che ricadono fuori dal vincolo in modo tale da forzare l’algoritmo alla prossima iterazione a ribaltare il politopo all’interno della regione dei punti ammissibili.</a:t>
+            </a:r>
           </a:p>
         </p:txBody>
       </p:sp>
@@ -5314,8 +5301,8 @@
         </p:nvSpPr>
         <p:spPr>
           <a:xfrm>
-            <a:off x="1097279" y="3502509"/>
-            <a:ext cx="10058401" cy="707886"/>
+            <a:off x="1097280" y="3930020"/>
+            <a:ext cx="7001692" cy="707886"/>
           </a:xfrm>
           <a:prstGeom prst="rect">
             <a:avLst/>
@@ -5374,7 +5361,7 @@
         </p:blipFill>
         <p:spPr>
           <a:xfrm>
-            <a:off x="8001000" y="2864122"/>
+            <a:off x="8001000" y="2887872"/>
             <a:ext cx="3907972" cy="3293366"/>
           </a:xfrm>
           <a:prstGeom prst="rect">
@@ -5444,56 +5431,14 @@
       </p:sp>
       <p:sp>
         <p:nvSpPr>
-          <p:cNvPr id="3" name="Segnaposto contenuto 2"/>
-          <p:cNvSpPr>
-            <a:spLocks noGrp="1"/>
-          </p:cNvSpPr>
-          <p:nvPr>
-            <p:ph idx="1"/>
-          </p:nvPr>
-        </p:nvSpPr>
-        <p:spPr>
-          <a:xfrm>
-            <a:off x="1097280" y="1988896"/>
-            <a:ext cx="10058400" cy="950232"/>
-          </a:xfrm>
-        </p:spPr>
-        <p:txBody>
-          <a:bodyPr>
-            <a:normAutofit/>
-          </a:bodyPr>
-          <a:lstStyle/>
-          <a:p>
-            <a:r>
-              <a:rPr lang="it-IT" dirty="0"/>
-              <a:t>Simplex(@</a:t>
-            </a:r>
-            <a:r>
-              <a:rPr lang="it-IT" dirty="0" err="1"/>
-              <a:t>cost_function</a:t>
-            </a:r>
-            <a:r>
-              <a:rPr lang="it-IT" dirty="0"/>
-              <a:t>, { }, [-.2 .5 .3], .3, </a:t>
-            </a:r>
-            <a:r>
-              <a:rPr lang="it-IT" dirty="0" smtClean="0"/>
-              <a:t>1e-5, 500);</a:t>
-            </a:r>
-            <a:endParaRPr lang="it-IT" dirty="0"/>
-          </a:p>
-        </p:txBody>
-      </p:sp>
-      <p:sp>
-        <p:nvSpPr>
           <p:cNvPr id="4" name="Rectangle 3"/>
           <p:cNvSpPr/>
           <p:nvPr/>
         </p:nvSpPr>
         <p:spPr>
           <a:xfrm>
-            <a:off x="1097280" y="2464012"/>
-            <a:ext cx="5199018" cy="1754326"/>
+            <a:off x="1156527" y="2717948"/>
+            <a:ext cx="5199018" cy="1938992"/>
           </a:xfrm>
           <a:prstGeom prst="rect">
             <a:avLst/>
@@ -5510,7 +5455,7 @@
               <a:buChar char="•"/>
             </a:pPr>
             <a:r>
-              <a:rPr lang="it-IT" dirty="0"/>
+              <a:rPr lang="it-IT" sz="2000" dirty="0"/>
               <a:t>Valore nell’ultimo vertice = 1.6150e-06</a:t>
             </a:r>
           </a:p>
@@ -5520,7 +5465,7 @@
               <a:buChar char="•"/>
             </a:pPr>
             <a:r>
-              <a:rPr lang="it-IT" dirty="0"/>
+              <a:rPr lang="it-IT" sz="2000" dirty="0"/>
               <a:t>risultato =  -0.2799    0.3995    0.4000</a:t>
             </a:r>
           </a:p>
@@ -5530,7 +5475,7 @@
               <a:buChar char="•"/>
             </a:pPr>
             <a:r>
-              <a:rPr lang="it-IT" dirty="0"/>
+              <a:rPr lang="it-IT" sz="2000" dirty="0"/>
               <a:t>iterazioni = 500</a:t>
             </a:r>
           </a:p>
@@ -5540,7 +5485,7 @@
               <a:buChar char="•"/>
             </a:pPr>
             <a:r>
-              <a:rPr lang="it-IT" dirty="0"/>
+              <a:rPr lang="it-IT" sz="2000" dirty="0"/>
               <a:t>dimezzamenti = 13</a:t>
             </a:r>
           </a:p>
@@ -5550,7 +5495,7 @@
               <a:buChar char="•"/>
             </a:pPr>
             <a:r>
-              <a:rPr lang="it-IT" dirty="0"/>
+              <a:rPr lang="it-IT" sz="2000" dirty="0"/>
               <a:t>superficie finale = 7.7591e-04</a:t>
             </a:r>
           </a:p>
@@ -5560,7 +5505,7 @@
               <a:buChar char="•"/>
             </a:pPr>
             <a:r>
-              <a:rPr lang="it-IT" dirty="0"/>
+              <a:rPr lang="it-IT" sz="2000" dirty="0"/>
               <a:t>errore = 0.0201    0.0005    0.0000</a:t>
             </a:r>
           </a:p>
@@ -5572,16 +5517,21 @@
           <p:cNvPicPr/>
           <p:nvPr/>
         </p:nvPicPr>
-        <p:blipFill>
-          <a:blip r:embed="rId2"/>
-          <a:stretch>
-            <a:fillRect/>
-          </a:stretch>
+        <p:blipFill rotWithShape="1">
+          <a:blip r:embed="rId2">
+            <a:extLst>
+              <a:ext uri="{28A0092B-C50C-407E-A947-70E740481C1C}">
+                <a14:useLocalDpi xmlns:a14="http://schemas.microsoft.com/office/drawing/2010/main" val="0"/>
+              </a:ext>
+            </a:extLst>
+          </a:blip>
+          <a:srcRect l="19652" t="5769" r="17563" b="4000"/>
+          <a:stretch/>
         </p:blipFill>
         <p:spPr>
           <a:xfrm>
-            <a:off x="8116037" y="330389"/>
-            <a:ext cx="3552632" cy="3317013"/>
+            <a:off x="5420686" y="3315723"/>
+            <a:ext cx="2928136" cy="2706444"/>
           </a:xfrm>
           <a:prstGeom prst="rect">
             <a:avLst/>
@@ -5596,22 +5546,107 @@
           </p:cNvPicPr>
           <p:nvPr/>
         </p:nvPicPr>
-        <p:blipFill>
-          <a:blip r:embed="rId3"/>
-          <a:stretch>
-            <a:fillRect/>
-          </a:stretch>
+        <p:blipFill rotWithShape="1">
+          <a:blip r:embed="rId3">
+            <a:extLst>
+              <a:ext uri="{28A0092B-C50C-407E-A947-70E740481C1C}">
+                <a14:useLocalDpi xmlns:a14="http://schemas.microsoft.com/office/drawing/2010/main" val="0"/>
+              </a:ext>
+            </a:extLst>
+          </a:blip>
+          <a:srcRect l="17031" t="10633" r="14866" b="3846"/>
+          <a:stretch/>
         </p:blipFill>
         <p:spPr>
           <a:xfrm>
-            <a:off x="5780723" y="3414244"/>
-            <a:ext cx="3454717" cy="2906085"/>
+            <a:off x="8479326" y="3315723"/>
+            <a:ext cx="3712674" cy="2772347"/>
           </a:xfrm>
           <a:prstGeom prst="rect">
             <a:avLst/>
           </a:prstGeom>
         </p:spPr>
       </p:pic>
+      <p:sp>
+        <p:nvSpPr>
+          <p:cNvPr id="8" name="Rectangle 7"/>
+          <p:cNvSpPr/>
+          <p:nvPr/>
+        </p:nvSpPr>
+        <p:spPr>
+          <a:xfrm>
+            <a:off x="1156527" y="1916020"/>
+            <a:ext cx="9261469" cy="400110"/>
+          </a:xfrm>
+          <a:prstGeom prst="rect">
+            <a:avLst/>
+          </a:prstGeom>
+        </p:spPr>
+        <p:txBody>
+          <a:bodyPr wrap="square">
+            <a:spAutoFit/>
+          </a:bodyPr>
+          <a:lstStyle/>
+          <a:p>
+            <a:r>
+              <a:rPr lang="en-US" sz="2000" dirty="0">
+                <a:latin typeface="Courier" charset="0"/>
+              </a:rPr>
+              <a:t>Simplex(@</a:t>
+            </a:r>
+            <a:r>
+              <a:rPr lang="en-US" sz="2000" dirty="0" err="1">
+                <a:latin typeface="Courier" charset="0"/>
+              </a:rPr>
+              <a:t>cost_function</a:t>
+            </a:r>
+            <a:r>
+              <a:rPr lang="en-US" sz="2000" dirty="0">
+                <a:latin typeface="Courier" charset="0"/>
+              </a:rPr>
+              <a:t>, { }, [-.2 .5 .3], .3, 1e-5, 500);</a:t>
+            </a:r>
+            <a:endParaRPr lang="en-US" sz="2000" dirty="0">
+              <a:effectLst/>
+              <a:latin typeface="Courier" charset="0"/>
+            </a:endParaRPr>
+          </a:p>
+        </p:txBody>
+      </p:sp>
+      <p:sp>
+        <p:nvSpPr>
+          <p:cNvPr id="11" name="TextBox 10"/>
+          <p:cNvSpPr txBox="1"/>
+          <p:nvPr/>
+        </p:nvSpPr>
+        <p:spPr>
+          <a:xfrm>
+            <a:off x="1156527" y="2348616"/>
+            <a:ext cx="1097801" cy="400110"/>
+          </a:xfrm>
+          <a:prstGeom prst="rect">
+            <a:avLst/>
+          </a:prstGeom>
+          <a:noFill/>
+        </p:spPr>
+        <p:txBody>
+          <a:bodyPr wrap="none" rtlCol="0">
+            <a:spAutoFit/>
+          </a:bodyPr>
+          <a:lstStyle/>
+          <a:p>
+            <a:r>
+              <a:rPr lang="en-US" sz="2000" dirty="0" err="1" smtClean="0"/>
+              <a:t>Risultati</a:t>
+            </a:r>
+            <a:r>
+              <a:rPr lang="en-US" sz="2000" dirty="0" smtClean="0"/>
+              <a:t>:</a:t>
+            </a:r>
+            <a:endParaRPr lang="en-US" sz="2000" dirty="0"/>
+          </a:p>
+        </p:txBody>
+      </p:sp>
     </p:spTree>
     <p:extLst>
       <p:ext uri="{BB962C8B-B14F-4D97-AF65-F5344CB8AC3E}">
@@ -5674,48 +5709,6 @@
       </p:sp>
       <p:sp>
         <p:nvSpPr>
-          <p:cNvPr id="3" name="Segnaposto contenuto 2"/>
-          <p:cNvSpPr>
-            <a:spLocks noGrp="1"/>
-          </p:cNvSpPr>
-          <p:nvPr>
-            <p:ph idx="1"/>
-          </p:nvPr>
-        </p:nvSpPr>
-        <p:spPr>
-          <a:xfrm>
-            <a:off x="1097280" y="1988896"/>
-            <a:ext cx="10058400" cy="950232"/>
-          </a:xfrm>
-        </p:spPr>
-        <p:txBody>
-          <a:bodyPr>
-            <a:normAutofit/>
-          </a:bodyPr>
-          <a:lstStyle/>
-          <a:p>
-            <a:r>
-              <a:rPr lang="it-IT" dirty="0"/>
-              <a:t>Simplex(@</a:t>
-            </a:r>
-            <a:r>
-              <a:rPr lang="it-IT" dirty="0" err="1"/>
-              <a:t>cost_function</a:t>
-            </a:r>
-            <a:r>
-              <a:rPr lang="it-IT" dirty="0"/>
-              <a:t>, { }, [-.2 .5 .3], .3, </a:t>
-            </a:r>
-            <a:r>
-              <a:rPr lang="it-IT" dirty="0" smtClean="0"/>
-              <a:t>1e-5, 500);</a:t>
-            </a:r>
-            <a:endParaRPr lang="it-IT" dirty="0"/>
-          </a:p>
-        </p:txBody>
-      </p:sp>
-      <p:sp>
-        <p:nvSpPr>
           <p:cNvPr id="4" name="Rectangle 3"/>
           <p:cNvSpPr/>
           <p:nvPr/>
@@ -5723,7 +5716,7 @@
         <p:spPr>
           <a:xfrm>
             <a:off x="1097280" y="3872872"/>
-            <a:ext cx="5199018" cy="1754326"/>
+            <a:ext cx="5199018" cy="1938992"/>
           </a:xfrm>
           <a:prstGeom prst="rect">
             <a:avLst/>
@@ -5740,7 +5733,7 @@
               <a:buChar char="•"/>
             </a:pPr>
             <a:r>
-              <a:rPr lang="it-IT" dirty="0"/>
+              <a:rPr lang="it-IT" sz="2000" dirty="0"/>
               <a:t>Valore nell’ultimo vertice = 0.0012</a:t>
             </a:r>
           </a:p>
@@ -5750,7 +5743,7 @@
               <a:buChar char="•"/>
             </a:pPr>
             <a:r>
-              <a:rPr lang="it-IT" dirty="0"/>
+              <a:rPr lang="it-IT" sz="2000" dirty="0"/>
               <a:t>risultato =   -0.2946    0.4021    0.3999</a:t>
             </a:r>
           </a:p>
@@ -5760,7 +5753,7 @@
               <a:buChar char="•"/>
             </a:pPr>
             <a:r>
-              <a:rPr lang="it-IT" dirty="0"/>
+              <a:rPr lang="it-IT" sz="2000" dirty="0"/>
               <a:t>iterazioni = 500</a:t>
             </a:r>
           </a:p>
@@ -5770,7 +5763,7 @@
               <a:buChar char="•"/>
             </a:pPr>
             <a:r>
-              <a:rPr lang="it-IT" dirty="0"/>
+              <a:rPr lang="it-IT" sz="2000" dirty="0"/>
               <a:t>dimezzamenti = 13</a:t>
             </a:r>
           </a:p>
@@ -5780,7 +5773,7 @@
               <a:buChar char="•"/>
             </a:pPr>
             <a:r>
-              <a:rPr lang="it-IT" dirty="0"/>
+              <a:rPr lang="it-IT" sz="2000" dirty="0"/>
               <a:t>superficie finale = 7.5929e-04</a:t>
             </a:r>
           </a:p>
@@ -5790,7 +5783,7 @@
               <a:buChar char="•"/>
             </a:pPr>
             <a:r>
-              <a:rPr lang="it-IT" dirty="0"/>
+              <a:rPr lang="it-IT" sz="2000" dirty="0"/>
               <a:t>errore = 0.0054    0.0021    0.0001</a:t>
             </a:r>
           </a:p>
@@ -5808,8 +5801,8 @@
             </p:nvSpPr>
             <p:spPr>
               <a:xfrm>
-                <a:off x="1097280" y="2671104"/>
-                <a:ext cx="10058400" cy="950232"/>
+                <a:off x="1156527" y="2494790"/>
+                <a:ext cx="5505530" cy="950232"/>
               </a:xfrm>
               <a:prstGeom prst="rect">
                 <a:avLst/>
@@ -6077,23 +6070,31 @@
                     <m:sSup>
                       <m:sSupPr>
                         <m:ctrlPr>
-                          <a:rPr lang="it-IT" i="1" smtClean="0"/>
+                          <a:rPr lang="it-IT" i="1" smtClean="0">
+                            <a:latin typeface="Cambria Math" charset="0"/>
+                          </a:rPr>
                         </m:ctrlPr>
                       </m:sSupPr>
                       <m:e>
                         <m:d>
                           <m:dPr>
                             <m:ctrlPr>
-                              <a:rPr lang="it-IT" i="1"/>
+                              <a:rPr lang="it-IT" i="1">
+                                <a:latin typeface="Cambria Math" charset="0"/>
+                              </a:rPr>
                             </m:ctrlPr>
                           </m:dPr>
                           <m:e>
                             <m:r>
-                              <a:rPr lang="it-IT" i="1"/>
+                              <a:rPr lang="it-IT" i="1">
+                                <a:latin typeface="Cambria Math" charset="0"/>
+                              </a:rPr>
                               <m:t>𝑥</m:t>
                             </m:r>
                             <m:r>
-                              <a:rPr lang="it-IT" i="1"/>
+                              <a:rPr lang="it-IT" i="1">
+                                <a:latin typeface="Cambria Math" charset="0"/>
+                              </a:rPr>
                               <m:t>+0.6</m:t>
                             </m:r>
                           </m:e>
@@ -6101,35 +6102,47 @@
                       </m:e>
                       <m:sup>
                         <m:r>
-                          <a:rPr lang="it-IT" i="1"/>
+                          <a:rPr lang="it-IT" i="1">
+                            <a:latin typeface="Cambria Math" charset="0"/>
+                          </a:rPr>
                           <m:t>2</m:t>
                         </m:r>
                       </m:sup>
                     </m:sSup>
                     <m:r>
-                      <a:rPr lang="it-IT" i="1"/>
+                      <a:rPr lang="it-IT" i="1">
+                        <a:latin typeface="Cambria Math" charset="0"/>
+                      </a:rPr>
                       <m:t>+</m:t>
                     </m:r>
                     <m:sSup>
                       <m:sSupPr>
                         <m:ctrlPr>
-                          <a:rPr lang="it-IT" i="1"/>
+                          <a:rPr lang="it-IT" i="1">
+                            <a:latin typeface="Cambria Math" charset="0"/>
+                          </a:rPr>
                         </m:ctrlPr>
                       </m:sSupPr>
                       <m:e>
                         <m:d>
                           <m:dPr>
                             <m:ctrlPr>
-                              <a:rPr lang="it-IT" i="1"/>
+                              <a:rPr lang="it-IT" i="1">
+                                <a:latin typeface="Cambria Math" charset="0"/>
+                              </a:rPr>
                             </m:ctrlPr>
                           </m:dPr>
                           <m:e>
                             <m:r>
-                              <a:rPr lang="it-IT" i="1"/>
+                              <a:rPr lang="it-IT" i="1">
+                                <a:latin typeface="Cambria Math" charset="0"/>
+                              </a:rPr>
                               <m:t>𝑦</m:t>
                             </m:r>
                             <m:r>
-                              <a:rPr lang="it-IT" i="1"/>
+                              <a:rPr lang="it-IT" i="1">
+                                <a:latin typeface="Cambria Math" charset="0"/>
+                              </a:rPr>
                               <m:t>−0.6</m:t>
                             </m:r>
                           </m:e>
@@ -6137,35 +6150,47 @@
                       </m:e>
                       <m:sup>
                         <m:r>
-                          <a:rPr lang="it-IT" i="1"/>
+                          <a:rPr lang="it-IT" i="1">
+                            <a:latin typeface="Cambria Math" charset="0"/>
+                          </a:rPr>
                           <m:t>2</m:t>
                         </m:r>
                       </m:sup>
                     </m:sSup>
                     <m:r>
-                      <a:rPr lang="it-IT" i="1"/>
+                      <a:rPr lang="it-IT" i="1">
+                        <a:latin typeface="Cambria Math" charset="0"/>
+                      </a:rPr>
                       <m:t>+</m:t>
                     </m:r>
                     <m:sSup>
                       <m:sSupPr>
                         <m:ctrlPr>
-                          <a:rPr lang="it-IT" i="1"/>
+                          <a:rPr lang="it-IT" i="1">
+                            <a:latin typeface="Cambria Math" charset="0"/>
+                          </a:rPr>
                         </m:ctrlPr>
                       </m:sSupPr>
                       <m:e>
                         <m:d>
                           <m:dPr>
                             <m:ctrlPr>
-                              <a:rPr lang="it-IT" i="1"/>
+                              <a:rPr lang="it-IT" i="1">
+                                <a:latin typeface="Cambria Math" charset="0"/>
+                              </a:rPr>
                             </m:ctrlPr>
                           </m:dPr>
                           <m:e>
                             <m:r>
-                              <a:rPr lang="it-IT" i="1"/>
+                              <a:rPr lang="it-IT" i="1">
+                                <a:latin typeface="Cambria Math" charset="0"/>
+                              </a:rPr>
                               <m:t>𝑧</m:t>
                             </m:r>
                             <m:r>
-                              <a:rPr lang="it-IT" i="1"/>
+                              <a:rPr lang="it-IT" i="1">
+                                <a:latin typeface="Cambria Math" charset="0"/>
+                              </a:rPr>
                               <m:t>−0.5</m:t>
                             </m:r>
                           </m:e>
@@ -6173,36 +6198,48 @@
                       </m:e>
                       <m:sup>
                         <m:r>
-                          <a:rPr lang="it-IT" i="1"/>
+                          <a:rPr lang="it-IT" i="1">
+                            <a:latin typeface="Cambria Math" charset="0"/>
+                          </a:rPr>
                           <m:t>2</m:t>
                         </m:r>
                       </m:sup>
                     </m:sSup>
                     <m:r>
-                      <a:rPr lang="it-IT" i="1"/>
+                      <a:rPr lang="it-IT" i="1">
+                        <a:latin typeface="Cambria Math" charset="0"/>
+                      </a:rPr>
                       <m:t>−</m:t>
                     </m:r>
                     <m:sSup>
                       <m:sSupPr>
                         <m:ctrlPr>
-                          <a:rPr lang="it-IT" i="1"/>
+                          <a:rPr lang="it-IT" i="1">
+                            <a:latin typeface="Cambria Math" charset="0"/>
+                          </a:rPr>
                         </m:ctrlPr>
                       </m:sSupPr>
                       <m:e>
                         <m:r>
-                          <a:rPr lang="it-IT" i="1"/>
+                          <a:rPr lang="it-IT" i="1">
+                            <a:latin typeface="Cambria Math" charset="0"/>
+                          </a:rPr>
                           <m:t>1.2</m:t>
                         </m:r>
                       </m:e>
                       <m:sup>
                         <m:r>
-                          <a:rPr lang="it-IT" i="1"/>
+                          <a:rPr lang="it-IT" i="1">
+                            <a:latin typeface="Cambria Math" charset="0"/>
+                          </a:rPr>
                           <m:t>2</m:t>
                         </m:r>
                       </m:sup>
                     </m:sSup>
                     <m:r>
-                      <a:rPr lang="it-IT" i="1"/>
+                      <a:rPr lang="it-IT" i="1">
+                        <a:latin typeface="Cambria Math" charset="0"/>
+                      </a:rPr>
                       <m:t>&lt;0 </m:t>
                     </m:r>
                   </m:oMath>
@@ -6223,16 +6260,16 @@
             </p:nvSpPr>
             <p:spPr>
               <a:xfrm>
-                <a:off x="1097280" y="2671104"/>
-                <a:ext cx="10058400" cy="950232"/>
+                <a:off x="1156527" y="2494790"/>
+                <a:ext cx="5505530" cy="950232"/>
               </a:xfrm>
               <a:prstGeom prst="rect">
                 <a:avLst/>
               </a:prstGeom>
-              <a:blipFill>
+              <a:blipFill rotWithShape="0">
                 <a:blip r:embed="rId2"/>
                 <a:stretch>
-                  <a:fillRect l="-606" t="-6410"/>
+                  <a:fillRect l="-1218" t="-6410" b="-39744"/>
                 </a:stretch>
               </a:blipFill>
             </p:spPr>
@@ -6241,7 +6278,7 @@
               <a:lstStyle/>
               <a:p>
                 <a:r>
-                  <a:rPr lang="it-IT">
+                  <a:rPr lang="en-US">
                     <a:noFill/>
                   </a:rPr>
                   <a:t> </a:t>
@@ -6258,21 +6295,107 @@
           <p:nvPr/>
         </p:nvPicPr>
         <p:blipFill>
-          <a:blip r:embed="rId3"/>
+          <a:blip r:embed="rId3">
+            <a:extLst>
+              <a:ext uri="{28A0092B-C50C-407E-A947-70E740481C1C}">
+                <a14:useLocalDpi xmlns:a14="http://schemas.microsoft.com/office/drawing/2010/main" val="0"/>
+              </a:ext>
+            </a:extLst>
+          </a:blip>
           <a:stretch>
             <a:fillRect/>
           </a:stretch>
         </p:blipFill>
         <p:spPr>
           <a:xfrm>
-            <a:off x="7169150" y="1737360"/>
-            <a:ext cx="5022850" cy="4549775"/>
+            <a:off x="6804561" y="2588822"/>
+            <a:ext cx="5078681" cy="3681350"/>
           </a:xfrm>
           <a:prstGeom prst="rect">
             <a:avLst/>
           </a:prstGeom>
         </p:spPr>
       </p:pic>
+      <p:sp>
+        <p:nvSpPr>
+          <p:cNvPr id="9" name="Rectangle 8"/>
+          <p:cNvSpPr/>
+          <p:nvPr/>
+        </p:nvSpPr>
+        <p:spPr>
+          <a:xfrm>
+            <a:off x="1156527" y="1916020"/>
+            <a:ext cx="9261469" cy="400110"/>
+          </a:xfrm>
+          <a:prstGeom prst="rect">
+            <a:avLst/>
+          </a:prstGeom>
+        </p:spPr>
+        <p:txBody>
+          <a:bodyPr wrap="square">
+            <a:spAutoFit/>
+          </a:bodyPr>
+          <a:lstStyle/>
+          <a:p>
+            <a:r>
+              <a:rPr lang="en-US" sz="2000" dirty="0">
+                <a:latin typeface="Courier" charset="0"/>
+              </a:rPr>
+              <a:t>Simplex(@</a:t>
+            </a:r>
+            <a:r>
+              <a:rPr lang="en-US" sz="2000" dirty="0" err="1">
+                <a:latin typeface="Courier" charset="0"/>
+              </a:rPr>
+              <a:t>cost_function</a:t>
+            </a:r>
+            <a:r>
+              <a:rPr lang="en-US" sz="2000" dirty="0">
+                <a:latin typeface="Courier" charset="0"/>
+              </a:rPr>
+              <a:t>, { }, [-.2 .5 .3], .3, 1e-5, 500);</a:t>
+            </a:r>
+            <a:endParaRPr lang="en-US" sz="2000" dirty="0">
+              <a:effectLst/>
+              <a:latin typeface="Courier" charset="0"/>
+            </a:endParaRPr>
+          </a:p>
+        </p:txBody>
+      </p:sp>
+      <p:sp>
+        <p:nvSpPr>
+          <p:cNvPr id="6" name="TextBox 5"/>
+          <p:cNvSpPr txBox="1"/>
+          <p:nvPr/>
+        </p:nvSpPr>
+        <p:spPr>
+          <a:xfrm>
+            <a:off x="1156527" y="3545722"/>
+            <a:ext cx="1097801" cy="400110"/>
+          </a:xfrm>
+          <a:prstGeom prst="rect">
+            <a:avLst/>
+          </a:prstGeom>
+          <a:noFill/>
+        </p:spPr>
+        <p:txBody>
+          <a:bodyPr wrap="none" rtlCol="0">
+            <a:spAutoFit/>
+          </a:bodyPr>
+          <a:lstStyle/>
+          <a:p>
+            <a:r>
+              <a:rPr lang="en-US" sz="2000" dirty="0" err="1" smtClean="0"/>
+              <a:t>Risultati</a:t>
+            </a:r>
+            <a:r>
+              <a:rPr lang="en-US" sz="2000" dirty="0" smtClean="0"/>
+              <a:t>:</a:t>
+            </a:r>
+            <a:endParaRPr lang="en-US" sz="2000" dirty="0"/>
+          </a:p>
+        </p:txBody>
+      </p:sp>
     </p:spTree>
     <p:extLst>
       <p:ext uri="{BB962C8B-B14F-4D97-AF65-F5344CB8AC3E}">
@@ -6335,63 +6458,14 @@
       </p:sp>
       <p:sp>
         <p:nvSpPr>
-          <p:cNvPr id="3" name="Segnaposto contenuto 2"/>
-          <p:cNvSpPr>
-            <a:spLocks noGrp="1"/>
-          </p:cNvSpPr>
-          <p:nvPr>
-            <p:ph idx="1"/>
-          </p:nvPr>
-        </p:nvSpPr>
-        <p:spPr>
-          <a:xfrm>
-            <a:off x="1097280" y="1988896"/>
-            <a:ext cx="10058400" cy="950232"/>
-          </a:xfrm>
-        </p:spPr>
-        <p:txBody>
-          <a:bodyPr>
-            <a:normAutofit/>
-          </a:bodyPr>
-          <a:lstStyle/>
-          <a:p>
-            <a:r>
-              <a:rPr lang="it-IT" dirty="0"/>
-              <a:t>Simplex(@</a:t>
-            </a:r>
-            <a:r>
-              <a:rPr lang="it-IT" dirty="0" err="1"/>
-              <a:t>cost_function</a:t>
-            </a:r>
-            <a:r>
-              <a:rPr lang="it-IT" dirty="0"/>
-              <a:t>, </a:t>
-            </a:r>
-            <a:r>
-              <a:rPr lang="it-IT" dirty="0"/>
-              <a:t>{</a:t>
-            </a:r>
-            <a:r>
-              <a:rPr lang="it-IT" dirty="0" smtClean="0"/>
-              <a:t>}, [-.3 .4 .4], .</a:t>
-            </a:r>
-            <a:r>
-              <a:rPr lang="it-IT" dirty="0"/>
-              <a:t>3, 1e-5, 500);</a:t>
-            </a:r>
-          </a:p>
-        </p:txBody>
-      </p:sp>
-      <p:sp>
-        <p:nvSpPr>
           <p:cNvPr id="4" name="Rectangle 3"/>
           <p:cNvSpPr/>
           <p:nvPr/>
         </p:nvSpPr>
         <p:spPr>
           <a:xfrm>
-            <a:off x="1097280" y="2858805"/>
-            <a:ext cx="5199018" cy="1754326"/>
+            <a:off x="1097279" y="3238815"/>
+            <a:ext cx="4887884" cy="1938992"/>
           </a:xfrm>
           <a:prstGeom prst="rect">
             <a:avLst/>
@@ -6408,7 +6482,7 @@
               <a:buChar char="•"/>
             </a:pPr>
             <a:r>
-              <a:rPr lang="it-IT" dirty="0"/>
+              <a:rPr lang="it-IT" sz="2000" dirty="0"/>
               <a:t>Valore nell’ultimo vertice = 0</a:t>
             </a:r>
           </a:p>
@@ -6418,7 +6492,7 @@
               <a:buChar char="•"/>
             </a:pPr>
             <a:r>
-              <a:rPr lang="it-IT" dirty="0"/>
+              <a:rPr lang="it-IT" sz="2000" dirty="0"/>
               <a:t>Risultato  = -0.3000    0.4000    0.4000</a:t>
             </a:r>
           </a:p>
@@ -6428,7 +6502,7 @@
               <a:buChar char="•"/>
             </a:pPr>
             <a:r>
-              <a:rPr lang="it-IT" dirty="0"/>
+              <a:rPr lang="it-IT" sz="2000" dirty="0"/>
               <a:t>iterazioni = 35</a:t>
             </a:r>
           </a:p>
@@ -6438,7 +6512,7 @@
               <a:buChar char="•"/>
             </a:pPr>
             <a:r>
-              <a:rPr lang="it-IT" dirty="0"/>
+              <a:rPr lang="it-IT" sz="2000" dirty="0"/>
               <a:t>dimezzamenti = 20</a:t>
             </a:r>
           </a:p>
@@ -6448,7 +6522,7 @@
               <a:buChar char="•"/>
             </a:pPr>
             <a:r>
-              <a:rPr lang="it-IT" dirty="0"/>
+              <a:rPr lang="it-IT" sz="2000" dirty="0"/>
               <a:t>superficie finale = 6.7356e-06</a:t>
             </a:r>
           </a:p>
@@ -6458,7 +6532,7 @@
               <a:buChar char="•"/>
             </a:pPr>
             <a:r>
-              <a:rPr lang="it-IT" dirty="0"/>
+              <a:rPr lang="it-IT" sz="2000" dirty="0"/>
               <a:t>errore = 0     0     0</a:t>
             </a:r>
           </a:p>
@@ -6470,22 +6544,119 @@
           <p:cNvPicPr/>
           <p:nvPr/>
         </p:nvPicPr>
-        <p:blipFill>
-          <a:blip r:embed="rId2"/>
-          <a:stretch>
-            <a:fillRect/>
-          </a:stretch>
+        <p:blipFill rotWithShape="1">
+          <a:blip r:embed="rId2">
+            <a:extLst>
+              <a:ext uri="{28A0092B-C50C-407E-A947-70E740481C1C}">
+                <a14:useLocalDpi xmlns:a14="http://schemas.microsoft.com/office/drawing/2010/main" val="0"/>
+              </a:ext>
+            </a:extLst>
+          </a:blip>
+          <a:srcRect l="16081" t="8764" r="15127" b="4562"/>
+          <a:stretch/>
         </p:blipFill>
         <p:spPr>
           <a:xfrm>
-            <a:off x="6788537" y="1737360"/>
-            <a:ext cx="5403463" cy="4592320"/>
+            <a:off x="7274299" y="2660071"/>
+            <a:ext cx="4161637" cy="3431969"/>
           </a:xfrm>
           <a:prstGeom prst="rect">
             <a:avLst/>
           </a:prstGeom>
         </p:spPr>
       </p:pic>
+      <p:sp>
+        <p:nvSpPr>
+          <p:cNvPr id="5" name="Rectangle 4"/>
+          <p:cNvSpPr/>
+          <p:nvPr/>
+        </p:nvSpPr>
+        <p:spPr>
+          <a:xfrm>
+            <a:off x="1097279" y="1887043"/>
+            <a:ext cx="8794865" cy="400110"/>
+          </a:xfrm>
+          <a:prstGeom prst="rect">
+            <a:avLst/>
+          </a:prstGeom>
+        </p:spPr>
+        <p:txBody>
+          <a:bodyPr wrap="square">
+            <a:spAutoFit/>
+          </a:bodyPr>
+          <a:lstStyle/>
+          <a:p>
+            <a:r>
+              <a:rPr lang="en-US" sz="2000" dirty="0">
+                <a:latin typeface="Courier" charset="0"/>
+              </a:rPr>
+              <a:t>Simplex(@</a:t>
+            </a:r>
+            <a:r>
+              <a:rPr lang="en-US" sz="2000" dirty="0" err="1" smtClean="0">
+                <a:latin typeface="Courier" charset="0"/>
+              </a:rPr>
+              <a:t>cost_function</a:t>
+            </a:r>
+            <a:r>
+              <a:rPr lang="en-US" sz="2000" dirty="0" smtClean="0">
+                <a:latin typeface="Courier" charset="0"/>
+              </a:rPr>
+              <a:t>, </a:t>
+            </a:r>
+            <a:r>
+              <a:rPr lang="en-US" sz="2000" dirty="0">
+                <a:latin typeface="Courier" charset="0"/>
+              </a:rPr>
+              <a:t>{}, [-.3 .4 .4], .3, 1e-5, 500</a:t>
+            </a:r>
+            <a:r>
+              <a:rPr lang="en-US" sz="2000" dirty="0" smtClean="0">
+                <a:latin typeface="Courier" charset="0"/>
+              </a:rPr>
+              <a:t>); </a:t>
+            </a:r>
+            <a:endParaRPr lang="en-US" sz="2000" dirty="0">
+              <a:effectLst/>
+              <a:latin typeface="Courier" charset="0"/>
+            </a:endParaRPr>
+          </a:p>
+        </p:txBody>
+      </p:sp>
+      <p:sp>
+        <p:nvSpPr>
+          <p:cNvPr id="7" name="TextBox 6"/>
+          <p:cNvSpPr txBox="1"/>
+          <p:nvPr/>
+        </p:nvSpPr>
+        <p:spPr>
+          <a:xfrm>
+            <a:off x="1097279" y="2893563"/>
+            <a:ext cx="1155509" cy="400110"/>
+          </a:xfrm>
+          <a:prstGeom prst="rect">
+            <a:avLst/>
+          </a:prstGeom>
+          <a:noFill/>
+        </p:spPr>
+        <p:txBody>
+          <a:bodyPr wrap="none" rtlCol="0">
+            <a:spAutoFit/>
+          </a:bodyPr>
+          <a:lstStyle/>
+          <a:p>
+            <a:r>
+              <a:rPr lang="en-US" sz="2000" dirty="0" err="1" smtClean="0"/>
+              <a:t>Risultati</a:t>
+            </a:r>
+            <a:r>
+              <a:rPr lang="en-US" sz="2000" dirty="0" smtClean="0"/>
+              <a:t>: </a:t>
+            </a:r>
+            <a:endParaRPr lang="en-US" sz="2000" dirty="0"/>
+          </a:p>
+        </p:txBody>
+      </p:sp>
     </p:spTree>
     <p:extLst>
       <p:ext uri="{BB962C8B-B14F-4D97-AF65-F5344CB8AC3E}">
@@ -8133,7 +8304,7 @@
                             <a:solidFill>
                               <a:schemeClr val="tx1"/>
                             </a:solidFill>
-                            <a:latin typeface="Cambria Math" panose="02040503050406030204" pitchFamily="18" charset="0"/>
+                            <a:latin typeface="Cambria Math" charset="0"/>
                           </a:rPr>
                         </m:ctrlPr>
                       </m:fPr>
@@ -8185,7 +8356,7 @@
                             <a:solidFill>
                               <a:schemeClr val="tx1"/>
                             </a:solidFill>
-                            <a:latin typeface="Cambria Math" panose="02040503050406030204" pitchFamily="18" charset="0"/>
+                            <a:latin typeface="Cambria Math" charset="0"/>
                           </a:rPr>
                         </m:ctrlPr>
                       </m:fPr>
@@ -8281,7 +8452,7 @@
                         <m:chr m:val="⃗"/>
                         <m:ctrlPr>
                           <a:rPr lang="it-IT" b="1" i="1">
-                            <a:latin typeface="Cambria Math" panose="02040503050406030204" pitchFamily="18" charset="0"/>
+                            <a:latin typeface="Cambria Math" charset="0"/>
                           </a:rPr>
                         </m:ctrlPr>
                       </m:accPr>
@@ -8305,7 +8476,7 @@
                         <m:chr m:val="⃗"/>
                         <m:ctrlPr>
                           <a:rPr lang="it-IT" b="1" i="1">
-                            <a:latin typeface="Cambria Math" panose="02040503050406030204" pitchFamily="18" charset="0"/>
+                            <a:latin typeface="Cambria Math" charset="0"/>
                           </a:rPr>
                         </m:ctrlPr>
                       </m:accPr>
@@ -8329,7 +8500,7 @@
                         <m:degHide m:val="on"/>
                         <m:ctrlPr>
                           <a:rPr lang="it-IT" i="1">
-                            <a:latin typeface="Cambria Math" panose="02040503050406030204" pitchFamily="18" charset="0"/>
+                            <a:latin typeface="Cambria Math" charset="0"/>
                           </a:rPr>
                         </m:ctrlPr>
                       </m:radPr>
@@ -8339,7 +8510,7 @@
                           <m:sSupPr>
                             <m:ctrlPr>
                               <a:rPr lang="it-IT" i="1">
-                                <a:latin typeface="Cambria Math" panose="02040503050406030204" pitchFamily="18" charset="0"/>
+                                <a:latin typeface="Cambria Math" charset="0"/>
                               </a:rPr>
                             </m:ctrlPr>
                           </m:sSupPr>
@@ -8348,7 +8519,7 @@
                               <m:dPr>
                                 <m:ctrlPr>
                                   <a:rPr lang="it-IT" i="1">
-                                    <a:latin typeface="Cambria Math" panose="02040503050406030204" pitchFamily="18" charset="0"/>
+                                    <a:latin typeface="Cambria Math" charset="0"/>
                                   </a:rPr>
                                 </m:ctrlPr>
                               </m:dPr>
@@ -8357,7 +8528,7 @@
                                   <m:sSubPr>
                                     <m:ctrlPr>
                                       <a:rPr lang="it-IT" i="1">
-                                        <a:latin typeface="Cambria Math" panose="02040503050406030204" pitchFamily="18" charset="0"/>
+                                        <a:latin typeface="Cambria Math" charset="0"/>
                                       </a:rPr>
                                     </m:ctrlPr>
                                   </m:sSubPr>
@@ -8388,7 +8559,7 @@
                                   <m:sSubPr>
                                     <m:ctrlPr>
                                       <a:rPr lang="it-IT" i="1">
-                                        <a:latin typeface="Cambria Math" panose="02040503050406030204" pitchFamily="18" charset="0"/>
+                                        <a:latin typeface="Cambria Math" charset="0"/>
                                       </a:rPr>
                                     </m:ctrlPr>
                                   </m:sSubPr>
@@ -8431,7 +8602,7 @@
                           <m:sSupPr>
                             <m:ctrlPr>
                               <a:rPr lang="it-IT" i="1">
-                                <a:latin typeface="Cambria Math" panose="02040503050406030204" pitchFamily="18" charset="0"/>
+                                <a:latin typeface="Cambria Math" charset="0"/>
                               </a:rPr>
                             </m:ctrlPr>
                           </m:sSupPr>
@@ -8440,7 +8611,7 @@
                               <m:dPr>
                                 <m:ctrlPr>
                                   <a:rPr lang="it-IT" i="1">
-                                    <a:latin typeface="Cambria Math" panose="02040503050406030204" pitchFamily="18" charset="0"/>
+                                    <a:latin typeface="Cambria Math" charset="0"/>
                                   </a:rPr>
                                 </m:ctrlPr>
                               </m:dPr>
@@ -8449,7 +8620,7 @@
                                   <m:sSubPr>
                                     <m:ctrlPr>
                                       <a:rPr lang="it-IT" i="1">
-                                        <a:latin typeface="Cambria Math" panose="02040503050406030204" pitchFamily="18" charset="0"/>
+                                        <a:latin typeface="Cambria Math" charset="0"/>
                                       </a:rPr>
                                     </m:ctrlPr>
                                   </m:sSubPr>
@@ -8480,7 +8651,7 @@
                                   <m:sSubPr>
                                     <m:ctrlPr>
                                       <a:rPr lang="it-IT" i="1">
-                                        <a:latin typeface="Cambria Math" panose="02040503050406030204" pitchFamily="18" charset="0"/>
+                                        <a:latin typeface="Cambria Math" charset="0"/>
                                       </a:rPr>
                                     </m:ctrlPr>
                                   </m:sSubPr>
@@ -8523,7 +8694,7 @@
                           <m:sSupPr>
                             <m:ctrlPr>
                               <a:rPr lang="it-IT" i="1">
-                                <a:latin typeface="Cambria Math" panose="02040503050406030204" pitchFamily="18" charset="0"/>
+                                <a:latin typeface="Cambria Math" charset="0"/>
                               </a:rPr>
                             </m:ctrlPr>
                           </m:sSupPr>
@@ -8532,7 +8703,7 @@
                               <m:dPr>
                                 <m:ctrlPr>
                                   <a:rPr lang="it-IT" i="1">
-                                    <a:latin typeface="Cambria Math" panose="02040503050406030204" pitchFamily="18" charset="0"/>
+                                    <a:latin typeface="Cambria Math" charset="0"/>
                                   </a:rPr>
                                 </m:ctrlPr>
                               </m:dPr>
@@ -8541,7 +8712,7 @@
                                   <m:sSubPr>
                                     <m:ctrlPr>
                                       <a:rPr lang="it-IT" i="1">
-                                        <a:latin typeface="Cambria Math" panose="02040503050406030204" pitchFamily="18" charset="0"/>
+                                        <a:latin typeface="Cambria Math" charset="0"/>
                                       </a:rPr>
                                     </m:ctrlPr>
                                   </m:sSubPr>
@@ -8572,7 +8743,7 @@
                                   <m:sSubPr>
                                     <m:ctrlPr>
                                       <a:rPr lang="it-IT" i="1">
-                                        <a:latin typeface="Cambria Math" panose="02040503050406030204" pitchFamily="18" charset="0"/>
+                                        <a:latin typeface="Cambria Math" charset="0"/>
                                       </a:rPr>
                                     </m:ctrlPr>
                                   </m:sSubPr>
@@ -8650,7 +8821,7 @@
                       <m:sSubPr>
                         <m:ctrlPr>
                           <a:rPr lang="it-IT" i="1">
-                            <a:latin typeface="Cambria Math" panose="02040503050406030204" pitchFamily="18" charset="0"/>
+                            <a:latin typeface="Cambria Math" charset="0"/>
                           </a:rPr>
                         </m:ctrlPr>
                       </m:sSubPr>
@@ -8683,7 +8854,7 @@
                         <m:limLoc m:val="undOvr"/>
                         <m:ctrlPr>
                           <a:rPr lang="it-IT" i="1">
-                            <a:latin typeface="Cambria Math" panose="02040503050406030204" pitchFamily="18" charset="0"/>
+                            <a:latin typeface="Cambria Math" charset="0"/>
                           </a:rPr>
                         </m:ctrlPr>
                       </m:naryPr>
@@ -8714,7 +8885,7 @@
                           <m:fPr>
                             <m:ctrlPr>
                               <a:rPr lang="it-IT" i="1">
-                                <a:latin typeface="Cambria Math" panose="02040503050406030204" pitchFamily="18" charset="0"/>
+                                <a:latin typeface="Cambria Math" charset="0"/>
                               </a:rPr>
                             </m:ctrlPr>
                           </m:fPr>
@@ -8751,7 +8922,7 @@
                           <m:fPr>
                             <m:ctrlPr>
                               <a:rPr lang="it-IT" i="1">
-                                <a:latin typeface="Cambria Math" panose="02040503050406030204" pitchFamily="18" charset="0"/>
+                                <a:latin typeface="Cambria Math" charset="0"/>
                               </a:rPr>
                             </m:ctrlPr>
                           </m:fPr>
@@ -8760,7 +8931,7 @@
                               <m:sSubPr>
                                 <m:ctrlPr>
                                   <a:rPr lang="it-IT" i="1">
-                                    <a:latin typeface="Cambria Math" panose="02040503050406030204" pitchFamily="18" charset="0"/>
+                                    <a:latin typeface="Cambria Math" charset="0"/>
                                   </a:rPr>
                                 </m:ctrlPr>
                               </m:sSubPr>
@@ -8787,7 +8958,7 @@
                               <m:sSubPr>
                                 <m:ctrlPr>
                                   <a:rPr lang="it-IT" i="1">
-                                    <a:latin typeface="Cambria Math" panose="02040503050406030204" pitchFamily="18" charset="0"/>
+                                    <a:latin typeface="Cambria Math" charset="0"/>
                                   </a:rPr>
                                 </m:ctrlPr>
                               </m:sSubPr>
@@ -8824,7 +8995,7 @@
                         <m:limLoc m:val="undOvr"/>
                         <m:ctrlPr>
                           <a:rPr lang="it-IT" i="1">
-                            <a:latin typeface="Cambria Math" panose="02040503050406030204" pitchFamily="18" charset="0"/>
+                            <a:latin typeface="Cambria Math" charset="0"/>
                           </a:rPr>
                         </m:ctrlPr>
                       </m:naryPr>
@@ -8855,7 +9026,7 @@
                           <m:fPr>
                             <m:ctrlPr>
                               <a:rPr lang="it-IT" i="1">
-                                <a:latin typeface="Cambria Math" panose="02040503050406030204" pitchFamily="18" charset="0"/>
+                                <a:latin typeface="Cambria Math" charset="0"/>
                               </a:rPr>
                             </m:ctrlPr>
                           </m:fPr>
@@ -8892,7 +9063,7 @@
                           <m:fPr>
                             <m:ctrlPr>
                               <a:rPr lang="it-IT" i="1">
-                                <a:latin typeface="Cambria Math" panose="02040503050406030204" pitchFamily="18" charset="0"/>
+                                <a:latin typeface="Cambria Math" charset="0"/>
                               </a:rPr>
                             </m:ctrlPr>
                           </m:fPr>
@@ -8901,7 +9072,7 @@
                               <m:sSubPr>
                                 <m:ctrlPr>
                                   <a:rPr lang="it-IT" i="1">
-                                    <a:latin typeface="Cambria Math" panose="02040503050406030204" pitchFamily="18" charset="0"/>
+                                    <a:latin typeface="Cambria Math" charset="0"/>
                                   </a:rPr>
                                 </m:ctrlPr>
                               </m:sSubPr>
@@ -8935,7 +9106,7 @@
                                 <m:chr m:val="⃗"/>
                                 <m:ctrlPr>
                                   <a:rPr lang="it-IT" b="1" i="1">
-                                    <a:latin typeface="Cambria Math" panose="02040503050406030204" pitchFamily="18" charset="0"/>
+                                    <a:latin typeface="Cambria Math" charset="0"/>
                                   </a:rPr>
                                 </m:ctrlPr>
                               </m:accPr>
@@ -8944,7 +9115,7 @@
                                   <m:sSubPr>
                                     <m:ctrlPr>
                                       <a:rPr lang="it-IT" b="1" i="1">
-                                        <a:latin typeface="Cambria Math" panose="02040503050406030204" pitchFamily="18" charset="0"/>
+                                        <a:latin typeface="Cambria Math" charset="0"/>
                                       </a:rPr>
                                     </m:ctrlPr>
                                   </m:sSubPr>
@@ -8978,7 +9149,7 @@
                                 <m:chr m:val="⃗"/>
                                 <m:ctrlPr>
                                   <a:rPr lang="it-IT" b="1" i="1">
-                                    <a:latin typeface="Cambria Math" panose="02040503050406030204" pitchFamily="18" charset="0"/>
+                                    <a:latin typeface="Cambria Math" charset="0"/>
                                   </a:rPr>
                                 </m:ctrlPr>
                               </m:accPr>
@@ -9172,7 +9343,7 @@
                       <m:fPr>
                         <m:ctrlPr>
                           <a:rPr lang="en-US" sz="2400" i="1">
-                            <a:latin typeface="Cambria Math" panose="02040503050406030204" pitchFamily="18" charset="0"/>
+                            <a:latin typeface="Cambria Math" charset="0"/>
                           </a:rPr>
                         </m:ctrlPr>
                       </m:fPr>
@@ -9273,7 +9444,7 @@
                             <a:solidFill>
                               <a:schemeClr val="tx1"/>
                             </a:solidFill>
-                            <a:latin typeface="Cambria Math" panose="02040503050406030204" pitchFamily="18" charset="0"/>
+                            <a:latin typeface="Cambria Math" charset="0"/>
                           </a:rPr>
                         </m:ctrlPr>
                       </m:radPr>
@@ -9668,7 +9839,7 @@
                         <m:sSubPr>
                           <m:ctrlPr>
                             <a:rPr lang="it-IT" i="1">
-                              <a:latin typeface="Cambria Math" panose="02040503050406030204" pitchFamily="18" charset="0"/>
+                              <a:latin typeface="Cambria Math" charset="0"/>
                             </a:rPr>
                           </m:ctrlPr>
                         </m:sSubPr>
@@ -9699,7 +9870,7 @@
                         <m:sSubPr>
                           <m:ctrlPr>
                             <a:rPr lang="it-IT" i="1">
-                              <a:latin typeface="Cambria Math" panose="02040503050406030204" pitchFamily="18" charset="0"/>
+                              <a:latin typeface="Cambria Math" charset="0"/>
                             </a:rPr>
                           </m:ctrlPr>
                         </m:sSubPr>
@@ -9748,7 +9919,7 @@
                         <m:sSubPr>
                           <m:ctrlPr>
                             <a:rPr lang="it-IT" i="1">
-                              <a:latin typeface="Cambria Math" panose="02040503050406030204" pitchFamily="18" charset="0"/>
+                              <a:latin typeface="Cambria Math" charset="0"/>
                             </a:rPr>
                           </m:ctrlPr>
                         </m:sSubPr>
@@ -9781,7 +9952,7 @@
                           <m:limLoc m:val="undOvr"/>
                           <m:ctrlPr>
                             <a:rPr lang="it-IT" i="1">
-                              <a:latin typeface="Cambria Math" panose="02040503050406030204" pitchFamily="18" charset="0"/>
+                              <a:latin typeface="Cambria Math" charset="0"/>
                             </a:rPr>
                           </m:ctrlPr>
                         </m:naryPr>
@@ -9806,7 +9977,7 @@
                             <m:fPr>
                               <m:ctrlPr>
                                 <a:rPr lang="it-IT" i="1">
-                                  <a:latin typeface="Cambria Math" panose="02040503050406030204" pitchFamily="18" charset="0"/>
+                                  <a:latin typeface="Cambria Math" charset="0"/>
                                 </a:rPr>
                               </m:ctrlPr>
                             </m:fPr>
@@ -9815,7 +9986,7 @@
                                 <m:sSubPr>
                                   <m:ctrlPr>
                                     <a:rPr lang="it-IT" i="1">
-                                      <a:latin typeface="Cambria Math" panose="02040503050406030204" pitchFamily="18" charset="0"/>
+                                      <a:latin typeface="Cambria Math" charset="0"/>
                                     </a:rPr>
                                   </m:ctrlPr>
                                 </m:sSubPr>
@@ -9850,7 +10021,7 @@
                                   <m:endChr m:val="|"/>
                                   <m:ctrlPr>
                                     <a:rPr lang="it-IT" i="1">
-                                      <a:latin typeface="Cambria Math" panose="02040503050406030204" pitchFamily="18" charset="0"/>
+                                      <a:latin typeface="Cambria Math" charset="0"/>
                                     </a:rPr>
                                   </m:ctrlPr>
                                 </m:dPr>
@@ -9861,7 +10032,7 @@
                                       <m:endChr m:val="|"/>
                                       <m:ctrlPr>
                                         <a:rPr lang="it-IT" i="1">
-                                          <a:latin typeface="Cambria Math" panose="02040503050406030204" pitchFamily="18" charset="0"/>
+                                          <a:latin typeface="Cambria Math" charset="0"/>
                                         </a:rPr>
                                       </m:ctrlPr>
                                     </m:dPr>
@@ -9871,7 +10042,7 @@
                                           <m:chr m:val="⃗"/>
                                           <m:ctrlPr>
                                             <a:rPr lang="it-IT" b="1" i="1">
-                                              <a:latin typeface="Cambria Math" panose="02040503050406030204" pitchFamily="18" charset="0"/>
+                                              <a:latin typeface="Cambria Math" charset="0"/>
                                             </a:rPr>
                                           </m:ctrlPr>
                                         </m:accPr>
@@ -9880,7 +10051,7 @@
                                             <m:sSubPr>
                                               <m:ctrlPr>
                                                 <a:rPr lang="it-IT" b="1" i="1">
-                                                  <a:latin typeface="Cambria Math" panose="02040503050406030204" pitchFamily="18" charset="0"/>
+                                                  <a:latin typeface="Cambria Math" charset="0"/>
                                                 </a:rPr>
                                               </m:ctrlPr>
                                             </m:sSubPr>
@@ -9914,7 +10085,7 @@
                                           <m:chr m:val="⃗"/>
                                           <m:ctrlPr>
                                             <a:rPr lang="it-IT" b="1" i="1">
-                                              <a:latin typeface="Cambria Math" panose="02040503050406030204" pitchFamily="18" charset="0"/>
+                                              <a:latin typeface="Cambria Math" charset="0"/>
                                             </a:rPr>
                                           </m:ctrlPr>
                                         </m:accPr>
@@ -9953,7 +10124,7 @@
                           <m:limLoc m:val="undOvr"/>
                           <m:ctrlPr>
                             <a:rPr lang="it-IT" i="1">
-                              <a:latin typeface="Cambria Math" panose="02040503050406030204" pitchFamily="18" charset="0"/>
+                              <a:latin typeface="Cambria Math" charset="0"/>
                             </a:rPr>
                           </m:ctrlPr>
                         </m:naryPr>
@@ -9984,7 +10155,7 @@
                             <m:fPr>
                               <m:ctrlPr>
                                 <a:rPr lang="it-IT" i="1">
-                                  <a:latin typeface="Cambria Math" panose="02040503050406030204" pitchFamily="18" charset="0"/>
+                                  <a:latin typeface="Cambria Math" charset="0"/>
                                 </a:rPr>
                               </m:ctrlPr>
                             </m:fPr>
@@ -9993,7 +10164,7 @@
                                 <m:sSubPr>
                                   <m:ctrlPr>
                                     <a:rPr lang="it-IT" i="1">
-                                      <a:latin typeface="Cambria Math" panose="02040503050406030204" pitchFamily="18" charset="0"/>
+                                      <a:latin typeface="Cambria Math" charset="0"/>
                                     </a:rPr>
                                   </m:ctrlPr>
                                 </m:sSubPr>
@@ -10028,7 +10199,7 @@
                                   <m:endChr m:val="|"/>
                                   <m:ctrlPr>
                                     <a:rPr lang="it-IT" i="1">
-                                      <a:latin typeface="Cambria Math" panose="02040503050406030204" pitchFamily="18" charset="0"/>
+                                      <a:latin typeface="Cambria Math" charset="0"/>
                                     </a:rPr>
                                   </m:ctrlPr>
                                 </m:dPr>
@@ -10039,7 +10210,7 @@
                                       <m:endChr m:val="|"/>
                                       <m:ctrlPr>
                                         <a:rPr lang="it-IT" i="1">
-                                          <a:latin typeface="Cambria Math" panose="02040503050406030204" pitchFamily="18" charset="0"/>
+                                          <a:latin typeface="Cambria Math" charset="0"/>
                                         </a:rPr>
                                       </m:ctrlPr>
                                     </m:dPr>
@@ -10049,7 +10220,7 @@
                                           <m:chr m:val="⃗"/>
                                           <m:ctrlPr>
                                             <a:rPr lang="it-IT" b="1" i="1">
-                                              <a:latin typeface="Cambria Math" panose="02040503050406030204" pitchFamily="18" charset="0"/>
+                                              <a:latin typeface="Cambria Math" charset="0"/>
                                             </a:rPr>
                                           </m:ctrlPr>
                                         </m:accPr>
@@ -10058,7 +10229,7 @@
                                             <m:sSubPr>
                                               <m:ctrlPr>
                                                 <a:rPr lang="it-IT" b="1" i="1">
-                                                  <a:latin typeface="Cambria Math" panose="02040503050406030204" pitchFamily="18" charset="0"/>
+                                                  <a:latin typeface="Cambria Math" charset="0"/>
                                                 </a:rPr>
                                               </m:ctrlPr>
                                             </m:sSubPr>
@@ -10092,7 +10263,7 @@
                                           <m:chr m:val="⃗"/>
                                           <m:ctrlPr>
                                             <a:rPr lang="it-IT" b="1" i="1">
-                                              <a:latin typeface="Cambria Math" panose="02040503050406030204" pitchFamily="18" charset="0"/>
+                                              <a:latin typeface="Cambria Math" charset="0"/>
                                             </a:rPr>
                                           </m:ctrlPr>
                                         </m:accPr>
@@ -10129,7 +10300,7 @@
                         <m:fPr>
                           <m:ctrlPr>
                             <a:rPr lang="it-IT" i="1">
-                              <a:latin typeface="Cambria Math" panose="02040503050406030204" pitchFamily="18" charset="0"/>
+                              <a:latin typeface="Cambria Math" charset="0"/>
                             </a:rPr>
                           </m:ctrlPr>
                         </m:fPr>
@@ -10138,7 +10309,7 @@
                             <m:sSubPr>
                               <m:ctrlPr>
                                 <a:rPr lang="it-IT" i="1">
-                                  <a:latin typeface="Cambria Math" panose="02040503050406030204" pitchFamily="18" charset="0"/>
+                                  <a:latin typeface="Cambria Math" charset="0"/>
                                 </a:rPr>
                               </m:ctrlPr>
                             </m:sSubPr>
@@ -10167,7 +10338,7 @@
                               <m:endChr m:val="|"/>
                               <m:ctrlPr>
                                 <a:rPr lang="it-IT" i="1">
-                                  <a:latin typeface="Cambria Math" panose="02040503050406030204" pitchFamily="18" charset="0"/>
+                                  <a:latin typeface="Cambria Math" charset="0"/>
                                 </a:rPr>
                               </m:ctrlPr>
                             </m:dPr>
@@ -10178,7 +10349,7 @@
                                   <m:endChr m:val="|"/>
                                   <m:ctrlPr>
                                     <a:rPr lang="it-IT" i="1">
-                                      <a:latin typeface="Cambria Math" panose="02040503050406030204" pitchFamily="18" charset="0"/>
+                                      <a:latin typeface="Cambria Math" charset="0"/>
                                     </a:rPr>
                                   </m:ctrlPr>
                                 </m:dPr>
@@ -10188,7 +10359,7 @@
                                       <m:chr m:val="⃗"/>
                                       <m:ctrlPr>
                                         <a:rPr lang="it-IT" b="1" i="1">
-                                          <a:latin typeface="Cambria Math" panose="02040503050406030204" pitchFamily="18" charset="0"/>
+                                          <a:latin typeface="Cambria Math" charset="0"/>
                                         </a:rPr>
                                       </m:ctrlPr>
                                     </m:accPr>
@@ -10197,7 +10368,7 @@
                                         <m:sSubPr>
                                           <m:ctrlPr>
                                             <a:rPr lang="it-IT" b="1" i="1">
-                                              <a:latin typeface="Cambria Math" panose="02040503050406030204" pitchFamily="18" charset="0"/>
+                                              <a:latin typeface="Cambria Math" charset="0"/>
                                             </a:rPr>
                                           </m:ctrlPr>
                                         </m:sSubPr>
@@ -10231,7 +10402,7 @@
                                       <m:chr m:val="⃗"/>
                                       <m:ctrlPr>
                                         <a:rPr lang="it-IT" b="1" i="1">
-                                          <a:latin typeface="Cambria Math" panose="02040503050406030204" pitchFamily="18" charset="0"/>
+                                          <a:latin typeface="Cambria Math" charset="0"/>
                                         </a:rPr>
                                       </m:ctrlPr>
                                     </m:accPr>
@@ -10317,7 +10488,7 @@
                         <m:sSubPr>
                           <m:ctrlPr>
                             <a:rPr lang="it-IT" i="1">
-                              <a:latin typeface="Cambria Math" panose="02040503050406030204" pitchFamily="18" charset="0"/>
+                              <a:latin typeface="Cambria Math" charset="0"/>
                             </a:rPr>
                           </m:ctrlPr>
                         </m:sSubPr>
@@ -10366,7 +10537,7 @@
                         <m:sSupPr>
                           <m:ctrlPr>
                             <a:rPr lang="it-IT" i="1">
-                              <a:latin typeface="Cambria Math" panose="02040503050406030204" pitchFamily="18" charset="0"/>
+                              <a:latin typeface="Cambria Math" charset="0"/>
                             </a:rPr>
                           </m:ctrlPr>
                         </m:sSupPr>
@@ -10397,7 +10568,7 @@
                         <m:fPr>
                           <m:ctrlPr>
                             <a:rPr lang="it-IT" i="1">
-                              <a:latin typeface="Cambria Math" panose="02040503050406030204" pitchFamily="18" charset="0"/>
+                              <a:latin typeface="Cambria Math" charset="0"/>
                             </a:rPr>
                           </m:ctrlPr>
                         </m:fPr>
@@ -10406,7 +10577,7 @@
                             <m:sSubPr>
                               <m:ctrlPr>
                                 <a:rPr lang="it-IT" i="1">
-                                  <a:latin typeface="Cambria Math" panose="02040503050406030204" pitchFamily="18" charset="0"/>
+                                  <a:latin typeface="Cambria Math" charset="0"/>
                                 </a:rPr>
                               </m:ctrlPr>
                             </m:sSubPr>
@@ -10435,7 +10606,7 @@
                               <m:endChr m:val="|"/>
                               <m:ctrlPr>
                                 <a:rPr lang="it-IT" i="1">
-                                  <a:latin typeface="Cambria Math" panose="02040503050406030204" pitchFamily="18" charset="0"/>
+                                  <a:latin typeface="Cambria Math" charset="0"/>
                                 </a:rPr>
                               </m:ctrlPr>
                             </m:dPr>
@@ -10446,7 +10617,7 @@
                                   <m:endChr m:val="|"/>
                                   <m:ctrlPr>
                                     <a:rPr lang="it-IT" i="1">
-                                      <a:latin typeface="Cambria Math" panose="02040503050406030204" pitchFamily="18" charset="0"/>
+                                      <a:latin typeface="Cambria Math" charset="0"/>
                                     </a:rPr>
                                   </m:ctrlPr>
                                 </m:dPr>
@@ -10456,7 +10627,7 @@
                                       <m:chr m:val="⃗"/>
                                       <m:ctrlPr>
                                         <a:rPr lang="it-IT" b="1" i="1">
-                                          <a:latin typeface="Cambria Math" panose="02040503050406030204" pitchFamily="18" charset="0"/>
+                                          <a:latin typeface="Cambria Math" charset="0"/>
                                         </a:rPr>
                                       </m:ctrlPr>
                                     </m:accPr>
@@ -10465,7 +10636,7 @@
                                         <m:sSubPr>
                                           <m:ctrlPr>
                                             <a:rPr lang="it-IT" b="1" i="1">
-                                              <a:latin typeface="Cambria Math" panose="02040503050406030204" pitchFamily="18" charset="0"/>
+                                              <a:latin typeface="Cambria Math" charset="0"/>
                                             </a:rPr>
                                           </m:ctrlPr>
                                         </m:sSubPr>
@@ -10499,7 +10670,7 @@
                                       <m:chr m:val="⃗"/>
                                       <m:ctrlPr>
                                         <a:rPr lang="it-IT" b="1" i="1">
-                                          <a:latin typeface="Cambria Math" panose="02040503050406030204" pitchFamily="18" charset="0"/>
+                                          <a:latin typeface="Cambria Math" charset="0"/>
                                         </a:rPr>
                                       </m:ctrlPr>
                                     </m:accPr>
@@ -10528,7 +10699,7 @@
                         <m:fPr>
                           <m:ctrlPr>
                             <a:rPr lang="it-IT" i="1">
-                              <a:latin typeface="Cambria Math" panose="02040503050406030204" pitchFamily="18" charset="0"/>
+                              <a:latin typeface="Cambria Math" charset="0"/>
                             </a:rPr>
                           </m:ctrlPr>
                         </m:fPr>
@@ -10537,7 +10708,7 @@
                             <m:sSupPr>
                               <m:ctrlPr>
                                 <a:rPr lang="it-IT" i="1">
-                                  <a:latin typeface="Cambria Math" panose="02040503050406030204" pitchFamily="18" charset="0"/>
+                                  <a:latin typeface="Cambria Math" charset="0"/>
                                 </a:rPr>
                               </m:ctrlPr>
                             </m:sSupPr>
@@ -10572,7 +10743,7 @@
                               <m:endChr m:val="|"/>
                               <m:ctrlPr>
                                 <a:rPr lang="it-IT" i="1">
-                                  <a:latin typeface="Cambria Math" panose="02040503050406030204" pitchFamily="18" charset="0"/>
+                                  <a:latin typeface="Cambria Math" charset="0"/>
                                 </a:rPr>
                               </m:ctrlPr>
                             </m:dPr>
@@ -10583,7 +10754,7 @@
                                   <m:endChr m:val="|"/>
                                   <m:ctrlPr>
                                     <a:rPr lang="it-IT" i="1">
-                                      <a:latin typeface="Cambria Math" panose="02040503050406030204" pitchFamily="18" charset="0"/>
+                                      <a:latin typeface="Cambria Math" charset="0"/>
                                     </a:rPr>
                                   </m:ctrlPr>
                                 </m:dPr>
@@ -10593,7 +10764,7 @@
                                       <m:chr m:val="⃗"/>
                                       <m:ctrlPr>
                                         <a:rPr lang="it-IT" b="1" i="1">
-                                          <a:latin typeface="Cambria Math" panose="02040503050406030204" pitchFamily="18" charset="0"/>
+                                          <a:latin typeface="Cambria Math" charset="0"/>
                                         </a:rPr>
                                       </m:ctrlPr>
                                     </m:accPr>
@@ -10602,7 +10773,7 @@
                                         <m:sSupPr>
                                           <m:ctrlPr>
                                             <a:rPr lang="it-IT" b="1" i="1">
-                                              <a:latin typeface="Cambria Math" panose="02040503050406030204" pitchFamily="18" charset="0"/>
+                                              <a:latin typeface="Cambria Math" charset="0"/>
                                             </a:rPr>
                                           </m:ctrlPr>
                                         </m:sSupPr>
@@ -10636,7 +10807,7 @@
                                       <m:chr m:val="⃗"/>
                                       <m:ctrlPr>
                                         <a:rPr lang="it-IT" b="1" i="1">
-                                          <a:latin typeface="Cambria Math" panose="02040503050406030204" pitchFamily="18" charset="0"/>
+                                          <a:latin typeface="Cambria Math" charset="0"/>
                                         </a:rPr>
                                       </m:ctrlPr>
                                     </m:accPr>
@@ -10692,7 +10863,7 @@
                         <m:fPr>
                           <m:ctrlPr>
                             <a:rPr lang="it-IT" i="1">
-                              <a:latin typeface="Cambria Math" panose="02040503050406030204" pitchFamily="18" charset="0"/>
+                              <a:latin typeface="Cambria Math" charset="0"/>
                             </a:rPr>
                           </m:ctrlPr>
                         </m:fPr>
@@ -10707,7 +10878,7 @@
                             <m:dPr>
                               <m:ctrlPr>
                                 <a:rPr lang="it-IT" i="1">
-                                  <a:latin typeface="Cambria Math" panose="02040503050406030204" pitchFamily="18" charset="0"/>
+                                  <a:latin typeface="Cambria Math" charset="0"/>
                                 </a:rPr>
                               </m:ctrlPr>
                             </m:dPr>
@@ -10716,7 +10887,7 @@
                                 <m:sSupPr>
                                   <m:ctrlPr>
                                     <a:rPr lang="it-IT" i="1">
-                                      <a:latin typeface="Cambria Math" panose="02040503050406030204" pitchFamily="18" charset="0"/>
+                                      <a:latin typeface="Cambria Math" charset="0"/>
                                     </a:rPr>
                                   </m:ctrlPr>
                                 </m:sSupPr>
@@ -10748,7 +10919,7 @@
                                   <m:chr m:val="⃗"/>
                                   <m:ctrlPr>
                                     <a:rPr lang="it-IT" b="1" i="1">
-                                      <a:latin typeface="Cambria Math" panose="02040503050406030204" pitchFamily="18" charset="0"/>
+                                      <a:latin typeface="Cambria Math" charset="0"/>
                                     </a:rPr>
                                   </m:ctrlPr>
                                 </m:accPr>
@@ -10757,7 +10928,7 @@
                                     <m:sSupPr>
                                       <m:ctrlPr>
                                         <a:rPr lang="it-IT" b="1" i="1">
-                                          <a:latin typeface="Cambria Math" panose="02040503050406030204" pitchFamily="18" charset="0"/>
+                                          <a:latin typeface="Cambria Math" charset="0"/>
                                         </a:rPr>
                                       </m:ctrlPr>
                                     </m:sSupPr>
@@ -10795,7 +10966,7 @@
                               <m:degHide m:val="on"/>
                               <m:ctrlPr>
                                 <a:rPr lang="it-IT" i="1">
-                                  <a:latin typeface="Cambria Math" panose="02040503050406030204" pitchFamily="18" charset="0"/>
+                                  <a:latin typeface="Cambria Math" charset="0"/>
                                 </a:rPr>
                               </m:ctrlPr>
                             </m:radPr>
@@ -10823,7 +10994,7 @@
                           <m:limLoc m:val="undOvr"/>
                           <m:ctrlPr>
                             <a:rPr lang="it-IT" i="1">
-                              <a:latin typeface="Cambria Math" panose="02040503050406030204" pitchFamily="18" charset="0"/>
+                              <a:latin typeface="Cambria Math" charset="0"/>
                             </a:rPr>
                           </m:ctrlPr>
                         </m:naryPr>
@@ -10854,7 +11025,7 @@
                             <m:sSubSupPr>
                               <m:ctrlPr>
                                 <a:rPr lang="it-IT" i="1">
-                                  <a:latin typeface="Cambria Math" panose="02040503050406030204" pitchFamily="18" charset="0"/>
+                                  <a:latin typeface="Cambria Math" charset="0"/>
                                 </a:rPr>
                               </m:ctrlPr>
                             </m:sSubSupPr>
@@ -10865,7 +11036,7 @@
                                   <m:endChr m:val="|"/>
                                   <m:ctrlPr>
                                     <a:rPr lang="it-IT" i="1">
-                                      <a:latin typeface="Cambria Math" panose="02040503050406030204" pitchFamily="18" charset="0"/>
+                                      <a:latin typeface="Cambria Math" charset="0"/>
                                     </a:rPr>
                                   </m:ctrlPr>
                                 </m:dPr>
@@ -10914,7 +11085,7 @@
                                 <m:sSubPr>
                                   <m:ctrlPr>
                                     <a:rPr lang="it-IT" i="1">
-                                      <a:latin typeface="Cambria Math" panose="02040503050406030204" pitchFamily="18" charset="0"/>
+                                      <a:latin typeface="Cambria Math" charset="0"/>
                                     </a:rPr>
                                   </m:ctrlPr>
                                 </m:sSubPr>
@@ -10952,7 +11123,7 @@
                           <m:limLoc m:val="undOvr"/>
                           <m:ctrlPr>
                             <a:rPr lang="it-IT" i="1">
-                              <a:latin typeface="Cambria Math" panose="02040503050406030204" pitchFamily="18" charset="0"/>
+                              <a:latin typeface="Cambria Math" charset="0"/>
                             </a:rPr>
                           </m:ctrlPr>
                         </m:naryPr>
@@ -10983,7 +11154,7 @@
                             <m:sSupPr>
                               <m:ctrlPr>
                                 <a:rPr lang="it-IT" i="1">
-                                  <a:latin typeface="Cambria Math" panose="02040503050406030204" pitchFamily="18" charset="0"/>
+                                  <a:latin typeface="Cambria Math" charset="0"/>
                                 </a:rPr>
                               </m:ctrlPr>
                             </m:sSupPr>
@@ -10992,7 +11163,7 @@
                                 <m:dPr>
                                   <m:ctrlPr>
                                     <a:rPr lang="it-IT" i="1">
-                                      <a:latin typeface="Cambria Math" panose="02040503050406030204" pitchFamily="18" charset="0"/>
+                                      <a:latin typeface="Cambria Math" charset="0"/>
                                     </a:rPr>
                                   </m:ctrlPr>
                                 </m:dPr>
@@ -11001,7 +11172,7 @@
                                     <m:fPr>
                                       <m:ctrlPr>
                                         <a:rPr lang="it-IT" i="1">
-                                          <a:latin typeface="Cambria Math" panose="02040503050406030204" pitchFamily="18" charset="0"/>
+                                          <a:latin typeface="Cambria Math" charset="0"/>
                                         </a:rPr>
                                       </m:ctrlPr>
                                     </m:fPr>
@@ -11010,7 +11181,7 @@
                                         <m:sSubPr>
                                           <m:ctrlPr>
                                             <a:rPr lang="it-IT" i="1">
-                                              <a:latin typeface="Cambria Math" panose="02040503050406030204" pitchFamily="18" charset="0"/>
+                                              <a:latin typeface="Cambria Math" charset="0"/>
                                             </a:rPr>
                                           </m:ctrlPr>
                                         </m:sSubPr>
@@ -11039,7 +11210,7 @@
                                           <m:endChr m:val="|"/>
                                           <m:ctrlPr>
                                             <a:rPr lang="it-IT" i="1">
-                                              <a:latin typeface="Cambria Math" panose="02040503050406030204" pitchFamily="18" charset="0"/>
+                                              <a:latin typeface="Cambria Math" charset="0"/>
                                             </a:rPr>
                                           </m:ctrlPr>
                                         </m:dPr>
@@ -11050,7 +11221,7 @@
                                               <m:endChr m:val="|"/>
                                               <m:ctrlPr>
                                                 <a:rPr lang="it-IT" i="1">
-                                                  <a:latin typeface="Cambria Math" panose="02040503050406030204" pitchFamily="18" charset="0"/>
+                                                  <a:latin typeface="Cambria Math" charset="0"/>
                                                 </a:rPr>
                                               </m:ctrlPr>
                                             </m:dPr>
@@ -11060,7 +11231,7 @@
                                                   <m:chr m:val="⃗"/>
                                                   <m:ctrlPr>
                                                     <a:rPr lang="it-IT" b="1" i="1">
-                                                      <a:latin typeface="Cambria Math" panose="02040503050406030204" pitchFamily="18" charset="0"/>
+                                                      <a:latin typeface="Cambria Math" charset="0"/>
                                                     </a:rPr>
                                                   </m:ctrlPr>
                                                 </m:accPr>
@@ -11069,7 +11240,7 @@
                                                     <m:sSubPr>
                                                       <m:ctrlPr>
                                                         <a:rPr lang="it-IT" b="1" i="1">
-                                                          <a:latin typeface="Cambria Math" panose="02040503050406030204" pitchFamily="18" charset="0"/>
+                                                          <a:latin typeface="Cambria Math" charset="0"/>
                                                         </a:rPr>
                                                       </m:ctrlPr>
                                                     </m:sSubPr>
@@ -11103,7 +11274,7 @@
                                                   <m:chr m:val="⃗"/>
                                                   <m:ctrlPr>
                                                     <a:rPr lang="it-IT" b="1" i="1">
-                                                      <a:latin typeface="Cambria Math" panose="02040503050406030204" pitchFamily="18" charset="0"/>
+                                                      <a:latin typeface="Cambria Math" charset="0"/>
                                                     </a:rPr>
                                                   </m:ctrlPr>
                                                 </m:accPr>
@@ -11112,7 +11283,7 @@
                                                     <m:sSubPr>
                                                       <m:ctrlPr>
                                                         <a:rPr lang="it-IT" b="1" i="1">
-                                                          <a:latin typeface="Cambria Math" panose="02040503050406030204" pitchFamily="18" charset="0"/>
+                                                          <a:latin typeface="Cambria Math" charset="0"/>
                                                         </a:rPr>
                                                       </m:ctrlPr>
                                                     </m:sSubPr>
@@ -11151,7 +11322,7 @@
                                     <m:fPr>
                                       <m:ctrlPr>
                                         <a:rPr lang="it-IT" i="1">
-                                          <a:latin typeface="Cambria Math" panose="02040503050406030204" pitchFamily="18" charset="0"/>
+                                          <a:latin typeface="Cambria Math" charset="0"/>
                                         </a:rPr>
                                       </m:ctrlPr>
                                     </m:fPr>
@@ -11160,7 +11331,7 @@
                                         <m:sSupPr>
                                           <m:ctrlPr>
                                             <a:rPr lang="it-IT" i="1">
-                                              <a:latin typeface="Cambria Math" panose="02040503050406030204" pitchFamily="18" charset="0"/>
+                                              <a:latin typeface="Cambria Math" charset="0"/>
                                             </a:rPr>
                                           </m:ctrlPr>
                                         </m:sSupPr>
@@ -11195,7 +11366,7 @@
                                           <m:endChr m:val="|"/>
                                           <m:ctrlPr>
                                             <a:rPr lang="it-IT" i="1">
-                                              <a:latin typeface="Cambria Math" panose="02040503050406030204" pitchFamily="18" charset="0"/>
+                                              <a:latin typeface="Cambria Math" charset="0"/>
                                             </a:rPr>
                                           </m:ctrlPr>
                                         </m:dPr>
@@ -11206,7 +11377,7 @@
                                               <m:endChr m:val="|"/>
                                               <m:ctrlPr>
                                                 <a:rPr lang="it-IT" i="1">
-                                                  <a:latin typeface="Cambria Math" panose="02040503050406030204" pitchFamily="18" charset="0"/>
+                                                  <a:latin typeface="Cambria Math" charset="0"/>
                                                 </a:rPr>
                                               </m:ctrlPr>
                                             </m:dPr>
@@ -11216,7 +11387,7 @@
                                                   <m:chr m:val="⃗"/>
                                                   <m:ctrlPr>
                                                     <a:rPr lang="it-IT" b="1" i="1">
-                                                      <a:latin typeface="Cambria Math" panose="02040503050406030204" pitchFamily="18" charset="0"/>
+                                                      <a:latin typeface="Cambria Math" charset="0"/>
                                                     </a:rPr>
                                                   </m:ctrlPr>
                                                 </m:accPr>
@@ -11225,7 +11396,7 @@
                                                     <m:sSupPr>
                                                       <m:ctrlPr>
                                                         <a:rPr lang="it-IT" b="1" i="1">
-                                                          <a:latin typeface="Cambria Math" panose="02040503050406030204" pitchFamily="18" charset="0"/>
+                                                          <a:latin typeface="Cambria Math" charset="0"/>
                                                         </a:rPr>
                                                       </m:ctrlPr>
                                                     </m:sSupPr>
@@ -11259,7 +11430,7 @@
                                                   <m:chr m:val="⃗"/>
                                                   <m:ctrlPr>
                                                     <a:rPr lang="it-IT" b="1" i="1">
-                                                      <a:latin typeface="Cambria Math" panose="02040503050406030204" pitchFamily="18" charset="0"/>
+                                                      <a:latin typeface="Cambria Math" charset="0"/>
                                                     </a:rPr>
                                                   </m:ctrlPr>
                                                 </m:accPr>
@@ -11268,7 +11439,7 @@
                                                     <m:sSubPr>
                                                       <m:ctrlPr>
                                                         <a:rPr lang="it-IT" b="1" i="1">
-                                                          <a:latin typeface="Cambria Math" panose="02040503050406030204" pitchFamily="18" charset="0"/>
+                                                          <a:latin typeface="Cambria Math" charset="0"/>
                                                         </a:rPr>
                                                       </m:ctrlPr>
                                                     </m:sSubPr>
@@ -11714,7 +11885,7 @@
           <p:cNvPr id="9" name="Rectangle 8">
             <a:extLst>
               <a:ext uri="{FF2B5EF4-FFF2-40B4-BE49-F238E27FC236}">
-                <a16:creationId xmlns:a16="http://schemas.microsoft.com/office/drawing/2014/main" id="{4E4490D0-3672-446A-AC12-B4830333BDDD}"/>
+                <a16:creationId xmlns:a16="http://schemas.microsoft.com/office/drawing/2014/main" xmlns="" id="{4E4490D0-3672-446A-AC12-B4830333BDDD}"/>
               </a:ext>
             </a:extLst>
           </p:cNvPr>
@@ -11766,7 +11937,7 @@
           <p:cNvPr id="11" name="Rectangle 10">
             <a:extLst>
               <a:ext uri="{FF2B5EF4-FFF2-40B4-BE49-F238E27FC236}">
-                <a16:creationId xmlns:a16="http://schemas.microsoft.com/office/drawing/2014/main" id="{39CB82C2-DF65-4EC1-8280-F201D50F570B}"/>
+                <a16:creationId xmlns:a16="http://schemas.microsoft.com/office/drawing/2014/main" xmlns="" id="{39CB82C2-DF65-4EC1-8280-F201D50F570B}"/>
               </a:ext>
             </a:extLst>
           </p:cNvPr>
@@ -11818,7 +11989,7 @@
           <p:cNvPr id="13" name="Straight Connector 12">
             <a:extLst>
               <a:ext uri="{FF2B5EF4-FFF2-40B4-BE49-F238E27FC236}">
-                <a16:creationId xmlns:a16="http://schemas.microsoft.com/office/drawing/2014/main" id="{7E1D4427-852B-4B37-8E76-0E9F1810BA2A}"/>
+                <a16:creationId xmlns:a16="http://schemas.microsoft.com/office/drawing/2014/main" xmlns="" id="{7E1D4427-852B-4B37-8E76-0E9F1810BA2A}"/>
               </a:ext>
             </a:extLst>
           </p:cNvPr>
@@ -11870,7 +12041,7 @@
           <p:cNvPr id="15" name="Rectangle 14">
             <a:extLst>
               <a:ext uri="{FF2B5EF4-FFF2-40B4-BE49-F238E27FC236}">
-                <a16:creationId xmlns:a16="http://schemas.microsoft.com/office/drawing/2014/main" id="{5A1B47C8-47A0-4A88-8830-6DEA3B5DE392}"/>
+                <a16:creationId xmlns:a16="http://schemas.microsoft.com/office/drawing/2014/main" xmlns="" id="{5A1B47C8-47A0-4A88-8830-6DEA3B5DE392}"/>
               </a:ext>
             </a:extLst>
           </p:cNvPr>
@@ -11959,7 +12130,7 @@
           <p:cNvPr id="17" name="Rectangle 16">
             <a:extLst>
               <a:ext uri="{FF2B5EF4-FFF2-40B4-BE49-F238E27FC236}">
-                <a16:creationId xmlns:a16="http://schemas.microsoft.com/office/drawing/2014/main" id="{984BBFDD-E720-4805-A9C8-129FBBF6DD70}"/>
+                <a16:creationId xmlns:a16="http://schemas.microsoft.com/office/drawing/2014/main" xmlns="" id="{984BBFDD-E720-4805-A9C8-129FBBF6DD70}"/>
               </a:ext>
             </a:extLst>
           </p:cNvPr>
@@ -12011,7 +12182,7 @@
           <p:cNvPr id="19" name="Rectangle 18">
             <a:extLst>
               <a:ext uri="{FF2B5EF4-FFF2-40B4-BE49-F238E27FC236}">
-                <a16:creationId xmlns:a16="http://schemas.microsoft.com/office/drawing/2014/main" id="{5AC4BE46-4A77-42FE-9D15-065CDB2F847C}"/>
+                <a16:creationId xmlns:a16="http://schemas.microsoft.com/office/drawing/2014/main" xmlns="" id="{5AC4BE46-4A77-42FE-9D15-065CDB2F847C}"/>
               </a:ext>
             </a:extLst>
           </p:cNvPr>

</xml_diff>

<commit_message>
Considerazioni + parametri iniziali
Considerazioni + parametri iniziali
</commit_message>
<xml_diff>
--- a/IDENTICAZIONE SISTEMA DI CARICHE PUNTIFORMI DA MISURE DI.pptx
+++ b/IDENTICAZIONE SISTEMA DI CARICHE PUNTIFORMI DA MISURE DI.pptx
@@ -5,7 +5,7 @@
     <p:sldMasterId id="2147484292" r:id="rId1"/>
   </p:sldMasterIdLst>
   <p:notesMasterIdLst>
-    <p:notesMasterId r:id="rId17"/>
+    <p:notesMasterId r:id="rId19"/>
   </p:notesMasterIdLst>
   <p:sldIdLst>
     <p:sldId id="256" r:id="rId2"/>
@@ -23,6 +23,8 @@
     <p:sldId id="268" r:id="rId14"/>
     <p:sldId id="269" r:id="rId15"/>
     <p:sldId id="270" r:id="rId16"/>
+    <p:sldId id="271" r:id="rId17"/>
+    <p:sldId id="272" r:id="rId18"/>
   </p:sldIdLst>
   <p:sldSz cx="12192000" cy="6858000"/>
   <p:notesSz cx="6858000" cy="9144000"/>
@@ -211,7 +213,7 @@
           <a:p>
             <a:fld id="{0B626E60-15AC-294D-A4F1-F70323F0F9DF}" type="datetimeFigureOut">
               <a:rPr lang="en-US" smtClean="0"/>
-              <a:t>12/4/17</a:t>
+              <a:t>12/4/2017</a:t>
             </a:fld>
             <a:endParaRPr lang="en-US"/>
           </a:p>
@@ -370,7 +372,7 @@
           <a:p>
             <a:fld id="{B84B1DCE-DD70-5840-A766-ADE0E79E6240}" type="slidenum">
               <a:rPr lang="en-US" smtClean="0"/>
-              <a:t>‹#›</a:t>
+              <a:t>‹N›</a:t>
             </a:fld>
             <a:endParaRPr lang="en-US"/>
           </a:p>
@@ -1140,7 +1142,7 @@
           <a:p>
             <a:fld id="{D400A843-E78D-45FE-BBE0-0DFBB922583B}" type="datetimeFigureOut">
               <a:rPr lang="it-IT" smtClean="0"/>
-              <a:t>04/12/17</a:t>
+              <a:t>04/12/2017</a:t>
             </a:fld>
             <a:endParaRPr lang="it-IT"/>
           </a:p>
@@ -1182,7 +1184,7 @@
           <a:p>
             <a:fld id="{1B29E90A-79A6-4357-BA0E-73A707E87A6D}" type="slidenum">
               <a:rPr lang="it-IT" smtClean="0"/>
-              <a:t>‹#›</a:t>
+              <a:t>‹N›</a:t>
             </a:fld>
             <a:endParaRPr lang="it-IT"/>
           </a:p>
@@ -1343,7 +1345,7 @@
           <a:p>
             <a:fld id="{D400A843-E78D-45FE-BBE0-0DFBB922583B}" type="datetimeFigureOut">
               <a:rPr lang="it-IT" smtClean="0"/>
-              <a:t>04/12/17</a:t>
+              <a:t>04/12/2017</a:t>
             </a:fld>
             <a:endParaRPr lang="it-IT"/>
           </a:p>
@@ -1385,7 +1387,7 @@
           <a:p>
             <a:fld id="{1B29E90A-79A6-4357-BA0E-73A707E87A6D}" type="slidenum">
               <a:rPr lang="it-IT" smtClean="0"/>
-              <a:t>‹#›</a:t>
+              <a:t>‹N›</a:t>
             </a:fld>
             <a:endParaRPr lang="it-IT"/>
           </a:p>
@@ -1594,7 +1596,7 @@
           <a:p>
             <a:fld id="{D400A843-E78D-45FE-BBE0-0DFBB922583B}" type="datetimeFigureOut">
               <a:rPr lang="it-IT" smtClean="0"/>
-              <a:t>04/12/17</a:t>
+              <a:t>04/12/2017</a:t>
             </a:fld>
             <a:endParaRPr lang="it-IT"/>
           </a:p>
@@ -1636,7 +1638,7 @@
           <a:p>
             <a:fld id="{1B29E90A-79A6-4357-BA0E-73A707E87A6D}" type="slidenum">
               <a:rPr lang="it-IT" smtClean="0"/>
-              <a:t>‹#›</a:t>
+              <a:t>‹N›</a:t>
             </a:fld>
             <a:endParaRPr lang="it-IT"/>
           </a:p>
@@ -1763,7 +1765,7 @@
           <a:p>
             <a:fld id="{D400A843-E78D-45FE-BBE0-0DFBB922583B}" type="datetimeFigureOut">
               <a:rPr lang="it-IT" smtClean="0"/>
-              <a:t>04/12/17</a:t>
+              <a:t>04/12/2017</a:t>
             </a:fld>
             <a:endParaRPr lang="it-IT"/>
           </a:p>
@@ -1805,7 +1807,7 @@
           <a:p>
             <a:fld id="{1B29E90A-79A6-4357-BA0E-73A707E87A6D}" type="slidenum">
               <a:rPr lang="it-IT" smtClean="0"/>
-              <a:t>‹#›</a:t>
+              <a:t>‹N›</a:t>
             </a:fld>
             <a:endParaRPr lang="it-IT"/>
           </a:p>
@@ -2101,7 +2103,7 @@
           <a:p>
             <a:fld id="{D400A843-E78D-45FE-BBE0-0DFBB922583B}" type="datetimeFigureOut">
               <a:rPr lang="it-IT" smtClean="0"/>
-              <a:t>04/12/17</a:t>
+              <a:t>04/12/2017</a:t>
             </a:fld>
             <a:endParaRPr lang="it-IT"/>
           </a:p>
@@ -2143,7 +2145,7 @@
           <a:p>
             <a:fld id="{1B29E90A-79A6-4357-BA0E-73A707E87A6D}" type="slidenum">
               <a:rPr lang="it-IT" smtClean="0"/>
-              <a:t>‹#›</a:t>
+              <a:t>‹N›</a:t>
             </a:fld>
             <a:endParaRPr lang="it-IT"/>
           </a:p>
@@ -2371,7 +2373,7 @@
           <a:p>
             <a:fld id="{D400A843-E78D-45FE-BBE0-0DFBB922583B}" type="datetimeFigureOut">
               <a:rPr lang="it-IT" smtClean="0"/>
-              <a:t>04/12/17</a:t>
+              <a:t>04/12/2017</a:t>
             </a:fld>
             <a:endParaRPr lang="it-IT"/>
           </a:p>
@@ -2413,7 +2415,7 @@
           <a:p>
             <a:fld id="{1B29E90A-79A6-4357-BA0E-73A707E87A6D}" type="slidenum">
               <a:rPr lang="it-IT" smtClean="0"/>
-              <a:t>‹#›</a:t>
+              <a:t>‹N›</a:t>
             </a:fld>
             <a:endParaRPr lang="it-IT"/>
           </a:p>
@@ -2745,7 +2747,7 @@
           <a:p>
             <a:fld id="{D400A843-E78D-45FE-BBE0-0DFBB922583B}" type="datetimeFigureOut">
               <a:rPr lang="it-IT" smtClean="0"/>
-              <a:t>04/12/17</a:t>
+              <a:t>04/12/2017</a:t>
             </a:fld>
             <a:endParaRPr lang="it-IT"/>
           </a:p>
@@ -2787,7 +2789,7 @@
           <a:p>
             <a:fld id="{1B29E90A-79A6-4357-BA0E-73A707E87A6D}" type="slidenum">
               <a:rPr lang="it-IT" smtClean="0"/>
-              <a:t>‹#›</a:t>
+              <a:t>‹N›</a:t>
             </a:fld>
             <a:endParaRPr lang="it-IT"/>
           </a:p>
@@ -2858,7 +2860,7 @@
           <a:p>
             <a:fld id="{D400A843-E78D-45FE-BBE0-0DFBB922583B}" type="datetimeFigureOut">
               <a:rPr lang="it-IT" smtClean="0"/>
-              <a:t>04/12/17</a:t>
+              <a:t>04/12/2017</a:t>
             </a:fld>
             <a:endParaRPr lang="it-IT"/>
           </a:p>
@@ -2900,7 +2902,7 @@
           <a:p>
             <a:fld id="{1B29E90A-79A6-4357-BA0E-73A707E87A6D}" type="slidenum">
               <a:rPr lang="it-IT" smtClean="0"/>
-              <a:t>‹#›</a:t>
+              <a:t>‹N›</a:t>
             </a:fld>
             <a:endParaRPr lang="it-IT"/>
           </a:p>
@@ -3024,7 +3026,7 @@
           <a:p>
             <a:fld id="{D400A843-E78D-45FE-BBE0-0DFBB922583B}" type="datetimeFigureOut">
               <a:rPr lang="it-IT" smtClean="0"/>
-              <a:t>04/12/17</a:t>
+              <a:t>04/12/2017</a:t>
             </a:fld>
             <a:endParaRPr lang="it-IT"/>
           </a:p>
@@ -3074,7 +3076,7 @@
           <a:p>
             <a:fld id="{1B29E90A-79A6-4357-BA0E-73A707E87A6D}" type="slidenum">
               <a:rPr lang="it-IT" smtClean="0"/>
-              <a:t>‹#›</a:t>
+              <a:t>‹N›</a:t>
             </a:fld>
             <a:endParaRPr lang="it-IT"/>
           </a:p>
@@ -3373,7 +3375,7 @@
           <a:p>
             <a:fld id="{D400A843-E78D-45FE-BBE0-0DFBB922583B}" type="datetimeFigureOut">
               <a:rPr lang="it-IT" smtClean="0"/>
-              <a:t>04/12/17</a:t>
+              <a:t>04/12/2017</a:t>
             </a:fld>
             <a:endParaRPr lang="it-IT"/>
           </a:p>
@@ -3436,7 +3438,7 @@
           <a:p>
             <a:fld id="{1B29E90A-79A6-4357-BA0E-73A707E87A6D}" type="slidenum">
               <a:rPr lang="it-IT" smtClean="0"/>
-              <a:t>‹#›</a:t>
+              <a:t>‹N›</a:t>
             </a:fld>
             <a:endParaRPr lang="it-IT"/>
           </a:p>
@@ -3747,7 +3749,7 @@
           <a:p>
             <a:fld id="{D400A843-E78D-45FE-BBE0-0DFBB922583B}" type="datetimeFigureOut">
               <a:rPr lang="it-IT" smtClean="0"/>
-              <a:t>04/12/17</a:t>
+              <a:t>04/12/2017</a:t>
             </a:fld>
             <a:endParaRPr lang="it-IT"/>
           </a:p>
@@ -3789,7 +3791,7 @@
           <a:p>
             <a:fld id="{1B29E90A-79A6-4357-BA0E-73A707E87A6D}" type="slidenum">
               <a:rPr lang="it-IT" smtClean="0"/>
-              <a:t>‹#›</a:t>
+              <a:t>‹N›</a:t>
             </a:fld>
             <a:endParaRPr lang="it-IT"/>
           </a:p>
@@ -4029,7 +4031,7 @@
           <a:p>
             <a:fld id="{D400A843-E78D-45FE-BBE0-0DFBB922583B}" type="datetimeFigureOut">
               <a:rPr lang="it-IT" smtClean="0"/>
-              <a:t>04/12/17</a:t>
+              <a:t>04/12/2017</a:t>
             </a:fld>
             <a:endParaRPr lang="it-IT"/>
           </a:p>
@@ -4103,7 +4105,7 @@
           <a:p>
             <a:fld id="{1B29E90A-79A6-4357-BA0E-73A707E87A6D}" type="slidenum">
               <a:rPr lang="it-IT" smtClean="0"/>
-              <a:t>‹#›</a:t>
+              <a:t>‹N›</a:t>
             </a:fld>
             <a:endParaRPr lang="it-IT"/>
           </a:p>
@@ -4828,7 +4830,7 @@
                         <m:fPr>
                           <m:ctrlPr>
                             <a:rPr lang="mr-IN" i="1" smtClean="0">
-                              <a:latin typeface="Cambria Math" charset="0"/>
+                              <a:latin typeface="Cambria Math" panose="02040503050406030204" pitchFamily="18" charset="0"/>
                             </a:rPr>
                           </m:ctrlPr>
                         </m:fPr>
@@ -4838,7 +4840,7 @@
                               <m:degHide m:val="on"/>
                               <m:ctrlPr>
                                 <a:rPr lang="mr-IN" i="1" smtClean="0">
-                                  <a:latin typeface="Cambria Math" charset="0"/>
+                                  <a:latin typeface="Cambria Math" panose="02040503050406030204" pitchFamily="18" charset="0"/>
                                 </a:rPr>
                               </m:ctrlPr>
                             </m:radPr>
@@ -5273,12 +5275,12 @@
         <p:spPr>
           <a:xfrm>
             <a:off x="1097280" y="1988896"/>
-            <a:ext cx="10058400" cy="1359946"/>
+            <a:ext cx="10058400" cy="950232"/>
           </a:xfrm>
         </p:spPr>
         <p:txBody>
           <a:bodyPr>
-            <a:normAutofit/>
+            <a:normAutofit fontScale="92500" lnSpcReduction="20000"/>
           </a:bodyPr>
           <a:lstStyle/>
           <a:p>
@@ -5288,8 +5290,21 @@
                   <a:schemeClr val="tx1"/>
                 </a:solidFill>
               </a:rPr>
-              <a:t>Il primo problema è stato risolto utilizzando le penalità, il valore della funzione viene penalizzato e dunque aumentato drasticamente per i vertici del politopo che ricadono fuori dal vincolo in modo tale da forzare l’algoritmo alla prossima iterazione a ribaltare il politopo all’interno della regione dei punti ammissibili.</a:t>
-            </a:r>
+              <a:t>Il primo problema è stato risolto utilizzando le penalità, il valore della funzione viene penalizzato e dunque aumentato drasticamente per i vertici del politopo che ricadono fuori dal vincolo in modo tale da forzare l’algoritmo alla prossima iterazione a ribaltare il politopo all’interno della regione dei </a:t>
+            </a:r>
+            <a:r>
+              <a:rPr lang="it-IT" smtClean="0">
+                <a:solidFill>
+                  <a:schemeClr val="tx1"/>
+                </a:solidFill>
+              </a:rPr>
+              <a:t>punti ammissibili.</a:t>
+            </a:r>
+            <a:endParaRPr lang="it-IT" dirty="0" smtClean="0">
+              <a:solidFill>
+                <a:schemeClr val="tx1"/>
+              </a:solidFill>
+            </a:endParaRPr>
           </a:p>
         </p:txBody>
       </p:sp>
@@ -5301,8 +5316,8 @@
         </p:nvSpPr>
         <p:spPr>
           <a:xfrm>
-            <a:off x="1097280" y="3930020"/>
-            <a:ext cx="7001692" cy="707886"/>
+            <a:off x="1097279" y="3502509"/>
+            <a:ext cx="10058401" cy="707886"/>
           </a:xfrm>
           <a:prstGeom prst="rect">
             <a:avLst/>
@@ -5361,7 +5376,7 @@
         </p:blipFill>
         <p:spPr>
           <a:xfrm>
-            <a:off x="8001000" y="2887872"/>
+            <a:off x="8001000" y="2864122"/>
             <a:ext cx="3907972" cy="3293366"/>
           </a:xfrm>
           <a:prstGeom prst="rect">
@@ -5431,14 +5446,56 @@
       </p:sp>
       <p:sp>
         <p:nvSpPr>
+          <p:cNvPr id="3" name="Segnaposto contenuto 2"/>
+          <p:cNvSpPr>
+            <a:spLocks noGrp="1"/>
+          </p:cNvSpPr>
+          <p:nvPr>
+            <p:ph idx="1"/>
+          </p:nvPr>
+        </p:nvSpPr>
+        <p:spPr>
+          <a:xfrm>
+            <a:off x="1097280" y="1988896"/>
+            <a:ext cx="10058400" cy="950232"/>
+          </a:xfrm>
+        </p:spPr>
+        <p:txBody>
+          <a:bodyPr>
+            <a:normAutofit/>
+          </a:bodyPr>
+          <a:lstStyle/>
+          <a:p>
+            <a:r>
+              <a:rPr lang="it-IT" dirty="0"/>
+              <a:t>Simplex(@</a:t>
+            </a:r>
+            <a:r>
+              <a:rPr lang="it-IT" dirty="0" err="1"/>
+              <a:t>cost_function</a:t>
+            </a:r>
+            <a:r>
+              <a:rPr lang="it-IT" dirty="0"/>
+              <a:t>, { }, [-.2 .5 .3], .3, </a:t>
+            </a:r>
+            <a:r>
+              <a:rPr lang="it-IT" dirty="0" smtClean="0"/>
+              <a:t>1e-5, 500);</a:t>
+            </a:r>
+            <a:endParaRPr lang="it-IT" dirty="0"/>
+          </a:p>
+        </p:txBody>
+      </p:sp>
+      <p:sp>
+        <p:nvSpPr>
           <p:cNvPr id="4" name="Rectangle 3"/>
           <p:cNvSpPr/>
           <p:nvPr/>
         </p:nvSpPr>
         <p:spPr>
           <a:xfrm>
-            <a:off x="1156527" y="2717948"/>
-            <a:ext cx="5199018" cy="1938992"/>
+            <a:off x="1097280" y="2464012"/>
+            <a:ext cx="5199018" cy="1754326"/>
           </a:xfrm>
           <a:prstGeom prst="rect">
             <a:avLst/>
@@ -5455,7 +5512,7 @@
               <a:buChar char="•"/>
             </a:pPr>
             <a:r>
-              <a:rPr lang="it-IT" sz="2000" dirty="0"/>
+              <a:rPr lang="it-IT" dirty="0"/>
               <a:t>Valore nell’ultimo vertice = 1.6150e-06</a:t>
             </a:r>
           </a:p>
@@ -5465,7 +5522,7 @@
               <a:buChar char="•"/>
             </a:pPr>
             <a:r>
-              <a:rPr lang="it-IT" sz="2000" dirty="0"/>
+              <a:rPr lang="it-IT" dirty="0"/>
               <a:t>risultato =  -0.2799    0.3995    0.4000</a:t>
             </a:r>
           </a:p>
@@ -5475,7 +5532,7 @@
               <a:buChar char="•"/>
             </a:pPr>
             <a:r>
-              <a:rPr lang="it-IT" sz="2000" dirty="0"/>
+              <a:rPr lang="it-IT" dirty="0"/>
               <a:t>iterazioni = 500</a:t>
             </a:r>
           </a:p>
@@ -5485,7 +5542,7 @@
               <a:buChar char="•"/>
             </a:pPr>
             <a:r>
-              <a:rPr lang="it-IT" sz="2000" dirty="0"/>
+              <a:rPr lang="it-IT" dirty="0"/>
               <a:t>dimezzamenti = 13</a:t>
             </a:r>
           </a:p>
@@ -5495,7 +5552,7 @@
               <a:buChar char="•"/>
             </a:pPr>
             <a:r>
-              <a:rPr lang="it-IT" sz="2000" dirty="0"/>
+              <a:rPr lang="it-IT" dirty="0"/>
               <a:t>superficie finale = 7.7591e-04</a:t>
             </a:r>
           </a:p>
@@ -5505,7 +5562,7 @@
               <a:buChar char="•"/>
             </a:pPr>
             <a:r>
-              <a:rPr lang="it-IT" sz="2000" dirty="0"/>
+              <a:rPr lang="it-IT" dirty="0"/>
               <a:t>errore = 0.0201    0.0005    0.0000</a:t>
             </a:r>
           </a:p>
@@ -5517,21 +5574,16 @@
           <p:cNvPicPr/>
           <p:nvPr/>
         </p:nvPicPr>
-        <p:blipFill rotWithShape="1">
-          <a:blip r:embed="rId2">
-            <a:extLst>
-              <a:ext uri="{28A0092B-C50C-407E-A947-70E740481C1C}">
-                <a14:useLocalDpi xmlns:a14="http://schemas.microsoft.com/office/drawing/2010/main" val="0"/>
-              </a:ext>
-            </a:extLst>
-          </a:blip>
-          <a:srcRect l="19652" t="5769" r="17563" b="4000"/>
-          <a:stretch/>
+        <p:blipFill>
+          <a:blip r:embed="rId2"/>
+          <a:stretch>
+            <a:fillRect/>
+          </a:stretch>
         </p:blipFill>
         <p:spPr>
           <a:xfrm>
-            <a:off x="5420686" y="3315723"/>
-            <a:ext cx="2928136" cy="2706444"/>
+            <a:off x="8116037" y="330389"/>
+            <a:ext cx="3552632" cy="3317013"/>
           </a:xfrm>
           <a:prstGeom prst="rect">
             <a:avLst/>
@@ -5546,107 +5598,22 @@
           </p:cNvPicPr>
           <p:nvPr/>
         </p:nvPicPr>
-        <p:blipFill rotWithShape="1">
-          <a:blip r:embed="rId3">
-            <a:extLst>
-              <a:ext uri="{28A0092B-C50C-407E-A947-70E740481C1C}">
-                <a14:useLocalDpi xmlns:a14="http://schemas.microsoft.com/office/drawing/2010/main" val="0"/>
-              </a:ext>
-            </a:extLst>
-          </a:blip>
-          <a:srcRect l="17031" t="10633" r="14866" b="3846"/>
-          <a:stretch/>
+        <p:blipFill>
+          <a:blip r:embed="rId3"/>
+          <a:stretch>
+            <a:fillRect/>
+          </a:stretch>
         </p:blipFill>
         <p:spPr>
           <a:xfrm>
-            <a:off x="8479326" y="3315723"/>
-            <a:ext cx="3712674" cy="2772347"/>
+            <a:off x="5780723" y="3414244"/>
+            <a:ext cx="3454717" cy="2906085"/>
           </a:xfrm>
           <a:prstGeom prst="rect">
             <a:avLst/>
           </a:prstGeom>
         </p:spPr>
       </p:pic>
-      <p:sp>
-        <p:nvSpPr>
-          <p:cNvPr id="8" name="Rectangle 7"/>
-          <p:cNvSpPr/>
-          <p:nvPr/>
-        </p:nvSpPr>
-        <p:spPr>
-          <a:xfrm>
-            <a:off x="1156527" y="1916020"/>
-            <a:ext cx="9261469" cy="400110"/>
-          </a:xfrm>
-          <a:prstGeom prst="rect">
-            <a:avLst/>
-          </a:prstGeom>
-        </p:spPr>
-        <p:txBody>
-          <a:bodyPr wrap="square">
-            <a:spAutoFit/>
-          </a:bodyPr>
-          <a:lstStyle/>
-          <a:p>
-            <a:r>
-              <a:rPr lang="en-US" sz="2000" dirty="0">
-                <a:latin typeface="Courier" charset="0"/>
-              </a:rPr>
-              <a:t>Simplex(@</a:t>
-            </a:r>
-            <a:r>
-              <a:rPr lang="en-US" sz="2000" dirty="0" err="1">
-                <a:latin typeface="Courier" charset="0"/>
-              </a:rPr>
-              <a:t>cost_function</a:t>
-            </a:r>
-            <a:r>
-              <a:rPr lang="en-US" sz="2000" dirty="0">
-                <a:latin typeface="Courier" charset="0"/>
-              </a:rPr>
-              <a:t>, { }, [-.2 .5 .3], .3, 1e-5, 500);</a:t>
-            </a:r>
-            <a:endParaRPr lang="en-US" sz="2000" dirty="0">
-              <a:effectLst/>
-              <a:latin typeface="Courier" charset="0"/>
-            </a:endParaRPr>
-          </a:p>
-        </p:txBody>
-      </p:sp>
-      <p:sp>
-        <p:nvSpPr>
-          <p:cNvPr id="11" name="TextBox 10"/>
-          <p:cNvSpPr txBox="1"/>
-          <p:nvPr/>
-        </p:nvSpPr>
-        <p:spPr>
-          <a:xfrm>
-            <a:off x="1156527" y="2348616"/>
-            <a:ext cx="1097801" cy="400110"/>
-          </a:xfrm>
-          <a:prstGeom prst="rect">
-            <a:avLst/>
-          </a:prstGeom>
-          <a:noFill/>
-        </p:spPr>
-        <p:txBody>
-          <a:bodyPr wrap="none" rtlCol="0">
-            <a:spAutoFit/>
-          </a:bodyPr>
-          <a:lstStyle/>
-          <a:p>
-            <a:r>
-              <a:rPr lang="en-US" sz="2000" dirty="0" err="1" smtClean="0"/>
-              <a:t>Risultati</a:t>
-            </a:r>
-            <a:r>
-              <a:rPr lang="en-US" sz="2000" dirty="0" smtClean="0"/>
-              <a:t>:</a:t>
-            </a:r>
-            <a:endParaRPr lang="en-US" sz="2000" dirty="0"/>
-          </a:p>
-        </p:txBody>
-      </p:sp>
     </p:spTree>
     <p:extLst>
       <p:ext uri="{BB962C8B-B14F-4D97-AF65-F5344CB8AC3E}">
@@ -5709,6 +5676,48 @@
       </p:sp>
       <p:sp>
         <p:nvSpPr>
+          <p:cNvPr id="3" name="Segnaposto contenuto 2"/>
+          <p:cNvSpPr>
+            <a:spLocks noGrp="1"/>
+          </p:cNvSpPr>
+          <p:nvPr>
+            <p:ph idx="1"/>
+          </p:nvPr>
+        </p:nvSpPr>
+        <p:spPr>
+          <a:xfrm>
+            <a:off x="1097280" y="1988896"/>
+            <a:ext cx="10058400" cy="950232"/>
+          </a:xfrm>
+        </p:spPr>
+        <p:txBody>
+          <a:bodyPr>
+            <a:normAutofit/>
+          </a:bodyPr>
+          <a:lstStyle/>
+          <a:p>
+            <a:r>
+              <a:rPr lang="it-IT" dirty="0"/>
+              <a:t>Simplex(@</a:t>
+            </a:r>
+            <a:r>
+              <a:rPr lang="it-IT" dirty="0" err="1"/>
+              <a:t>cost_function</a:t>
+            </a:r>
+            <a:r>
+              <a:rPr lang="it-IT" dirty="0"/>
+              <a:t>, { }, [-.2 .5 .3], .3, </a:t>
+            </a:r>
+            <a:r>
+              <a:rPr lang="it-IT" dirty="0" smtClean="0"/>
+              <a:t>1e-5, 500);</a:t>
+            </a:r>
+            <a:endParaRPr lang="it-IT" dirty="0"/>
+          </a:p>
+        </p:txBody>
+      </p:sp>
+      <p:sp>
+        <p:nvSpPr>
           <p:cNvPr id="4" name="Rectangle 3"/>
           <p:cNvSpPr/>
           <p:nvPr/>
@@ -5716,7 +5725,7 @@
         <p:spPr>
           <a:xfrm>
             <a:off x="1097280" y="3872872"/>
-            <a:ext cx="5199018" cy="1938992"/>
+            <a:ext cx="5199018" cy="1754326"/>
           </a:xfrm>
           <a:prstGeom prst="rect">
             <a:avLst/>
@@ -5733,7 +5742,7 @@
               <a:buChar char="•"/>
             </a:pPr>
             <a:r>
-              <a:rPr lang="it-IT" sz="2000" dirty="0"/>
+              <a:rPr lang="it-IT" dirty="0"/>
               <a:t>Valore nell’ultimo vertice = 0.0012</a:t>
             </a:r>
           </a:p>
@@ -5743,7 +5752,7 @@
               <a:buChar char="•"/>
             </a:pPr>
             <a:r>
-              <a:rPr lang="it-IT" sz="2000" dirty="0"/>
+              <a:rPr lang="it-IT" dirty="0"/>
               <a:t>risultato =   -0.2946    0.4021    0.3999</a:t>
             </a:r>
           </a:p>
@@ -5753,7 +5762,7 @@
               <a:buChar char="•"/>
             </a:pPr>
             <a:r>
-              <a:rPr lang="it-IT" sz="2000" dirty="0"/>
+              <a:rPr lang="it-IT" dirty="0"/>
               <a:t>iterazioni = 500</a:t>
             </a:r>
           </a:p>
@@ -5763,7 +5772,7 @@
               <a:buChar char="•"/>
             </a:pPr>
             <a:r>
-              <a:rPr lang="it-IT" sz="2000" dirty="0"/>
+              <a:rPr lang="it-IT" dirty="0"/>
               <a:t>dimezzamenti = 13</a:t>
             </a:r>
           </a:p>
@@ -5773,7 +5782,7 @@
               <a:buChar char="•"/>
             </a:pPr>
             <a:r>
-              <a:rPr lang="it-IT" sz="2000" dirty="0"/>
+              <a:rPr lang="it-IT" dirty="0"/>
               <a:t>superficie finale = 7.5929e-04</a:t>
             </a:r>
           </a:p>
@@ -5783,14 +5792,14 @@
               <a:buChar char="•"/>
             </a:pPr>
             <a:r>
-              <a:rPr lang="it-IT" sz="2000" dirty="0"/>
+              <a:rPr lang="it-IT" dirty="0"/>
               <a:t>errore = 0.0054    0.0021    0.0001</a:t>
             </a:r>
           </a:p>
         </p:txBody>
       </p:sp>
-      <mc:AlternateContent xmlns:mc="http://schemas.openxmlformats.org/markup-compatibility/2006">
-        <mc:Choice xmlns:a14="http://schemas.microsoft.com/office/drawing/2010/main" Requires="a14">
+      <mc:AlternateContent xmlns:mc="http://schemas.openxmlformats.org/markup-compatibility/2006" xmlns:a14="http://schemas.microsoft.com/office/drawing/2010/main">
+        <mc:Choice Requires="a14">
           <p:sp>
             <p:nvSpPr>
               <p:cNvPr id="7" name="Segnaposto contenuto 2"/>
@@ -5801,8 +5810,8 @@
             </p:nvSpPr>
             <p:spPr>
               <a:xfrm>
-                <a:off x="1156527" y="2494790"/>
-                <a:ext cx="5505530" cy="950232"/>
+                <a:off x="1097280" y="2671104"/>
+                <a:ext cx="10058400" cy="950232"/>
               </a:xfrm>
               <a:prstGeom prst="rect">
                 <a:avLst/>
@@ -6071,7 +6080,7 @@
                       <m:sSupPr>
                         <m:ctrlPr>
                           <a:rPr lang="it-IT" i="1" smtClean="0">
-                            <a:latin typeface="Cambria Math" charset="0"/>
+                            <a:latin typeface="Cambria Math" panose="02040503050406030204" pitchFamily="18" charset="0"/>
                           </a:rPr>
                         </m:ctrlPr>
                       </m:sSupPr>
@@ -6080,20 +6089,20 @@
                           <m:dPr>
                             <m:ctrlPr>
                               <a:rPr lang="it-IT" i="1">
-                                <a:latin typeface="Cambria Math" charset="0"/>
+                                <a:latin typeface="Cambria Math" panose="02040503050406030204" pitchFamily="18" charset="0"/>
                               </a:rPr>
                             </m:ctrlPr>
                           </m:dPr>
                           <m:e>
                             <m:r>
                               <a:rPr lang="it-IT" i="1">
-                                <a:latin typeface="Cambria Math" charset="0"/>
+                                <a:latin typeface="Cambria Math" panose="02040503050406030204" pitchFamily="18" charset="0"/>
                               </a:rPr>
                               <m:t>𝑥</m:t>
                             </m:r>
                             <m:r>
                               <a:rPr lang="it-IT" i="1">
-                                <a:latin typeface="Cambria Math" charset="0"/>
+                                <a:latin typeface="Cambria Math" panose="02040503050406030204" pitchFamily="18" charset="0"/>
                               </a:rPr>
                               <m:t>+0.6</m:t>
                             </m:r>
@@ -6103,7 +6112,7 @@
                       <m:sup>
                         <m:r>
                           <a:rPr lang="it-IT" i="1">
-                            <a:latin typeface="Cambria Math" charset="0"/>
+                            <a:latin typeface="Cambria Math" panose="02040503050406030204" pitchFamily="18" charset="0"/>
                           </a:rPr>
                           <m:t>2</m:t>
                         </m:r>
@@ -6111,7 +6120,7 @@
                     </m:sSup>
                     <m:r>
                       <a:rPr lang="it-IT" i="1">
-                        <a:latin typeface="Cambria Math" charset="0"/>
+                        <a:latin typeface="Cambria Math" panose="02040503050406030204" pitchFamily="18" charset="0"/>
                       </a:rPr>
                       <m:t>+</m:t>
                     </m:r>
@@ -6119,7 +6128,7 @@
                       <m:sSupPr>
                         <m:ctrlPr>
                           <a:rPr lang="it-IT" i="1">
-                            <a:latin typeface="Cambria Math" charset="0"/>
+                            <a:latin typeface="Cambria Math" panose="02040503050406030204" pitchFamily="18" charset="0"/>
                           </a:rPr>
                         </m:ctrlPr>
                       </m:sSupPr>
@@ -6128,20 +6137,20 @@
                           <m:dPr>
                             <m:ctrlPr>
                               <a:rPr lang="it-IT" i="1">
-                                <a:latin typeface="Cambria Math" charset="0"/>
+                                <a:latin typeface="Cambria Math" panose="02040503050406030204" pitchFamily="18" charset="0"/>
                               </a:rPr>
                             </m:ctrlPr>
                           </m:dPr>
                           <m:e>
                             <m:r>
                               <a:rPr lang="it-IT" i="1">
-                                <a:latin typeface="Cambria Math" charset="0"/>
+                                <a:latin typeface="Cambria Math" panose="02040503050406030204" pitchFamily="18" charset="0"/>
                               </a:rPr>
                               <m:t>𝑦</m:t>
                             </m:r>
                             <m:r>
                               <a:rPr lang="it-IT" i="1">
-                                <a:latin typeface="Cambria Math" charset="0"/>
+                                <a:latin typeface="Cambria Math" panose="02040503050406030204" pitchFamily="18" charset="0"/>
                               </a:rPr>
                               <m:t>−0.6</m:t>
                             </m:r>
@@ -6151,7 +6160,7 @@
                       <m:sup>
                         <m:r>
                           <a:rPr lang="it-IT" i="1">
-                            <a:latin typeface="Cambria Math" charset="0"/>
+                            <a:latin typeface="Cambria Math" panose="02040503050406030204" pitchFamily="18" charset="0"/>
                           </a:rPr>
                           <m:t>2</m:t>
                         </m:r>
@@ -6159,7 +6168,7 @@
                     </m:sSup>
                     <m:r>
                       <a:rPr lang="it-IT" i="1">
-                        <a:latin typeface="Cambria Math" charset="0"/>
+                        <a:latin typeface="Cambria Math" panose="02040503050406030204" pitchFamily="18" charset="0"/>
                       </a:rPr>
                       <m:t>+</m:t>
                     </m:r>
@@ -6167,7 +6176,7 @@
                       <m:sSupPr>
                         <m:ctrlPr>
                           <a:rPr lang="it-IT" i="1">
-                            <a:latin typeface="Cambria Math" charset="0"/>
+                            <a:latin typeface="Cambria Math" panose="02040503050406030204" pitchFamily="18" charset="0"/>
                           </a:rPr>
                         </m:ctrlPr>
                       </m:sSupPr>
@@ -6176,20 +6185,20 @@
                           <m:dPr>
                             <m:ctrlPr>
                               <a:rPr lang="it-IT" i="1">
-                                <a:latin typeface="Cambria Math" charset="0"/>
+                                <a:latin typeface="Cambria Math" panose="02040503050406030204" pitchFamily="18" charset="0"/>
                               </a:rPr>
                             </m:ctrlPr>
                           </m:dPr>
                           <m:e>
                             <m:r>
                               <a:rPr lang="it-IT" i="1">
-                                <a:latin typeface="Cambria Math" charset="0"/>
+                                <a:latin typeface="Cambria Math" panose="02040503050406030204" pitchFamily="18" charset="0"/>
                               </a:rPr>
                               <m:t>𝑧</m:t>
                             </m:r>
                             <m:r>
                               <a:rPr lang="it-IT" i="1">
-                                <a:latin typeface="Cambria Math" charset="0"/>
+                                <a:latin typeface="Cambria Math" panose="02040503050406030204" pitchFamily="18" charset="0"/>
                               </a:rPr>
                               <m:t>−0.5</m:t>
                             </m:r>
@@ -6199,7 +6208,7 @@
                       <m:sup>
                         <m:r>
                           <a:rPr lang="it-IT" i="1">
-                            <a:latin typeface="Cambria Math" charset="0"/>
+                            <a:latin typeface="Cambria Math" panose="02040503050406030204" pitchFamily="18" charset="0"/>
                           </a:rPr>
                           <m:t>2</m:t>
                         </m:r>
@@ -6207,7 +6216,7 @@
                     </m:sSup>
                     <m:r>
                       <a:rPr lang="it-IT" i="1">
-                        <a:latin typeface="Cambria Math" charset="0"/>
+                        <a:latin typeface="Cambria Math" panose="02040503050406030204" pitchFamily="18" charset="0"/>
                       </a:rPr>
                       <m:t>−</m:t>
                     </m:r>
@@ -6215,14 +6224,14 @@
                       <m:sSupPr>
                         <m:ctrlPr>
                           <a:rPr lang="it-IT" i="1">
-                            <a:latin typeface="Cambria Math" charset="0"/>
+                            <a:latin typeface="Cambria Math" panose="02040503050406030204" pitchFamily="18" charset="0"/>
                           </a:rPr>
                         </m:ctrlPr>
                       </m:sSupPr>
                       <m:e>
                         <m:r>
                           <a:rPr lang="it-IT" i="1">
-                            <a:latin typeface="Cambria Math" charset="0"/>
+                            <a:latin typeface="Cambria Math" panose="02040503050406030204" pitchFamily="18" charset="0"/>
                           </a:rPr>
                           <m:t>1.2</m:t>
                         </m:r>
@@ -6230,7 +6239,7 @@
                       <m:sup>
                         <m:r>
                           <a:rPr lang="it-IT" i="1">
-                            <a:latin typeface="Cambria Math" charset="0"/>
+                            <a:latin typeface="Cambria Math" panose="02040503050406030204" pitchFamily="18" charset="0"/>
                           </a:rPr>
                           <m:t>2</m:t>
                         </m:r>
@@ -6238,7 +6247,7 @@
                     </m:sSup>
                     <m:r>
                       <a:rPr lang="it-IT" i="1">
-                        <a:latin typeface="Cambria Math" charset="0"/>
+                        <a:latin typeface="Cambria Math" panose="02040503050406030204" pitchFamily="18" charset="0"/>
                       </a:rPr>
                       <m:t>&lt;0 </m:t>
                     </m:r>
@@ -6249,7 +6258,7 @@
             </p:txBody>
           </p:sp>
         </mc:Choice>
-        <mc:Fallback>
+        <mc:Fallback xmlns="">
           <p:sp>
             <p:nvSpPr>
               <p:cNvPr id="7" name="Segnaposto contenuto 2"/>
@@ -6260,16 +6269,16 @@
             </p:nvSpPr>
             <p:spPr>
               <a:xfrm>
-                <a:off x="1156527" y="2494790"/>
-                <a:ext cx="5505530" cy="950232"/>
+                <a:off x="1097280" y="2671104"/>
+                <a:ext cx="10058400" cy="950232"/>
               </a:xfrm>
               <a:prstGeom prst="rect">
                 <a:avLst/>
               </a:prstGeom>
-              <a:blipFill rotWithShape="0">
+              <a:blipFill>
                 <a:blip r:embed="rId2"/>
                 <a:stretch>
-                  <a:fillRect l="-1218" t="-6410" b="-39744"/>
+                  <a:fillRect l="-606" t="-6410"/>
                 </a:stretch>
               </a:blipFill>
             </p:spPr>
@@ -6278,7 +6287,7 @@
               <a:lstStyle/>
               <a:p>
                 <a:r>
-                  <a:rPr lang="en-US">
+                  <a:rPr lang="it-IT">
                     <a:noFill/>
                   </a:rPr>
                   <a:t> </a:t>
@@ -6295,107 +6304,21 @@
           <p:nvPr/>
         </p:nvPicPr>
         <p:blipFill>
-          <a:blip r:embed="rId3">
-            <a:extLst>
-              <a:ext uri="{28A0092B-C50C-407E-A947-70E740481C1C}">
-                <a14:useLocalDpi xmlns:a14="http://schemas.microsoft.com/office/drawing/2010/main" val="0"/>
-              </a:ext>
-            </a:extLst>
-          </a:blip>
+          <a:blip r:embed="rId3"/>
           <a:stretch>
             <a:fillRect/>
           </a:stretch>
         </p:blipFill>
         <p:spPr>
           <a:xfrm>
-            <a:off x="6804561" y="2588822"/>
-            <a:ext cx="5078681" cy="3681350"/>
+            <a:off x="7169150" y="1737360"/>
+            <a:ext cx="5022850" cy="4549775"/>
           </a:xfrm>
           <a:prstGeom prst="rect">
             <a:avLst/>
           </a:prstGeom>
         </p:spPr>
       </p:pic>
-      <p:sp>
-        <p:nvSpPr>
-          <p:cNvPr id="9" name="Rectangle 8"/>
-          <p:cNvSpPr/>
-          <p:nvPr/>
-        </p:nvSpPr>
-        <p:spPr>
-          <a:xfrm>
-            <a:off x="1156527" y="1916020"/>
-            <a:ext cx="9261469" cy="400110"/>
-          </a:xfrm>
-          <a:prstGeom prst="rect">
-            <a:avLst/>
-          </a:prstGeom>
-        </p:spPr>
-        <p:txBody>
-          <a:bodyPr wrap="square">
-            <a:spAutoFit/>
-          </a:bodyPr>
-          <a:lstStyle/>
-          <a:p>
-            <a:r>
-              <a:rPr lang="en-US" sz="2000" dirty="0">
-                <a:latin typeface="Courier" charset="0"/>
-              </a:rPr>
-              <a:t>Simplex(@</a:t>
-            </a:r>
-            <a:r>
-              <a:rPr lang="en-US" sz="2000" dirty="0" err="1">
-                <a:latin typeface="Courier" charset="0"/>
-              </a:rPr>
-              <a:t>cost_function</a:t>
-            </a:r>
-            <a:r>
-              <a:rPr lang="en-US" sz="2000" dirty="0">
-                <a:latin typeface="Courier" charset="0"/>
-              </a:rPr>
-              <a:t>, { }, [-.2 .5 .3], .3, 1e-5, 500);</a:t>
-            </a:r>
-            <a:endParaRPr lang="en-US" sz="2000" dirty="0">
-              <a:effectLst/>
-              <a:latin typeface="Courier" charset="0"/>
-            </a:endParaRPr>
-          </a:p>
-        </p:txBody>
-      </p:sp>
-      <p:sp>
-        <p:nvSpPr>
-          <p:cNvPr id="6" name="TextBox 5"/>
-          <p:cNvSpPr txBox="1"/>
-          <p:nvPr/>
-        </p:nvSpPr>
-        <p:spPr>
-          <a:xfrm>
-            <a:off x="1156527" y="3545722"/>
-            <a:ext cx="1097801" cy="400110"/>
-          </a:xfrm>
-          <a:prstGeom prst="rect">
-            <a:avLst/>
-          </a:prstGeom>
-          <a:noFill/>
-        </p:spPr>
-        <p:txBody>
-          <a:bodyPr wrap="none" rtlCol="0">
-            <a:spAutoFit/>
-          </a:bodyPr>
-          <a:lstStyle/>
-          <a:p>
-            <a:r>
-              <a:rPr lang="en-US" sz="2000" dirty="0" err="1" smtClean="0"/>
-              <a:t>Risultati</a:t>
-            </a:r>
-            <a:r>
-              <a:rPr lang="en-US" sz="2000" dirty="0" smtClean="0"/>
-              <a:t>:</a:t>
-            </a:r>
-            <a:endParaRPr lang="en-US" sz="2000" dirty="0"/>
-          </a:p>
-        </p:txBody>
-      </p:sp>
     </p:spTree>
     <p:extLst>
       <p:ext uri="{BB962C8B-B14F-4D97-AF65-F5344CB8AC3E}">
@@ -6458,14 +6381,59 @@
       </p:sp>
       <p:sp>
         <p:nvSpPr>
+          <p:cNvPr id="3" name="Segnaposto contenuto 2"/>
+          <p:cNvSpPr>
+            <a:spLocks noGrp="1"/>
+          </p:cNvSpPr>
+          <p:nvPr>
+            <p:ph idx="1"/>
+          </p:nvPr>
+        </p:nvSpPr>
+        <p:spPr>
+          <a:xfrm>
+            <a:off x="1097280" y="1988896"/>
+            <a:ext cx="10058400" cy="950232"/>
+          </a:xfrm>
+        </p:spPr>
+        <p:txBody>
+          <a:bodyPr>
+            <a:normAutofit/>
+          </a:bodyPr>
+          <a:lstStyle/>
+          <a:p>
+            <a:r>
+              <a:rPr lang="it-IT" dirty="0"/>
+              <a:t>Simplex(@</a:t>
+            </a:r>
+            <a:r>
+              <a:rPr lang="it-IT" dirty="0" err="1"/>
+              <a:t>cost_function</a:t>
+            </a:r>
+            <a:r>
+              <a:rPr lang="it-IT" dirty="0"/>
+              <a:t>, {</a:t>
+            </a:r>
+            <a:r>
+              <a:rPr lang="it-IT" dirty="0" smtClean="0"/>
+              <a:t>}, [-.3 .4 .4], .</a:t>
+            </a:r>
+            <a:r>
+              <a:rPr lang="it-IT" dirty="0"/>
+              <a:t>3, 1e-5, 500);</a:t>
+            </a:r>
+          </a:p>
+        </p:txBody>
+      </p:sp>
+      <p:sp>
+        <p:nvSpPr>
           <p:cNvPr id="4" name="Rectangle 3"/>
           <p:cNvSpPr/>
           <p:nvPr/>
         </p:nvSpPr>
         <p:spPr>
           <a:xfrm>
-            <a:off x="1097279" y="3238815"/>
-            <a:ext cx="4887884" cy="1938992"/>
+            <a:off x="1097280" y="2858805"/>
+            <a:ext cx="5199018" cy="1754326"/>
           </a:xfrm>
           <a:prstGeom prst="rect">
             <a:avLst/>
@@ -6482,7 +6450,7 @@
               <a:buChar char="•"/>
             </a:pPr>
             <a:r>
-              <a:rPr lang="it-IT" sz="2000" dirty="0"/>
+              <a:rPr lang="it-IT" dirty="0"/>
               <a:t>Valore nell’ultimo vertice = 0</a:t>
             </a:r>
           </a:p>
@@ -6492,7 +6460,7 @@
               <a:buChar char="•"/>
             </a:pPr>
             <a:r>
-              <a:rPr lang="it-IT" sz="2000" dirty="0"/>
+              <a:rPr lang="it-IT" dirty="0"/>
               <a:t>Risultato  = -0.3000    0.4000    0.4000</a:t>
             </a:r>
           </a:p>
@@ -6502,7 +6470,7 @@
               <a:buChar char="•"/>
             </a:pPr>
             <a:r>
-              <a:rPr lang="it-IT" sz="2000" dirty="0"/>
+              <a:rPr lang="it-IT" dirty="0"/>
               <a:t>iterazioni = 35</a:t>
             </a:r>
           </a:p>
@@ -6512,7 +6480,7 @@
               <a:buChar char="•"/>
             </a:pPr>
             <a:r>
-              <a:rPr lang="it-IT" sz="2000" dirty="0"/>
+              <a:rPr lang="it-IT" dirty="0"/>
               <a:t>dimezzamenti = 20</a:t>
             </a:r>
           </a:p>
@@ -6522,7 +6490,7 @@
               <a:buChar char="•"/>
             </a:pPr>
             <a:r>
-              <a:rPr lang="it-IT" sz="2000" dirty="0"/>
+              <a:rPr lang="it-IT" dirty="0"/>
               <a:t>superficie finale = 6.7356e-06</a:t>
             </a:r>
           </a:p>
@@ -6532,7 +6500,7 @@
               <a:buChar char="•"/>
             </a:pPr>
             <a:r>
-              <a:rPr lang="it-IT" sz="2000" dirty="0"/>
+              <a:rPr lang="it-IT" dirty="0"/>
               <a:t>errore = 0     0     0</a:t>
             </a:r>
           </a:p>
@@ -6544,37 +6512,122 @@
           <p:cNvPicPr/>
           <p:nvPr/>
         </p:nvPicPr>
-        <p:blipFill rotWithShape="1">
-          <a:blip r:embed="rId2">
-            <a:extLst>
-              <a:ext uri="{28A0092B-C50C-407E-A947-70E740481C1C}">
-                <a14:useLocalDpi xmlns:a14="http://schemas.microsoft.com/office/drawing/2010/main" val="0"/>
-              </a:ext>
-            </a:extLst>
-          </a:blip>
-          <a:srcRect l="16081" t="8764" r="15127" b="4562"/>
-          <a:stretch/>
+        <p:blipFill>
+          <a:blip r:embed="rId2"/>
+          <a:stretch>
+            <a:fillRect/>
+          </a:stretch>
         </p:blipFill>
         <p:spPr>
           <a:xfrm>
-            <a:off x="7274299" y="2660071"/>
-            <a:ext cx="4161637" cy="3431969"/>
+            <a:off x="6788537" y="1737360"/>
+            <a:ext cx="5403463" cy="4592320"/>
           </a:xfrm>
           <a:prstGeom prst="rect">
             <a:avLst/>
           </a:prstGeom>
         </p:spPr>
       </p:pic>
-      <p:sp>
-        <p:nvSpPr>
-          <p:cNvPr id="5" name="Rectangle 4"/>
+    </p:spTree>
+    <p:extLst>
+      <p:ext uri="{BB962C8B-B14F-4D97-AF65-F5344CB8AC3E}">
+        <p14:creationId xmlns:p14="http://schemas.microsoft.com/office/powerpoint/2010/main" val="1840755104"/>
+      </p:ext>
+    </p:extLst>
+  </p:cSld>
+  <p:clrMapOvr>
+    <a:masterClrMapping/>
+  </p:clrMapOvr>
+  <p:timing>
+    <p:tnLst>
+      <p:par>
+        <p:cTn id="1" dur="indefinite" restart="never" nodeType="tmRoot"/>
+      </p:par>
+    </p:tnLst>
+  </p:timing>
+</p:sld>
+</file>
+
+<file path=ppt/slides/slide16.xml><?xml version="1.0" encoding="utf-8"?>
+<p:sld xmlns:a="http://schemas.openxmlformats.org/drawingml/2006/main" xmlns:r="http://schemas.openxmlformats.org/officeDocument/2006/relationships" xmlns:p="http://schemas.openxmlformats.org/presentationml/2006/main">
+  <p:cSld>
+    <p:spTree>
+      <p:nvGrpSpPr>
+        <p:cNvPr id="1" name=""/>
+        <p:cNvGrpSpPr/>
+        <p:nvPr/>
+      </p:nvGrpSpPr>
+      <p:grpSpPr>
+        <a:xfrm>
+          <a:off x="0" y="0"/>
+          <a:ext cx="0" cy="0"/>
+          <a:chOff x="0" y="0"/>
+          <a:chExt cx="0" cy="0"/>
+        </a:xfrm>
+      </p:grpSpPr>
+      <p:sp>
+        <p:nvSpPr>
+          <p:cNvPr id="2" name="Titolo 1"/>
+          <p:cNvSpPr>
+            <a:spLocks noGrp="1"/>
+          </p:cNvSpPr>
+          <p:nvPr>
+            <p:ph type="title"/>
+          </p:nvPr>
+        </p:nvSpPr>
+        <p:spPr/>
+        <p:txBody>
+          <a:bodyPr/>
+          <a:lstStyle/>
+          <a:p>
+            <a:r>
+              <a:rPr lang="it-IT" dirty="0" smtClean="0"/>
+              <a:t>CONSIDERAZIONI</a:t>
+            </a:r>
+            <a:endParaRPr lang="it-IT" dirty="0"/>
+          </a:p>
+        </p:txBody>
+      </p:sp>
+      <p:sp>
+        <p:nvSpPr>
+          <p:cNvPr id="3" name="Segnaposto contenuto 2"/>
+          <p:cNvSpPr>
+            <a:spLocks noGrp="1"/>
+          </p:cNvSpPr>
+          <p:nvPr>
+            <p:ph idx="1"/>
+          </p:nvPr>
+        </p:nvSpPr>
+        <p:spPr>
+          <a:xfrm>
+            <a:off x="1149530" y="1858284"/>
+            <a:ext cx="10006149" cy="2060574"/>
+          </a:xfrm>
+        </p:spPr>
+        <p:txBody>
+          <a:bodyPr>
+            <a:normAutofit/>
+          </a:bodyPr>
+          <a:lstStyle/>
+          <a:p>
+            <a:r>
+              <a:rPr lang="it-IT" dirty="0" smtClean="0"/>
+              <a:t>Il simplesso è un algoritmo di ordine zero, volendo utilizzare un algoritmo di ordine uno e osservando che la funzione di costo nel nostro caso presenta un solo minimo zero, potremmo utilizzare il metodo Quasi-Newton nel quale usufruiamo dell’informazione sulla pendenza grazie al calcolo della matrice Hessiana della funzione obiettivo.</a:t>
+            </a:r>
+            <a:endParaRPr lang="it-IT" dirty="0" smtClean="0"/>
+          </a:p>
+        </p:txBody>
+      </p:sp>
+      <p:sp>
+        <p:nvSpPr>
+          <p:cNvPr id="4" name="Rectangle 3"/>
           <p:cNvSpPr/>
           <p:nvPr/>
         </p:nvSpPr>
         <p:spPr>
           <a:xfrm>
-            <a:off x="1097279" y="1887043"/>
-            <a:ext cx="8794865" cy="400110"/>
+            <a:off x="1123405" y="4042007"/>
+            <a:ext cx="10006149" cy="1631216"/>
           </a:xfrm>
           <a:prstGeom prst="rect">
             <a:avLst/>
@@ -6587,80 +6640,332 @@
           <a:lstStyle/>
           <a:p>
             <a:r>
-              <a:rPr lang="en-US" sz="2000" dirty="0">
-                <a:latin typeface="Courier" charset="0"/>
-              </a:rPr>
-              <a:t>Simplex(@</a:t>
-            </a:r>
-            <a:r>
-              <a:rPr lang="en-US" sz="2000" dirty="0" err="1" smtClean="0">
-                <a:latin typeface="Courier" charset="0"/>
-              </a:rPr>
-              <a:t>cost_function</a:t>
-            </a:r>
-            <a:r>
-              <a:rPr lang="en-US" sz="2000" dirty="0" smtClean="0">
-                <a:latin typeface="Courier" charset="0"/>
-              </a:rPr>
-              <a:t>, </a:t>
-            </a:r>
-            <a:r>
-              <a:rPr lang="en-US" sz="2000" dirty="0">
-                <a:latin typeface="Courier" charset="0"/>
-              </a:rPr>
-              <a:t>{}, [-.3 .4 .4], .3, 1e-5, 500</a:t>
-            </a:r>
-            <a:r>
-              <a:rPr lang="en-US" sz="2000" dirty="0" smtClean="0">
-                <a:latin typeface="Courier" charset="0"/>
-              </a:rPr>
-              <a:t>); </a:t>
-            </a:r>
-            <a:endParaRPr lang="en-US" sz="2000" dirty="0">
-              <a:effectLst/>
-              <a:latin typeface="Courier" charset="0"/>
-            </a:endParaRPr>
+              <a:rPr lang="it-IT" sz="2000" dirty="0" smtClean="0"/>
+              <a:t>Il numero minimo di misuratori deve essere pari al numero di incognite del nostro problema per far si che il sistema sia determinato. Nonostante ciò ci serviamo di molti più misuratori nell’eventualità non ideale che le misurazioni siano affette da rumore al fine di minimizzare correttamente come se stessimo filtrando tale rumore grazie alla media delle misurazioni in fase di normalizzazione.</a:t>
+            </a:r>
+            <a:endParaRPr lang="it-IT" sz="2000" dirty="0"/>
           </a:p>
         </p:txBody>
       </p:sp>
-      <p:sp>
-        <p:nvSpPr>
-          <p:cNvPr id="7" name="TextBox 6"/>
-          <p:cNvSpPr txBox="1"/>
-          <p:nvPr/>
+    </p:spTree>
+    <p:extLst>
+      <p:ext uri="{BB962C8B-B14F-4D97-AF65-F5344CB8AC3E}">
+        <p14:creationId xmlns:p14="http://schemas.microsoft.com/office/powerpoint/2010/main" val="85395014"/>
+      </p:ext>
+    </p:extLst>
+  </p:cSld>
+  <p:clrMapOvr>
+    <a:masterClrMapping/>
+  </p:clrMapOvr>
+  <p:timing>
+    <p:tnLst>
+      <p:par>
+        <p:cTn id="1" dur="indefinite" restart="never" nodeType="tmRoot"/>
+      </p:par>
+    </p:tnLst>
+  </p:timing>
+</p:sld>
+</file>
+
+<file path=ppt/slides/slide17.xml><?xml version="1.0" encoding="utf-8"?>
+<p:sld xmlns:a="http://schemas.openxmlformats.org/drawingml/2006/main" xmlns:r="http://schemas.openxmlformats.org/officeDocument/2006/relationships" xmlns:p="http://schemas.openxmlformats.org/presentationml/2006/main">
+  <p:cSld>
+    <p:spTree>
+      <p:nvGrpSpPr>
+        <p:cNvPr id="1" name=""/>
+        <p:cNvGrpSpPr/>
+        <p:nvPr/>
+      </p:nvGrpSpPr>
+      <p:grpSpPr>
+        <a:xfrm>
+          <a:off x="0" y="0"/>
+          <a:ext cx="0" cy="0"/>
+          <a:chOff x="0" y="0"/>
+          <a:chExt cx="0" cy="0"/>
+        </a:xfrm>
+      </p:grpSpPr>
+      <p:sp>
+        <p:nvSpPr>
+          <p:cNvPr id="2" name="Titolo 1"/>
+          <p:cNvSpPr>
+            <a:spLocks noGrp="1"/>
+          </p:cNvSpPr>
+          <p:nvPr>
+            <p:ph type="title"/>
+          </p:nvPr>
         </p:nvSpPr>
         <p:spPr>
           <a:xfrm>
-            <a:off x="1097279" y="2893563"/>
-            <a:ext cx="1155509" cy="400110"/>
+            <a:off x="1097280" y="286604"/>
+            <a:ext cx="10058400" cy="797614"/>
+          </a:xfrm>
+        </p:spPr>
+        <p:txBody>
+          <a:bodyPr/>
+          <a:lstStyle/>
+          <a:p>
+            <a:r>
+              <a:rPr lang="it-IT" dirty="0" smtClean="0"/>
+              <a:t>CONSIDERAZIONI (PARAMETRI INIZIALI)</a:t>
+            </a:r>
+            <a:endParaRPr lang="it-IT" dirty="0"/>
+          </a:p>
+        </p:txBody>
+      </p:sp>
+      <p:sp>
+        <p:nvSpPr>
+          <p:cNvPr id="5" name="Rettangolo 4"/>
+          <p:cNvSpPr/>
+          <p:nvPr/>
+        </p:nvSpPr>
+        <p:spPr>
+          <a:xfrm>
+            <a:off x="770709" y="1541417"/>
+            <a:ext cx="10802982" cy="548640"/>
           </a:xfrm>
           <a:prstGeom prst="rect">
             <a:avLst/>
           </a:prstGeom>
-          <a:noFill/>
+          <a:ln>
+            <a:solidFill>
+              <a:schemeClr val="bg1"/>
+            </a:solidFill>
+          </a:ln>
+        </p:spPr>
+        <p:style>
+          <a:lnRef idx="2">
+            <a:schemeClr val="dk1"/>
+          </a:lnRef>
+          <a:fillRef idx="1">
+            <a:schemeClr val="lt1"/>
+          </a:fillRef>
+          <a:effectRef idx="0">
+            <a:schemeClr val="dk1"/>
+          </a:effectRef>
+          <a:fontRef idx="minor">
+            <a:schemeClr val="dk1"/>
+          </a:fontRef>
+        </p:style>
+        <p:txBody>
+          <a:bodyPr rtlCol="0" anchor="ctr"/>
+          <a:lstStyle/>
+          <a:p>
+            <a:pPr algn="ctr"/>
+            <a:endParaRPr lang="it-IT"/>
+          </a:p>
+        </p:txBody>
+      </p:sp>
+      <p:sp>
+        <p:nvSpPr>
+          <p:cNvPr id="3" name="Segnaposto contenuto 2"/>
+          <p:cNvSpPr>
+            <a:spLocks noGrp="1"/>
+          </p:cNvSpPr>
+          <p:nvPr>
+            <p:ph idx="1"/>
+          </p:nvPr>
+        </p:nvSpPr>
+        <p:spPr>
+          <a:xfrm>
+            <a:off x="1149531" y="1214846"/>
+            <a:ext cx="10006149" cy="4911634"/>
+          </a:xfrm>
         </p:spPr>
         <p:txBody>
-          <a:bodyPr wrap="none" rtlCol="0">
-            <a:spAutoFit/>
+          <a:bodyPr>
+            <a:normAutofit fontScale="92500" lnSpcReduction="20000"/>
           </a:bodyPr>
           <a:lstStyle/>
           <a:p>
-            <a:r>
-              <a:rPr lang="en-US" sz="2000" dirty="0" err="1" smtClean="0"/>
-              <a:t>Risultati</a:t>
-            </a:r>
-            <a:r>
-              <a:rPr lang="en-US" sz="2000" dirty="0" smtClean="0"/>
-              <a:t>: </a:t>
-            </a:r>
-            <a:endParaRPr lang="en-US" sz="2000" dirty="0"/>
+            <a:pPr>
+              <a:buFont typeface="Arial" panose="020B0604020202020204" pitchFamily="34" charset="0"/>
+              <a:buChar char="•"/>
+            </a:pPr>
+            <a:r>
+              <a:rPr lang="it-IT" dirty="0" smtClean="0"/>
+              <a:t>Superficie iniziale del politopo</a:t>
+            </a:r>
+          </a:p>
+          <a:p>
+            <a:pPr lvl="1">
+              <a:buFont typeface="Arial" panose="020B0604020202020204" pitchFamily="34" charset="0"/>
+              <a:buChar char="•"/>
+            </a:pPr>
+            <a:r>
+              <a:rPr lang="it-IT" dirty="0" smtClean="0"/>
+              <a:t>Diminuzione: </a:t>
+            </a:r>
+          </a:p>
+          <a:p>
+            <a:pPr lvl="2">
+              <a:buFont typeface="Arial" panose="020B0604020202020204" pitchFamily="34" charset="0"/>
+              <a:buChar char="•"/>
+            </a:pPr>
+            <a:r>
+              <a:rPr lang="it-IT" dirty="0" smtClean="0"/>
+              <a:t>Aumentano le iterazioni necessarie ad avvicinarsi al minimo</a:t>
+            </a:r>
+          </a:p>
+          <a:p>
+            <a:pPr lvl="2">
+              <a:buFont typeface="Arial" panose="020B0604020202020204" pitchFamily="34" charset="0"/>
+              <a:buChar char="•"/>
+            </a:pPr>
+            <a:r>
+              <a:rPr lang="it-IT" dirty="0" smtClean="0"/>
+              <a:t>Veloce se il politopo parte vicino al minimo</a:t>
+            </a:r>
+          </a:p>
+          <a:p>
+            <a:pPr lvl="2">
+              <a:buFont typeface="Arial" panose="020B0604020202020204" pitchFamily="34" charset="0"/>
+              <a:buChar char="•"/>
+            </a:pPr>
+            <a:r>
+              <a:rPr lang="it-IT" dirty="0" smtClean="0"/>
+              <a:t>Lento se il politopo parte lontano dal minimo</a:t>
+            </a:r>
+          </a:p>
+          <a:p>
+            <a:pPr lvl="1">
+              <a:buFont typeface="Arial" panose="020B0604020202020204" pitchFamily="34" charset="0"/>
+              <a:buChar char="•"/>
+            </a:pPr>
+            <a:r>
+              <a:rPr lang="it-IT" dirty="0" smtClean="0"/>
+              <a:t>Aumento:</a:t>
+            </a:r>
+          </a:p>
+          <a:p>
+            <a:pPr lvl="2">
+              <a:buFont typeface="Arial" panose="020B0604020202020204" pitchFamily="34" charset="0"/>
+              <a:buChar char="•"/>
+            </a:pPr>
+            <a:r>
+              <a:rPr lang="it-IT" dirty="0" smtClean="0"/>
+              <a:t>Aumentano le iterazioni dovute al rilevamento della condizione di dimezzamento con ribaltamenti inutili</a:t>
+            </a:r>
+          </a:p>
+          <a:p>
+            <a:pPr lvl="2">
+              <a:buFont typeface="Arial" panose="020B0604020202020204" pitchFamily="34" charset="0"/>
+              <a:buChar char="•"/>
+            </a:pPr>
+            <a:r>
+              <a:rPr lang="it-IT" dirty="0" smtClean="0"/>
+              <a:t>Veloce se il politopo parte lontano dal minimo, i dimezzamenti sul pivot (vertice minimo) permettono spostamento veloci</a:t>
+            </a:r>
+          </a:p>
+          <a:p>
+            <a:pPr lvl="2">
+              <a:buFont typeface="Arial" panose="020B0604020202020204" pitchFamily="34" charset="0"/>
+              <a:buChar char="•"/>
+            </a:pPr>
+            <a:r>
+              <a:rPr lang="it-IT" dirty="0" smtClean="0"/>
+              <a:t>Lento se il politopo parte vicino al minimo, il numero di dimezzamenti e dunque di ribaltamenti inutili è maggiore</a:t>
+            </a:r>
+          </a:p>
+          <a:p>
+            <a:pPr>
+              <a:buFont typeface="Arial" panose="020B0604020202020204" pitchFamily="34" charset="0"/>
+              <a:buChar char="•"/>
+            </a:pPr>
+            <a:r>
+              <a:rPr lang="it-IT" dirty="0" smtClean="0"/>
+              <a:t>Posizione iniziale</a:t>
+            </a:r>
+          </a:p>
+          <a:p>
+            <a:pPr lvl="1">
+              <a:buFont typeface="Arial" panose="020B0604020202020204" pitchFamily="34" charset="0"/>
+              <a:buChar char="•"/>
+            </a:pPr>
+            <a:r>
+              <a:rPr lang="it-IT" dirty="0" smtClean="0"/>
+              <a:t>L’algoritmo converge più lentamente al minimo se è lontano da questo</a:t>
+            </a:r>
+          </a:p>
+          <a:p>
+            <a:pPr>
+              <a:buFont typeface="Arial" panose="020B0604020202020204" pitchFamily="34" charset="0"/>
+              <a:buChar char="•"/>
+            </a:pPr>
+            <a:r>
+              <a:rPr lang="it-IT" dirty="0" smtClean="0"/>
+              <a:t>Condizione di arresto sulla superficie minima del politopo</a:t>
+            </a:r>
+          </a:p>
+          <a:p>
+            <a:pPr lvl="1">
+              <a:buFont typeface="Arial" panose="020B0604020202020204" pitchFamily="34" charset="0"/>
+              <a:buChar char="•"/>
+            </a:pPr>
+            <a:r>
+              <a:rPr lang="it-IT" dirty="0" smtClean="0"/>
+              <a:t>Condiziona la precisione dell’approssimazione se troppo alto</a:t>
+            </a:r>
+          </a:p>
+          <a:p>
+            <a:pPr lvl="1">
+              <a:buFont typeface="Arial" panose="020B0604020202020204" pitchFamily="34" charset="0"/>
+              <a:buChar char="•"/>
+            </a:pPr>
+            <a:r>
+              <a:rPr lang="it-IT" dirty="0" smtClean="0"/>
+              <a:t>Se troppo basso causa un numero eccessivo di iterazioni, inutili se non si ha bisogno di approssimazioni raffinate</a:t>
+            </a:r>
+          </a:p>
+          <a:p>
+            <a:pPr>
+              <a:buFont typeface="Arial" panose="020B0604020202020204" pitchFamily="34" charset="0"/>
+              <a:buChar char="•"/>
+            </a:pPr>
+            <a:r>
+              <a:rPr lang="it-IT" dirty="0" smtClean="0"/>
+              <a:t>Condizione di arresto su numero di iterazioni</a:t>
+            </a:r>
+          </a:p>
+          <a:p>
+            <a:pPr lvl="1">
+              <a:buFont typeface="Arial" panose="020B0604020202020204" pitchFamily="34" charset="0"/>
+              <a:buChar char="•"/>
+            </a:pPr>
+            <a:r>
+              <a:rPr lang="it-IT" dirty="0" smtClean="0"/>
+              <a:t>Condiziona la precisione dell’approssimazione se troppo basso</a:t>
+            </a:r>
+          </a:p>
+          <a:p>
+            <a:pPr lvl="1">
+              <a:buFont typeface="Arial" panose="020B0604020202020204" pitchFamily="34" charset="0"/>
+              <a:buChar char="•"/>
+            </a:pPr>
+            <a:r>
+              <a:rPr lang="it-IT" dirty="0" smtClean="0"/>
+              <a:t>Può rallentare inutilmente l’algoritmo se troppo alto</a:t>
+            </a:r>
+          </a:p>
+          <a:p>
+            <a:pPr>
+              <a:buFont typeface="Arial" panose="020B0604020202020204" pitchFamily="34" charset="0"/>
+              <a:buChar char="•"/>
+            </a:pPr>
+            <a:endParaRPr lang="it-IT" dirty="0" smtClean="0"/>
+          </a:p>
+          <a:p>
+            <a:pPr>
+              <a:buFont typeface="Arial" panose="020B0604020202020204" pitchFamily="34" charset="0"/>
+              <a:buChar char="•"/>
+            </a:pPr>
+            <a:endParaRPr lang="it-IT" dirty="0" smtClean="0"/>
           </a:p>
         </p:txBody>
       </p:sp>
     </p:spTree>
     <p:extLst>
       <p:ext uri="{BB962C8B-B14F-4D97-AF65-F5344CB8AC3E}">
-        <p14:creationId xmlns:p14="http://schemas.microsoft.com/office/powerpoint/2010/main" val="1840755104"/>
+        <p14:creationId xmlns:p14="http://schemas.microsoft.com/office/powerpoint/2010/main" val="3102846494"/>
       </p:ext>
     </p:extLst>
   </p:cSld>
@@ -8304,7 +8609,7 @@
                             <a:solidFill>
                               <a:schemeClr val="tx1"/>
                             </a:solidFill>
-                            <a:latin typeface="Cambria Math" charset="0"/>
+                            <a:latin typeface="Cambria Math" panose="02040503050406030204" pitchFamily="18" charset="0"/>
                           </a:rPr>
                         </m:ctrlPr>
                       </m:fPr>
@@ -8356,7 +8661,7 @@
                             <a:solidFill>
                               <a:schemeClr val="tx1"/>
                             </a:solidFill>
-                            <a:latin typeface="Cambria Math" charset="0"/>
+                            <a:latin typeface="Cambria Math" panose="02040503050406030204" pitchFamily="18" charset="0"/>
                           </a:rPr>
                         </m:ctrlPr>
                       </m:fPr>
@@ -8452,7 +8757,7 @@
                         <m:chr m:val="⃗"/>
                         <m:ctrlPr>
                           <a:rPr lang="it-IT" b="1" i="1">
-                            <a:latin typeface="Cambria Math" charset="0"/>
+                            <a:latin typeface="Cambria Math" panose="02040503050406030204" pitchFamily="18" charset="0"/>
                           </a:rPr>
                         </m:ctrlPr>
                       </m:accPr>
@@ -8476,7 +8781,7 @@
                         <m:chr m:val="⃗"/>
                         <m:ctrlPr>
                           <a:rPr lang="it-IT" b="1" i="1">
-                            <a:latin typeface="Cambria Math" charset="0"/>
+                            <a:latin typeface="Cambria Math" panose="02040503050406030204" pitchFamily="18" charset="0"/>
                           </a:rPr>
                         </m:ctrlPr>
                       </m:accPr>
@@ -8500,7 +8805,7 @@
                         <m:degHide m:val="on"/>
                         <m:ctrlPr>
                           <a:rPr lang="it-IT" i="1">
-                            <a:latin typeface="Cambria Math" charset="0"/>
+                            <a:latin typeface="Cambria Math" panose="02040503050406030204" pitchFamily="18" charset="0"/>
                           </a:rPr>
                         </m:ctrlPr>
                       </m:radPr>
@@ -8510,7 +8815,7 @@
                           <m:sSupPr>
                             <m:ctrlPr>
                               <a:rPr lang="it-IT" i="1">
-                                <a:latin typeface="Cambria Math" charset="0"/>
+                                <a:latin typeface="Cambria Math" panose="02040503050406030204" pitchFamily="18" charset="0"/>
                               </a:rPr>
                             </m:ctrlPr>
                           </m:sSupPr>
@@ -8519,7 +8824,7 @@
                               <m:dPr>
                                 <m:ctrlPr>
                                   <a:rPr lang="it-IT" i="1">
-                                    <a:latin typeface="Cambria Math" charset="0"/>
+                                    <a:latin typeface="Cambria Math" panose="02040503050406030204" pitchFamily="18" charset="0"/>
                                   </a:rPr>
                                 </m:ctrlPr>
                               </m:dPr>
@@ -8528,7 +8833,7 @@
                                   <m:sSubPr>
                                     <m:ctrlPr>
                                       <a:rPr lang="it-IT" i="1">
-                                        <a:latin typeface="Cambria Math" charset="0"/>
+                                        <a:latin typeface="Cambria Math" panose="02040503050406030204" pitchFamily="18" charset="0"/>
                                       </a:rPr>
                                     </m:ctrlPr>
                                   </m:sSubPr>
@@ -8559,7 +8864,7 @@
                                   <m:sSubPr>
                                     <m:ctrlPr>
                                       <a:rPr lang="it-IT" i="1">
-                                        <a:latin typeface="Cambria Math" charset="0"/>
+                                        <a:latin typeface="Cambria Math" panose="02040503050406030204" pitchFamily="18" charset="0"/>
                                       </a:rPr>
                                     </m:ctrlPr>
                                   </m:sSubPr>
@@ -8602,7 +8907,7 @@
                           <m:sSupPr>
                             <m:ctrlPr>
                               <a:rPr lang="it-IT" i="1">
-                                <a:latin typeface="Cambria Math" charset="0"/>
+                                <a:latin typeface="Cambria Math" panose="02040503050406030204" pitchFamily="18" charset="0"/>
                               </a:rPr>
                             </m:ctrlPr>
                           </m:sSupPr>
@@ -8611,7 +8916,7 @@
                               <m:dPr>
                                 <m:ctrlPr>
                                   <a:rPr lang="it-IT" i="1">
-                                    <a:latin typeface="Cambria Math" charset="0"/>
+                                    <a:latin typeface="Cambria Math" panose="02040503050406030204" pitchFamily="18" charset="0"/>
                                   </a:rPr>
                                 </m:ctrlPr>
                               </m:dPr>
@@ -8620,7 +8925,7 @@
                                   <m:sSubPr>
                                     <m:ctrlPr>
                                       <a:rPr lang="it-IT" i="1">
-                                        <a:latin typeface="Cambria Math" charset="0"/>
+                                        <a:latin typeface="Cambria Math" panose="02040503050406030204" pitchFamily="18" charset="0"/>
                                       </a:rPr>
                                     </m:ctrlPr>
                                   </m:sSubPr>
@@ -8651,7 +8956,7 @@
                                   <m:sSubPr>
                                     <m:ctrlPr>
                                       <a:rPr lang="it-IT" i="1">
-                                        <a:latin typeface="Cambria Math" charset="0"/>
+                                        <a:latin typeface="Cambria Math" panose="02040503050406030204" pitchFamily="18" charset="0"/>
                                       </a:rPr>
                                     </m:ctrlPr>
                                   </m:sSubPr>
@@ -8694,7 +8999,7 @@
                           <m:sSupPr>
                             <m:ctrlPr>
                               <a:rPr lang="it-IT" i="1">
-                                <a:latin typeface="Cambria Math" charset="0"/>
+                                <a:latin typeface="Cambria Math" panose="02040503050406030204" pitchFamily="18" charset="0"/>
                               </a:rPr>
                             </m:ctrlPr>
                           </m:sSupPr>
@@ -8703,7 +9008,7 @@
                               <m:dPr>
                                 <m:ctrlPr>
                                   <a:rPr lang="it-IT" i="1">
-                                    <a:latin typeface="Cambria Math" charset="0"/>
+                                    <a:latin typeface="Cambria Math" panose="02040503050406030204" pitchFamily="18" charset="0"/>
                                   </a:rPr>
                                 </m:ctrlPr>
                               </m:dPr>
@@ -8712,7 +9017,7 @@
                                   <m:sSubPr>
                                     <m:ctrlPr>
                                       <a:rPr lang="it-IT" i="1">
-                                        <a:latin typeface="Cambria Math" charset="0"/>
+                                        <a:latin typeface="Cambria Math" panose="02040503050406030204" pitchFamily="18" charset="0"/>
                                       </a:rPr>
                                     </m:ctrlPr>
                                   </m:sSubPr>
@@ -8743,7 +9048,7 @@
                                   <m:sSubPr>
                                     <m:ctrlPr>
                                       <a:rPr lang="it-IT" i="1">
-                                        <a:latin typeface="Cambria Math" charset="0"/>
+                                        <a:latin typeface="Cambria Math" panose="02040503050406030204" pitchFamily="18" charset="0"/>
                                       </a:rPr>
                                     </m:ctrlPr>
                                   </m:sSubPr>
@@ -8821,7 +9126,7 @@
                       <m:sSubPr>
                         <m:ctrlPr>
                           <a:rPr lang="it-IT" i="1">
-                            <a:latin typeface="Cambria Math" charset="0"/>
+                            <a:latin typeface="Cambria Math" panose="02040503050406030204" pitchFamily="18" charset="0"/>
                           </a:rPr>
                         </m:ctrlPr>
                       </m:sSubPr>
@@ -8854,7 +9159,7 @@
                         <m:limLoc m:val="undOvr"/>
                         <m:ctrlPr>
                           <a:rPr lang="it-IT" i="1">
-                            <a:latin typeface="Cambria Math" charset="0"/>
+                            <a:latin typeface="Cambria Math" panose="02040503050406030204" pitchFamily="18" charset="0"/>
                           </a:rPr>
                         </m:ctrlPr>
                       </m:naryPr>
@@ -8885,7 +9190,7 @@
                           <m:fPr>
                             <m:ctrlPr>
                               <a:rPr lang="it-IT" i="1">
-                                <a:latin typeface="Cambria Math" charset="0"/>
+                                <a:latin typeface="Cambria Math" panose="02040503050406030204" pitchFamily="18" charset="0"/>
                               </a:rPr>
                             </m:ctrlPr>
                           </m:fPr>
@@ -8922,7 +9227,7 @@
                           <m:fPr>
                             <m:ctrlPr>
                               <a:rPr lang="it-IT" i="1">
-                                <a:latin typeface="Cambria Math" charset="0"/>
+                                <a:latin typeface="Cambria Math" panose="02040503050406030204" pitchFamily="18" charset="0"/>
                               </a:rPr>
                             </m:ctrlPr>
                           </m:fPr>
@@ -8931,7 +9236,7 @@
                               <m:sSubPr>
                                 <m:ctrlPr>
                                   <a:rPr lang="it-IT" i="1">
-                                    <a:latin typeface="Cambria Math" charset="0"/>
+                                    <a:latin typeface="Cambria Math" panose="02040503050406030204" pitchFamily="18" charset="0"/>
                                   </a:rPr>
                                 </m:ctrlPr>
                               </m:sSubPr>
@@ -8958,7 +9263,7 @@
                               <m:sSubPr>
                                 <m:ctrlPr>
                                   <a:rPr lang="it-IT" i="1">
-                                    <a:latin typeface="Cambria Math" charset="0"/>
+                                    <a:latin typeface="Cambria Math" panose="02040503050406030204" pitchFamily="18" charset="0"/>
                                   </a:rPr>
                                 </m:ctrlPr>
                               </m:sSubPr>
@@ -8995,7 +9300,7 @@
                         <m:limLoc m:val="undOvr"/>
                         <m:ctrlPr>
                           <a:rPr lang="it-IT" i="1">
-                            <a:latin typeface="Cambria Math" charset="0"/>
+                            <a:latin typeface="Cambria Math" panose="02040503050406030204" pitchFamily="18" charset="0"/>
                           </a:rPr>
                         </m:ctrlPr>
                       </m:naryPr>
@@ -9026,7 +9331,7 @@
                           <m:fPr>
                             <m:ctrlPr>
                               <a:rPr lang="it-IT" i="1">
-                                <a:latin typeface="Cambria Math" charset="0"/>
+                                <a:latin typeface="Cambria Math" panose="02040503050406030204" pitchFamily="18" charset="0"/>
                               </a:rPr>
                             </m:ctrlPr>
                           </m:fPr>
@@ -9063,7 +9368,7 @@
                           <m:fPr>
                             <m:ctrlPr>
                               <a:rPr lang="it-IT" i="1">
-                                <a:latin typeface="Cambria Math" charset="0"/>
+                                <a:latin typeface="Cambria Math" panose="02040503050406030204" pitchFamily="18" charset="0"/>
                               </a:rPr>
                             </m:ctrlPr>
                           </m:fPr>
@@ -9072,7 +9377,7 @@
                               <m:sSubPr>
                                 <m:ctrlPr>
                                   <a:rPr lang="it-IT" i="1">
-                                    <a:latin typeface="Cambria Math" charset="0"/>
+                                    <a:latin typeface="Cambria Math" panose="02040503050406030204" pitchFamily="18" charset="0"/>
                                   </a:rPr>
                                 </m:ctrlPr>
                               </m:sSubPr>
@@ -9106,7 +9411,7 @@
                                 <m:chr m:val="⃗"/>
                                 <m:ctrlPr>
                                   <a:rPr lang="it-IT" b="1" i="1">
-                                    <a:latin typeface="Cambria Math" charset="0"/>
+                                    <a:latin typeface="Cambria Math" panose="02040503050406030204" pitchFamily="18" charset="0"/>
                                   </a:rPr>
                                 </m:ctrlPr>
                               </m:accPr>
@@ -9115,7 +9420,7 @@
                                   <m:sSubPr>
                                     <m:ctrlPr>
                                       <a:rPr lang="it-IT" b="1" i="1">
-                                        <a:latin typeface="Cambria Math" charset="0"/>
+                                        <a:latin typeface="Cambria Math" panose="02040503050406030204" pitchFamily="18" charset="0"/>
                                       </a:rPr>
                                     </m:ctrlPr>
                                   </m:sSubPr>
@@ -9149,7 +9454,7 @@
                                 <m:chr m:val="⃗"/>
                                 <m:ctrlPr>
                                   <a:rPr lang="it-IT" b="1" i="1">
-                                    <a:latin typeface="Cambria Math" charset="0"/>
+                                    <a:latin typeface="Cambria Math" panose="02040503050406030204" pitchFamily="18" charset="0"/>
                                   </a:rPr>
                                 </m:ctrlPr>
                               </m:accPr>
@@ -9343,7 +9648,7 @@
                       <m:fPr>
                         <m:ctrlPr>
                           <a:rPr lang="en-US" sz="2400" i="1">
-                            <a:latin typeface="Cambria Math" charset="0"/>
+                            <a:latin typeface="Cambria Math" panose="02040503050406030204" pitchFamily="18" charset="0"/>
                           </a:rPr>
                         </m:ctrlPr>
                       </m:fPr>
@@ -9444,7 +9749,7 @@
                             <a:solidFill>
                               <a:schemeClr val="tx1"/>
                             </a:solidFill>
-                            <a:latin typeface="Cambria Math" charset="0"/>
+                            <a:latin typeface="Cambria Math" panose="02040503050406030204" pitchFamily="18" charset="0"/>
                           </a:rPr>
                         </m:ctrlPr>
                       </m:radPr>
@@ -9839,7 +10144,7 @@
                         <m:sSubPr>
                           <m:ctrlPr>
                             <a:rPr lang="it-IT" i="1">
-                              <a:latin typeface="Cambria Math" charset="0"/>
+                              <a:latin typeface="Cambria Math" panose="02040503050406030204" pitchFamily="18" charset="0"/>
                             </a:rPr>
                           </m:ctrlPr>
                         </m:sSubPr>
@@ -9870,7 +10175,7 @@
                         <m:sSubPr>
                           <m:ctrlPr>
                             <a:rPr lang="it-IT" i="1">
-                              <a:latin typeface="Cambria Math" charset="0"/>
+                              <a:latin typeface="Cambria Math" panose="02040503050406030204" pitchFamily="18" charset="0"/>
                             </a:rPr>
                           </m:ctrlPr>
                         </m:sSubPr>
@@ -9919,7 +10224,7 @@
                         <m:sSubPr>
                           <m:ctrlPr>
                             <a:rPr lang="it-IT" i="1">
-                              <a:latin typeface="Cambria Math" charset="0"/>
+                              <a:latin typeface="Cambria Math" panose="02040503050406030204" pitchFamily="18" charset="0"/>
                             </a:rPr>
                           </m:ctrlPr>
                         </m:sSubPr>
@@ -9952,7 +10257,7 @@
                           <m:limLoc m:val="undOvr"/>
                           <m:ctrlPr>
                             <a:rPr lang="it-IT" i="1">
-                              <a:latin typeface="Cambria Math" charset="0"/>
+                              <a:latin typeface="Cambria Math" panose="02040503050406030204" pitchFamily="18" charset="0"/>
                             </a:rPr>
                           </m:ctrlPr>
                         </m:naryPr>
@@ -9977,7 +10282,7 @@
                             <m:fPr>
                               <m:ctrlPr>
                                 <a:rPr lang="it-IT" i="1">
-                                  <a:latin typeface="Cambria Math" charset="0"/>
+                                  <a:latin typeface="Cambria Math" panose="02040503050406030204" pitchFamily="18" charset="0"/>
                                 </a:rPr>
                               </m:ctrlPr>
                             </m:fPr>
@@ -9986,7 +10291,7 @@
                                 <m:sSubPr>
                                   <m:ctrlPr>
                                     <a:rPr lang="it-IT" i="1">
-                                      <a:latin typeface="Cambria Math" charset="0"/>
+                                      <a:latin typeface="Cambria Math" panose="02040503050406030204" pitchFamily="18" charset="0"/>
                                     </a:rPr>
                                   </m:ctrlPr>
                                 </m:sSubPr>
@@ -10021,7 +10326,7 @@
                                   <m:endChr m:val="|"/>
                                   <m:ctrlPr>
                                     <a:rPr lang="it-IT" i="1">
-                                      <a:latin typeface="Cambria Math" charset="0"/>
+                                      <a:latin typeface="Cambria Math" panose="02040503050406030204" pitchFamily="18" charset="0"/>
                                     </a:rPr>
                                   </m:ctrlPr>
                                 </m:dPr>
@@ -10032,7 +10337,7 @@
                                       <m:endChr m:val="|"/>
                                       <m:ctrlPr>
                                         <a:rPr lang="it-IT" i="1">
-                                          <a:latin typeface="Cambria Math" charset="0"/>
+                                          <a:latin typeface="Cambria Math" panose="02040503050406030204" pitchFamily="18" charset="0"/>
                                         </a:rPr>
                                       </m:ctrlPr>
                                     </m:dPr>
@@ -10042,7 +10347,7 @@
                                           <m:chr m:val="⃗"/>
                                           <m:ctrlPr>
                                             <a:rPr lang="it-IT" b="1" i="1">
-                                              <a:latin typeface="Cambria Math" charset="0"/>
+                                              <a:latin typeface="Cambria Math" panose="02040503050406030204" pitchFamily="18" charset="0"/>
                                             </a:rPr>
                                           </m:ctrlPr>
                                         </m:accPr>
@@ -10051,7 +10356,7 @@
                                             <m:sSubPr>
                                               <m:ctrlPr>
                                                 <a:rPr lang="it-IT" b="1" i="1">
-                                                  <a:latin typeface="Cambria Math" charset="0"/>
+                                                  <a:latin typeface="Cambria Math" panose="02040503050406030204" pitchFamily="18" charset="0"/>
                                                 </a:rPr>
                                               </m:ctrlPr>
                                             </m:sSubPr>
@@ -10085,7 +10390,7 @@
                                           <m:chr m:val="⃗"/>
                                           <m:ctrlPr>
                                             <a:rPr lang="it-IT" b="1" i="1">
-                                              <a:latin typeface="Cambria Math" charset="0"/>
+                                              <a:latin typeface="Cambria Math" panose="02040503050406030204" pitchFamily="18" charset="0"/>
                                             </a:rPr>
                                           </m:ctrlPr>
                                         </m:accPr>
@@ -10124,7 +10429,7 @@
                           <m:limLoc m:val="undOvr"/>
                           <m:ctrlPr>
                             <a:rPr lang="it-IT" i="1">
-                              <a:latin typeface="Cambria Math" charset="0"/>
+                              <a:latin typeface="Cambria Math" panose="02040503050406030204" pitchFamily="18" charset="0"/>
                             </a:rPr>
                           </m:ctrlPr>
                         </m:naryPr>
@@ -10155,7 +10460,7 @@
                             <m:fPr>
                               <m:ctrlPr>
                                 <a:rPr lang="it-IT" i="1">
-                                  <a:latin typeface="Cambria Math" charset="0"/>
+                                  <a:latin typeface="Cambria Math" panose="02040503050406030204" pitchFamily="18" charset="0"/>
                                 </a:rPr>
                               </m:ctrlPr>
                             </m:fPr>
@@ -10164,7 +10469,7 @@
                                 <m:sSubPr>
                                   <m:ctrlPr>
                                     <a:rPr lang="it-IT" i="1">
-                                      <a:latin typeface="Cambria Math" charset="0"/>
+                                      <a:latin typeface="Cambria Math" panose="02040503050406030204" pitchFamily="18" charset="0"/>
                                     </a:rPr>
                                   </m:ctrlPr>
                                 </m:sSubPr>
@@ -10199,7 +10504,7 @@
                                   <m:endChr m:val="|"/>
                                   <m:ctrlPr>
                                     <a:rPr lang="it-IT" i="1">
-                                      <a:latin typeface="Cambria Math" charset="0"/>
+                                      <a:latin typeface="Cambria Math" panose="02040503050406030204" pitchFamily="18" charset="0"/>
                                     </a:rPr>
                                   </m:ctrlPr>
                                 </m:dPr>
@@ -10210,7 +10515,7 @@
                                       <m:endChr m:val="|"/>
                                       <m:ctrlPr>
                                         <a:rPr lang="it-IT" i="1">
-                                          <a:latin typeface="Cambria Math" charset="0"/>
+                                          <a:latin typeface="Cambria Math" panose="02040503050406030204" pitchFamily="18" charset="0"/>
                                         </a:rPr>
                                       </m:ctrlPr>
                                     </m:dPr>
@@ -10220,7 +10525,7 @@
                                           <m:chr m:val="⃗"/>
                                           <m:ctrlPr>
                                             <a:rPr lang="it-IT" b="1" i="1">
-                                              <a:latin typeface="Cambria Math" charset="0"/>
+                                              <a:latin typeface="Cambria Math" panose="02040503050406030204" pitchFamily="18" charset="0"/>
                                             </a:rPr>
                                           </m:ctrlPr>
                                         </m:accPr>
@@ -10229,7 +10534,7 @@
                                             <m:sSubPr>
                                               <m:ctrlPr>
                                                 <a:rPr lang="it-IT" b="1" i="1">
-                                                  <a:latin typeface="Cambria Math" charset="0"/>
+                                                  <a:latin typeface="Cambria Math" panose="02040503050406030204" pitchFamily="18" charset="0"/>
                                                 </a:rPr>
                                               </m:ctrlPr>
                                             </m:sSubPr>
@@ -10263,7 +10568,7 @@
                                           <m:chr m:val="⃗"/>
                                           <m:ctrlPr>
                                             <a:rPr lang="it-IT" b="1" i="1">
-                                              <a:latin typeface="Cambria Math" charset="0"/>
+                                              <a:latin typeface="Cambria Math" panose="02040503050406030204" pitchFamily="18" charset="0"/>
                                             </a:rPr>
                                           </m:ctrlPr>
                                         </m:accPr>
@@ -10300,7 +10605,7 @@
                         <m:fPr>
                           <m:ctrlPr>
                             <a:rPr lang="it-IT" i="1">
-                              <a:latin typeface="Cambria Math" charset="0"/>
+                              <a:latin typeface="Cambria Math" panose="02040503050406030204" pitchFamily="18" charset="0"/>
                             </a:rPr>
                           </m:ctrlPr>
                         </m:fPr>
@@ -10309,7 +10614,7 @@
                             <m:sSubPr>
                               <m:ctrlPr>
                                 <a:rPr lang="it-IT" i="1">
-                                  <a:latin typeface="Cambria Math" charset="0"/>
+                                  <a:latin typeface="Cambria Math" panose="02040503050406030204" pitchFamily="18" charset="0"/>
                                 </a:rPr>
                               </m:ctrlPr>
                             </m:sSubPr>
@@ -10338,7 +10643,7 @@
                               <m:endChr m:val="|"/>
                               <m:ctrlPr>
                                 <a:rPr lang="it-IT" i="1">
-                                  <a:latin typeface="Cambria Math" charset="0"/>
+                                  <a:latin typeface="Cambria Math" panose="02040503050406030204" pitchFamily="18" charset="0"/>
                                 </a:rPr>
                               </m:ctrlPr>
                             </m:dPr>
@@ -10349,7 +10654,7 @@
                                   <m:endChr m:val="|"/>
                                   <m:ctrlPr>
                                     <a:rPr lang="it-IT" i="1">
-                                      <a:latin typeface="Cambria Math" charset="0"/>
+                                      <a:latin typeface="Cambria Math" panose="02040503050406030204" pitchFamily="18" charset="0"/>
                                     </a:rPr>
                                   </m:ctrlPr>
                                 </m:dPr>
@@ -10359,7 +10664,7 @@
                                       <m:chr m:val="⃗"/>
                                       <m:ctrlPr>
                                         <a:rPr lang="it-IT" b="1" i="1">
-                                          <a:latin typeface="Cambria Math" charset="0"/>
+                                          <a:latin typeface="Cambria Math" panose="02040503050406030204" pitchFamily="18" charset="0"/>
                                         </a:rPr>
                                       </m:ctrlPr>
                                     </m:accPr>
@@ -10368,7 +10673,7 @@
                                         <m:sSubPr>
                                           <m:ctrlPr>
                                             <a:rPr lang="it-IT" b="1" i="1">
-                                              <a:latin typeface="Cambria Math" charset="0"/>
+                                              <a:latin typeface="Cambria Math" panose="02040503050406030204" pitchFamily="18" charset="0"/>
                                             </a:rPr>
                                           </m:ctrlPr>
                                         </m:sSubPr>
@@ -10402,7 +10707,7 @@
                                       <m:chr m:val="⃗"/>
                                       <m:ctrlPr>
                                         <a:rPr lang="it-IT" b="1" i="1">
-                                          <a:latin typeface="Cambria Math" charset="0"/>
+                                          <a:latin typeface="Cambria Math" panose="02040503050406030204" pitchFamily="18" charset="0"/>
                                         </a:rPr>
                                       </m:ctrlPr>
                                     </m:accPr>
@@ -10488,7 +10793,7 @@
                         <m:sSubPr>
                           <m:ctrlPr>
                             <a:rPr lang="it-IT" i="1">
-                              <a:latin typeface="Cambria Math" charset="0"/>
+                              <a:latin typeface="Cambria Math" panose="02040503050406030204" pitchFamily="18" charset="0"/>
                             </a:rPr>
                           </m:ctrlPr>
                         </m:sSubPr>
@@ -10537,7 +10842,7 @@
                         <m:sSupPr>
                           <m:ctrlPr>
                             <a:rPr lang="it-IT" i="1">
-                              <a:latin typeface="Cambria Math" charset="0"/>
+                              <a:latin typeface="Cambria Math" panose="02040503050406030204" pitchFamily="18" charset="0"/>
                             </a:rPr>
                           </m:ctrlPr>
                         </m:sSupPr>
@@ -10568,7 +10873,7 @@
                         <m:fPr>
                           <m:ctrlPr>
                             <a:rPr lang="it-IT" i="1">
-                              <a:latin typeface="Cambria Math" charset="0"/>
+                              <a:latin typeface="Cambria Math" panose="02040503050406030204" pitchFamily="18" charset="0"/>
                             </a:rPr>
                           </m:ctrlPr>
                         </m:fPr>
@@ -10577,7 +10882,7 @@
                             <m:sSubPr>
                               <m:ctrlPr>
                                 <a:rPr lang="it-IT" i="1">
-                                  <a:latin typeface="Cambria Math" charset="0"/>
+                                  <a:latin typeface="Cambria Math" panose="02040503050406030204" pitchFamily="18" charset="0"/>
                                 </a:rPr>
                               </m:ctrlPr>
                             </m:sSubPr>
@@ -10606,7 +10911,7 @@
                               <m:endChr m:val="|"/>
                               <m:ctrlPr>
                                 <a:rPr lang="it-IT" i="1">
-                                  <a:latin typeface="Cambria Math" charset="0"/>
+                                  <a:latin typeface="Cambria Math" panose="02040503050406030204" pitchFamily="18" charset="0"/>
                                 </a:rPr>
                               </m:ctrlPr>
                             </m:dPr>
@@ -10617,7 +10922,7 @@
                                   <m:endChr m:val="|"/>
                                   <m:ctrlPr>
                                     <a:rPr lang="it-IT" i="1">
-                                      <a:latin typeface="Cambria Math" charset="0"/>
+                                      <a:latin typeface="Cambria Math" panose="02040503050406030204" pitchFamily="18" charset="0"/>
                                     </a:rPr>
                                   </m:ctrlPr>
                                 </m:dPr>
@@ -10627,7 +10932,7 @@
                                       <m:chr m:val="⃗"/>
                                       <m:ctrlPr>
                                         <a:rPr lang="it-IT" b="1" i="1">
-                                          <a:latin typeface="Cambria Math" charset="0"/>
+                                          <a:latin typeface="Cambria Math" panose="02040503050406030204" pitchFamily="18" charset="0"/>
                                         </a:rPr>
                                       </m:ctrlPr>
                                     </m:accPr>
@@ -10636,7 +10941,7 @@
                                         <m:sSubPr>
                                           <m:ctrlPr>
                                             <a:rPr lang="it-IT" b="1" i="1">
-                                              <a:latin typeface="Cambria Math" charset="0"/>
+                                              <a:latin typeface="Cambria Math" panose="02040503050406030204" pitchFamily="18" charset="0"/>
                                             </a:rPr>
                                           </m:ctrlPr>
                                         </m:sSubPr>
@@ -10670,7 +10975,7 @@
                                       <m:chr m:val="⃗"/>
                                       <m:ctrlPr>
                                         <a:rPr lang="it-IT" b="1" i="1">
-                                          <a:latin typeface="Cambria Math" charset="0"/>
+                                          <a:latin typeface="Cambria Math" panose="02040503050406030204" pitchFamily="18" charset="0"/>
                                         </a:rPr>
                                       </m:ctrlPr>
                                     </m:accPr>
@@ -10699,7 +11004,7 @@
                         <m:fPr>
                           <m:ctrlPr>
                             <a:rPr lang="it-IT" i="1">
-                              <a:latin typeface="Cambria Math" charset="0"/>
+                              <a:latin typeface="Cambria Math" panose="02040503050406030204" pitchFamily="18" charset="0"/>
                             </a:rPr>
                           </m:ctrlPr>
                         </m:fPr>
@@ -10708,7 +11013,7 @@
                             <m:sSupPr>
                               <m:ctrlPr>
                                 <a:rPr lang="it-IT" i="1">
-                                  <a:latin typeface="Cambria Math" charset="0"/>
+                                  <a:latin typeface="Cambria Math" panose="02040503050406030204" pitchFamily="18" charset="0"/>
                                 </a:rPr>
                               </m:ctrlPr>
                             </m:sSupPr>
@@ -10743,7 +11048,7 @@
                               <m:endChr m:val="|"/>
                               <m:ctrlPr>
                                 <a:rPr lang="it-IT" i="1">
-                                  <a:latin typeface="Cambria Math" charset="0"/>
+                                  <a:latin typeface="Cambria Math" panose="02040503050406030204" pitchFamily="18" charset="0"/>
                                 </a:rPr>
                               </m:ctrlPr>
                             </m:dPr>
@@ -10754,7 +11059,7 @@
                                   <m:endChr m:val="|"/>
                                   <m:ctrlPr>
                                     <a:rPr lang="it-IT" i="1">
-                                      <a:latin typeface="Cambria Math" charset="0"/>
+                                      <a:latin typeface="Cambria Math" panose="02040503050406030204" pitchFamily="18" charset="0"/>
                                     </a:rPr>
                                   </m:ctrlPr>
                                 </m:dPr>
@@ -10764,7 +11069,7 @@
                                       <m:chr m:val="⃗"/>
                                       <m:ctrlPr>
                                         <a:rPr lang="it-IT" b="1" i="1">
-                                          <a:latin typeface="Cambria Math" charset="0"/>
+                                          <a:latin typeface="Cambria Math" panose="02040503050406030204" pitchFamily="18" charset="0"/>
                                         </a:rPr>
                                       </m:ctrlPr>
                                     </m:accPr>
@@ -10773,7 +11078,7 @@
                                         <m:sSupPr>
                                           <m:ctrlPr>
                                             <a:rPr lang="it-IT" b="1" i="1">
-                                              <a:latin typeface="Cambria Math" charset="0"/>
+                                              <a:latin typeface="Cambria Math" panose="02040503050406030204" pitchFamily="18" charset="0"/>
                                             </a:rPr>
                                           </m:ctrlPr>
                                         </m:sSupPr>
@@ -10807,7 +11112,7 @@
                                       <m:chr m:val="⃗"/>
                                       <m:ctrlPr>
                                         <a:rPr lang="it-IT" b="1" i="1">
-                                          <a:latin typeface="Cambria Math" charset="0"/>
+                                          <a:latin typeface="Cambria Math" panose="02040503050406030204" pitchFamily="18" charset="0"/>
                                         </a:rPr>
                                       </m:ctrlPr>
                                     </m:accPr>
@@ -10863,7 +11168,7 @@
                         <m:fPr>
                           <m:ctrlPr>
                             <a:rPr lang="it-IT" i="1">
-                              <a:latin typeface="Cambria Math" charset="0"/>
+                              <a:latin typeface="Cambria Math" panose="02040503050406030204" pitchFamily="18" charset="0"/>
                             </a:rPr>
                           </m:ctrlPr>
                         </m:fPr>
@@ -10878,7 +11183,7 @@
                             <m:dPr>
                               <m:ctrlPr>
                                 <a:rPr lang="it-IT" i="1">
-                                  <a:latin typeface="Cambria Math" charset="0"/>
+                                  <a:latin typeface="Cambria Math" panose="02040503050406030204" pitchFamily="18" charset="0"/>
                                 </a:rPr>
                               </m:ctrlPr>
                             </m:dPr>
@@ -10887,7 +11192,7 @@
                                 <m:sSupPr>
                                   <m:ctrlPr>
                                     <a:rPr lang="it-IT" i="1">
-                                      <a:latin typeface="Cambria Math" charset="0"/>
+                                      <a:latin typeface="Cambria Math" panose="02040503050406030204" pitchFamily="18" charset="0"/>
                                     </a:rPr>
                                   </m:ctrlPr>
                                 </m:sSupPr>
@@ -10919,7 +11224,7 @@
                                   <m:chr m:val="⃗"/>
                                   <m:ctrlPr>
                                     <a:rPr lang="it-IT" b="1" i="1">
-                                      <a:latin typeface="Cambria Math" charset="0"/>
+                                      <a:latin typeface="Cambria Math" panose="02040503050406030204" pitchFamily="18" charset="0"/>
                                     </a:rPr>
                                   </m:ctrlPr>
                                 </m:accPr>
@@ -10928,7 +11233,7 @@
                                     <m:sSupPr>
                                       <m:ctrlPr>
                                         <a:rPr lang="it-IT" b="1" i="1">
-                                          <a:latin typeface="Cambria Math" charset="0"/>
+                                          <a:latin typeface="Cambria Math" panose="02040503050406030204" pitchFamily="18" charset="0"/>
                                         </a:rPr>
                                       </m:ctrlPr>
                                     </m:sSupPr>
@@ -10966,7 +11271,7 @@
                               <m:degHide m:val="on"/>
                               <m:ctrlPr>
                                 <a:rPr lang="it-IT" i="1">
-                                  <a:latin typeface="Cambria Math" charset="0"/>
+                                  <a:latin typeface="Cambria Math" panose="02040503050406030204" pitchFamily="18" charset="0"/>
                                 </a:rPr>
                               </m:ctrlPr>
                             </m:radPr>
@@ -10994,7 +11299,7 @@
                           <m:limLoc m:val="undOvr"/>
                           <m:ctrlPr>
                             <a:rPr lang="it-IT" i="1">
-                              <a:latin typeface="Cambria Math" charset="0"/>
+                              <a:latin typeface="Cambria Math" panose="02040503050406030204" pitchFamily="18" charset="0"/>
                             </a:rPr>
                           </m:ctrlPr>
                         </m:naryPr>
@@ -11025,7 +11330,7 @@
                             <m:sSubSupPr>
                               <m:ctrlPr>
                                 <a:rPr lang="it-IT" i="1">
-                                  <a:latin typeface="Cambria Math" charset="0"/>
+                                  <a:latin typeface="Cambria Math" panose="02040503050406030204" pitchFamily="18" charset="0"/>
                                 </a:rPr>
                               </m:ctrlPr>
                             </m:sSubSupPr>
@@ -11036,7 +11341,7 @@
                                   <m:endChr m:val="|"/>
                                   <m:ctrlPr>
                                     <a:rPr lang="it-IT" i="1">
-                                      <a:latin typeface="Cambria Math" charset="0"/>
+                                      <a:latin typeface="Cambria Math" panose="02040503050406030204" pitchFamily="18" charset="0"/>
                                     </a:rPr>
                                   </m:ctrlPr>
                                 </m:dPr>
@@ -11085,7 +11390,7 @@
                                 <m:sSubPr>
                                   <m:ctrlPr>
                                     <a:rPr lang="it-IT" i="1">
-                                      <a:latin typeface="Cambria Math" charset="0"/>
+                                      <a:latin typeface="Cambria Math" panose="02040503050406030204" pitchFamily="18" charset="0"/>
                                     </a:rPr>
                                   </m:ctrlPr>
                                 </m:sSubPr>
@@ -11123,7 +11428,7 @@
                           <m:limLoc m:val="undOvr"/>
                           <m:ctrlPr>
                             <a:rPr lang="it-IT" i="1">
-                              <a:latin typeface="Cambria Math" charset="0"/>
+                              <a:latin typeface="Cambria Math" panose="02040503050406030204" pitchFamily="18" charset="0"/>
                             </a:rPr>
                           </m:ctrlPr>
                         </m:naryPr>
@@ -11154,7 +11459,7 @@
                             <m:sSupPr>
                               <m:ctrlPr>
                                 <a:rPr lang="it-IT" i="1">
-                                  <a:latin typeface="Cambria Math" charset="0"/>
+                                  <a:latin typeface="Cambria Math" panose="02040503050406030204" pitchFamily="18" charset="0"/>
                                 </a:rPr>
                               </m:ctrlPr>
                             </m:sSupPr>
@@ -11163,7 +11468,7 @@
                                 <m:dPr>
                                   <m:ctrlPr>
                                     <a:rPr lang="it-IT" i="1">
-                                      <a:latin typeface="Cambria Math" charset="0"/>
+                                      <a:latin typeface="Cambria Math" panose="02040503050406030204" pitchFamily="18" charset="0"/>
                                     </a:rPr>
                                   </m:ctrlPr>
                                 </m:dPr>
@@ -11172,7 +11477,7 @@
                                     <m:fPr>
                                       <m:ctrlPr>
                                         <a:rPr lang="it-IT" i="1">
-                                          <a:latin typeface="Cambria Math" charset="0"/>
+                                          <a:latin typeface="Cambria Math" panose="02040503050406030204" pitchFamily="18" charset="0"/>
                                         </a:rPr>
                                       </m:ctrlPr>
                                     </m:fPr>
@@ -11181,7 +11486,7 @@
                                         <m:sSubPr>
                                           <m:ctrlPr>
                                             <a:rPr lang="it-IT" i="1">
-                                              <a:latin typeface="Cambria Math" charset="0"/>
+                                              <a:latin typeface="Cambria Math" panose="02040503050406030204" pitchFamily="18" charset="0"/>
                                             </a:rPr>
                                           </m:ctrlPr>
                                         </m:sSubPr>
@@ -11210,7 +11515,7 @@
                                           <m:endChr m:val="|"/>
                                           <m:ctrlPr>
                                             <a:rPr lang="it-IT" i="1">
-                                              <a:latin typeface="Cambria Math" charset="0"/>
+                                              <a:latin typeface="Cambria Math" panose="02040503050406030204" pitchFamily="18" charset="0"/>
                                             </a:rPr>
                                           </m:ctrlPr>
                                         </m:dPr>
@@ -11221,7 +11526,7 @@
                                               <m:endChr m:val="|"/>
                                               <m:ctrlPr>
                                                 <a:rPr lang="it-IT" i="1">
-                                                  <a:latin typeface="Cambria Math" charset="0"/>
+                                                  <a:latin typeface="Cambria Math" panose="02040503050406030204" pitchFamily="18" charset="0"/>
                                                 </a:rPr>
                                               </m:ctrlPr>
                                             </m:dPr>
@@ -11231,7 +11536,7 @@
                                                   <m:chr m:val="⃗"/>
                                                   <m:ctrlPr>
                                                     <a:rPr lang="it-IT" b="1" i="1">
-                                                      <a:latin typeface="Cambria Math" charset="0"/>
+                                                      <a:latin typeface="Cambria Math" panose="02040503050406030204" pitchFamily="18" charset="0"/>
                                                     </a:rPr>
                                                   </m:ctrlPr>
                                                 </m:accPr>
@@ -11240,7 +11545,7 @@
                                                     <m:sSubPr>
                                                       <m:ctrlPr>
                                                         <a:rPr lang="it-IT" b="1" i="1">
-                                                          <a:latin typeface="Cambria Math" charset="0"/>
+                                                          <a:latin typeface="Cambria Math" panose="02040503050406030204" pitchFamily="18" charset="0"/>
                                                         </a:rPr>
                                                       </m:ctrlPr>
                                                     </m:sSubPr>
@@ -11274,7 +11579,7 @@
                                                   <m:chr m:val="⃗"/>
                                                   <m:ctrlPr>
                                                     <a:rPr lang="it-IT" b="1" i="1">
-                                                      <a:latin typeface="Cambria Math" charset="0"/>
+                                                      <a:latin typeface="Cambria Math" panose="02040503050406030204" pitchFamily="18" charset="0"/>
                                                     </a:rPr>
                                                   </m:ctrlPr>
                                                 </m:accPr>
@@ -11283,7 +11588,7 @@
                                                     <m:sSubPr>
                                                       <m:ctrlPr>
                                                         <a:rPr lang="it-IT" b="1" i="1">
-                                                          <a:latin typeface="Cambria Math" charset="0"/>
+                                                          <a:latin typeface="Cambria Math" panose="02040503050406030204" pitchFamily="18" charset="0"/>
                                                         </a:rPr>
                                                       </m:ctrlPr>
                                                     </m:sSubPr>
@@ -11322,7 +11627,7 @@
                                     <m:fPr>
                                       <m:ctrlPr>
                                         <a:rPr lang="it-IT" i="1">
-                                          <a:latin typeface="Cambria Math" charset="0"/>
+                                          <a:latin typeface="Cambria Math" panose="02040503050406030204" pitchFamily="18" charset="0"/>
                                         </a:rPr>
                                       </m:ctrlPr>
                                     </m:fPr>
@@ -11331,7 +11636,7 @@
                                         <m:sSupPr>
                                           <m:ctrlPr>
                                             <a:rPr lang="it-IT" i="1">
-                                              <a:latin typeface="Cambria Math" charset="0"/>
+                                              <a:latin typeface="Cambria Math" panose="02040503050406030204" pitchFamily="18" charset="0"/>
                                             </a:rPr>
                                           </m:ctrlPr>
                                         </m:sSupPr>
@@ -11366,7 +11671,7 @@
                                           <m:endChr m:val="|"/>
                                           <m:ctrlPr>
                                             <a:rPr lang="it-IT" i="1">
-                                              <a:latin typeface="Cambria Math" charset="0"/>
+                                              <a:latin typeface="Cambria Math" panose="02040503050406030204" pitchFamily="18" charset="0"/>
                                             </a:rPr>
                                           </m:ctrlPr>
                                         </m:dPr>
@@ -11377,7 +11682,7 @@
                                               <m:endChr m:val="|"/>
                                               <m:ctrlPr>
                                                 <a:rPr lang="it-IT" i="1">
-                                                  <a:latin typeface="Cambria Math" charset="0"/>
+                                                  <a:latin typeface="Cambria Math" panose="02040503050406030204" pitchFamily="18" charset="0"/>
                                                 </a:rPr>
                                               </m:ctrlPr>
                                             </m:dPr>
@@ -11387,7 +11692,7 @@
                                                   <m:chr m:val="⃗"/>
                                                   <m:ctrlPr>
                                                     <a:rPr lang="it-IT" b="1" i="1">
-                                                      <a:latin typeface="Cambria Math" charset="0"/>
+                                                      <a:latin typeface="Cambria Math" panose="02040503050406030204" pitchFamily="18" charset="0"/>
                                                     </a:rPr>
                                                   </m:ctrlPr>
                                                 </m:accPr>
@@ -11396,7 +11701,7 @@
                                                     <m:sSupPr>
                                                       <m:ctrlPr>
                                                         <a:rPr lang="it-IT" b="1" i="1">
-                                                          <a:latin typeface="Cambria Math" charset="0"/>
+                                                          <a:latin typeface="Cambria Math" panose="02040503050406030204" pitchFamily="18" charset="0"/>
                                                         </a:rPr>
                                                       </m:ctrlPr>
                                                     </m:sSupPr>
@@ -11430,7 +11735,7 @@
                                                   <m:chr m:val="⃗"/>
                                                   <m:ctrlPr>
                                                     <a:rPr lang="it-IT" b="1" i="1">
-                                                      <a:latin typeface="Cambria Math" charset="0"/>
+                                                      <a:latin typeface="Cambria Math" panose="02040503050406030204" pitchFamily="18" charset="0"/>
                                                     </a:rPr>
                                                   </m:ctrlPr>
                                                 </m:accPr>
@@ -11439,7 +11744,7 @@
                                                     <m:sSubPr>
                                                       <m:ctrlPr>
                                                         <a:rPr lang="it-IT" b="1" i="1">
-                                                          <a:latin typeface="Cambria Math" charset="0"/>
+                                                          <a:latin typeface="Cambria Math" panose="02040503050406030204" pitchFamily="18" charset="0"/>
                                                         </a:rPr>
                                                       </m:ctrlPr>
                                                     </m:sSubPr>
@@ -11885,7 +12190,7 @@
           <p:cNvPr id="9" name="Rectangle 8">
             <a:extLst>
               <a:ext uri="{FF2B5EF4-FFF2-40B4-BE49-F238E27FC236}">
-                <a16:creationId xmlns:a16="http://schemas.microsoft.com/office/drawing/2014/main" xmlns="" id="{4E4490D0-3672-446A-AC12-B4830333BDDD}"/>
+                <a16:creationId xmlns:a16="http://schemas.microsoft.com/office/drawing/2014/main" id="{4E4490D0-3672-446A-AC12-B4830333BDDD}"/>
               </a:ext>
             </a:extLst>
           </p:cNvPr>
@@ -11937,7 +12242,7 @@
           <p:cNvPr id="11" name="Rectangle 10">
             <a:extLst>
               <a:ext uri="{FF2B5EF4-FFF2-40B4-BE49-F238E27FC236}">
-                <a16:creationId xmlns:a16="http://schemas.microsoft.com/office/drawing/2014/main" xmlns="" id="{39CB82C2-DF65-4EC1-8280-F201D50F570B}"/>
+                <a16:creationId xmlns:a16="http://schemas.microsoft.com/office/drawing/2014/main" id="{39CB82C2-DF65-4EC1-8280-F201D50F570B}"/>
               </a:ext>
             </a:extLst>
           </p:cNvPr>
@@ -11989,7 +12294,7 @@
           <p:cNvPr id="13" name="Straight Connector 12">
             <a:extLst>
               <a:ext uri="{FF2B5EF4-FFF2-40B4-BE49-F238E27FC236}">
-                <a16:creationId xmlns:a16="http://schemas.microsoft.com/office/drawing/2014/main" xmlns="" id="{7E1D4427-852B-4B37-8E76-0E9F1810BA2A}"/>
+                <a16:creationId xmlns:a16="http://schemas.microsoft.com/office/drawing/2014/main" id="{7E1D4427-852B-4B37-8E76-0E9F1810BA2A}"/>
               </a:ext>
             </a:extLst>
           </p:cNvPr>
@@ -12041,7 +12346,7 @@
           <p:cNvPr id="15" name="Rectangle 14">
             <a:extLst>
               <a:ext uri="{FF2B5EF4-FFF2-40B4-BE49-F238E27FC236}">
-                <a16:creationId xmlns:a16="http://schemas.microsoft.com/office/drawing/2014/main" xmlns="" id="{5A1B47C8-47A0-4A88-8830-6DEA3B5DE392}"/>
+                <a16:creationId xmlns:a16="http://schemas.microsoft.com/office/drawing/2014/main" id="{5A1B47C8-47A0-4A88-8830-6DEA3B5DE392}"/>
               </a:ext>
             </a:extLst>
           </p:cNvPr>
@@ -12130,7 +12435,7 @@
           <p:cNvPr id="17" name="Rectangle 16">
             <a:extLst>
               <a:ext uri="{FF2B5EF4-FFF2-40B4-BE49-F238E27FC236}">
-                <a16:creationId xmlns:a16="http://schemas.microsoft.com/office/drawing/2014/main" xmlns="" id="{984BBFDD-E720-4805-A9C8-129FBBF6DD70}"/>
+                <a16:creationId xmlns:a16="http://schemas.microsoft.com/office/drawing/2014/main" id="{984BBFDD-E720-4805-A9C8-129FBBF6DD70}"/>
               </a:ext>
             </a:extLst>
           </p:cNvPr>
@@ -12182,7 +12487,7 @@
           <p:cNvPr id="19" name="Rectangle 18">
             <a:extLst>
               <a:ext uri="{FF2B5EF4-FFF2-40B4-BE49-F238E27FC236}">
-                <a16:creationId xmlns:a16="http://schemas.microsoft.com/office/drawing/2014/main" xmlns="" id="{5AC4BE46-4A77-42FE-9D15-065CDB2F847C}"/>
+                <a16:creationId xmlns:a16="http://schemas.microsoft.com/office/drawing/2014/main" id="{5AC4BE46-4A77-42FE-9D15-065CDB2F847C}"/>
               </a:ext>
             </a:extLst>
           </p:cNvPr>

</xml_diff>

<commit_message>
Update image of PowerPoint
</commit_message>
<xml_diff>
--- a/IDENTICAZIONE SISTEMA DI CARICHE PUNTIFORMI DA MISURE DI.pptx
+++ b/IDENTICAZIONE SISTEMA DI CARICHE PUNTIFORMI DA MISURE DI.pptx
@@ -214,7 +214,7 @@
           <a:p>
             <a:fld id="{0B626E60-15AC-294D-A4F1-F70323F0F9DF}" type="datetimeFigureOut">
               <a:rPr lang="en-US" smtClean="0"/>
-              <a:t>12/6/2017</a:t>
+              <a:t>12/8/17</a:t>
             </a:fld>
             <a:endParaRPr lang="en-US"/>
           </a:p>
@@ -373,7 +373,7 @@
           <a:p>
             <a:fld id="{B84B1DCE-DD70-5840-A766-ADE0E79E6240}" type="slidenum">
               <a:rPr lang="en-US" smtClean="0"/>
-              <a:t>‹N›</a:t>
+              <a:t>‹#›</a:t>
             </a:fld>
             <a:endParaRPr lang="en-US"/>
           </a:p>
@@ -1295,7 +1295,7 @@
           <a:p>
             <a:fld id="{D400A843-E78D-45FE-BBE0-0DFBB922583B}" type="datetimeFigureOut">
               <a:rPr lang="it-IT" smtClean="0"/>
-              <a:t>06/12/2017</a:t>
+              <a:t>08/12/17</a:t>
             </a:fld>
             <a:endParaRPr lang="it-IT"/>
           </a:p>
@@ -1337,7 +1337,7 @@
           <a:p>
             <a:fld id="{1B29E90A-79A6-4357-BA0E-73A707E87A6D}" type="slidenum">
               <a:rPr lang="it-IT" smtClean="0"/>
-              <a:t>‹N›</a:t>
+              <a:t>‹#›</a:t>
             </a:fld>
             <a:endParaRPr lang="it-IT"/>
           </a:p>
@@ -1498,7 +1498,7 @@
           <a:p>
             <a:fld id="{D400A843-E78D-45FE-BBE0-0DFBB922583B}" type="datetimeFigureOut">
               <a:rPr lang="it-IT" smtClean="0"/>
-              <a:t>06/12/2017</a:t>
+              <a:t>08/12/17</a:t>
             </a:fld>
             <a:endParaRPr lang="it-IT"/>
           </a:p>
@@ -1540,7 +1540,7 @@
           <a:p>
             <a:fld id="{1B29E90A-79A6-4357-BA0E-73A707E87A6D}" type="slidenum">
               <a:rPr lang="it-IT" smtClean="0"/>
-              <a:t>‹N›</a:t>
+              <a:t>‹#›</a:t>
             </a:fld>
             <a:endParaRPr lang="it-IT"/>
           </a:p>
@@ -1749,7 +1749,7 @@
           <a:p>
             <a:fld id="{D400A843-E78D-45FE-BBE0-0DFBB922583B}" type="datetimeFigureOut">
               <a:rPr lang="it-IT" smtClean="0"/>
-              <a:t>06/12/2017</a:t>
+              <a:t>08/12/17</a:t>
             </a:fld>
             <a:endParaRPr lang="it-IT"/>
           </a:p>
@@ -1791,7 +1791,7 @@
           <a:p>
             <a:fld id="{1B29E90A-79A6-4357-BA0E-73A707E87A6D}" type="slidenum">
               <a:rPr lang="it-IT" smtClean="0"/>
-              <a:t>‹N›</a:t>
+              <a:t>‹#›</a:t>
             </a:fld>
             <a:endParaRPr lang="it-IT"/>
           </a:p>
@@ -1918,7 +1918,7 @@
           <a:p>
             <a:fld id="{D400A843-E78D-45FE-BBE0-0DFBB922583B}" type="datetimeFigureOut">
               <a:rPr lang="it-IT" smtClean="0"/>
-              <a:t>06/12/2017</a:t>
+              <a:t>08/12/17</a:t>
             </a:fld>
             <a:endParaRPr lang="it-IT"/>
           </a:p>
@@ -1960,7 +1960,7 @@
           <a:p>
             <a:fld id="{1B29E90A-79A6-4357-BA0E-73A707E87A6D}" type="slidenum">
               <a:rPr lang="it-IT" smtClean="0"/>
-              <a:t>‹N›</a:t>
+              <a:t>‹#›</a:t>
             </a:fld>
             <a:endParaRPr lang="it-IT"/>
           </a:p>
@@ -2256,7 +2256,7 @@
           <a:p>
             <a:fld id="{D400A843-E78D-45FE-BBE0-0DFBB922583B}" type="datetimeFigureOut">
               <a:rPr lang="it-IT" smtClean="0"/>
-              <a:t>06/12/2017</a:t>
+              <a:t>08/12/17</a:t>
             </a:fld>
             <a:endParaRPr lang="it-IT"/>
           </a:p>
@@ -2298,7 +2298,7 @@
           <a:p>
             <a:fld id="{1B29E90A-79A6-4357-BA0E-73A707E87A6D}" type="slidenum">
               <a:rPr lang="it-IT" smtClean="0"/>
-              <a:t>‹N›</a:t>
+              <a:t>‹#›</a:t>
             </a:fld>
             <a:endParaRPr lang="it-IT"/>
           </a:p>
@@ -2526,7 +2526,7 @@
           <a:p>
             <a:fld id="{D400A843-E78D-45FE-BBE0-0DFBB922583B}" type="datetimeFigureOut">
               <a:rPr lang="it-IT" smtClean="0"/>
-              <a:t>06/12/2017</a:t>
+              <a:t>08/12/17</a:t>
             </a:fld>
             <a:endParaRPr lang="it-IT"/>
           </a:p>
@@ -2568,7 +2568,7 @@
           <a:p>
             <a:fld id="{1B29E90A-79A6-4357-BA0E-73A707E87A6D}" type="slidenum">
               <a:rPr lang="it-IT" smtClean="0"/>
-              <a:t>‹N›</a:t>
+              <a:t>‹#›</a:t>
             </a:fld>
             <a:endParaRPr lang="it-IT"/>
           </a:p>
@@ -2900,7 +2900,7 @@
           <a:p>
             <a:fld id="{D400A843-E78D-45FE-BBE0-0DFBB922583B}" type="datetimeFigureOut">
               <a:rPr lang="it-IT" smtClean="0"/>
-              <a:t>06/12/2017</a:t>
+              <a:t>08/12/17</a:t>
             </a:fld>
             <a:endParaRPr lang="it-IT"/>
           </a:p>
@@ -2942,7 +2942,7 @@
           <a:p>
             <a:fld id="{1B29E90A-79A6-4357-BA0E-73A707E87A6D}" type="slidenum">
               <a:rPr lang="it-IT" smtClean="0"/>
-              <a:t>‹N›</a:t>
+              <a:t>‹#›</a:t>
             </a:fld>
             <a:endParaRPr lang="it-IT"/>
           </a:p>
@@ -3013,7 +3013,7 @@
           <a:p>
             <a:fld id="{D400A843-E78D-45FE-BBE0-0DFBB922583B}" type="datetimeFigureOut">
               <a:rPr lang="it-IT" smtClean="0"/>
-              <a:t>06/12/2017</a:t>
+              <a:t>08/12/17</a:t>
             </a:fld>
             <a:endParaRPr lang="it-IT"/>
           </a:p>
@@ -3055,7 +3055,7 @@
           <a:p>
             <a:fld id="{1B29E90A-79A6-4357-BA0E-73A707E87A6D}" type="slidenum">
               <a:rPr lang="it-IT" smtClean="0"/>
-              <a:t>‹N›</a:t>
+              <a:t>‹#›</a:t>
             </a:fld>
             <a:endParaRPr lang="it-IT"/>
           </a:p>
@@ -3179,7 +3179,7 @@
           <a:p>
             <a:fld id="{D400A843-E78D-45FE-BBE0-0DFBB922583B}" type="datetimeFigureOut">
               <a:rPr lang="it-IT" smtClean="0"/>
-              <a:t>06/12/2017</a:t>
+              <a:t>08/12/17</a:t>
             </a:fld>
             <a:endParaRPr lang="it-IT"/>
           </a:p>
@@ -3229,7 +3229,7 @@
           <a:p>
             <a:fld id="{1B29E90A-79A6-4357-BA0E-73A707E87A6D}" type="slidenum">
               <a:rPr lang="it-IT" smtClean="0"/>
-              <a:t>‹N›</a:t>
+              <a:t>‹#›</a:t>
             </a:fld>
             <a:endParaRPr lang="it-IT"/>
           </a:p>
@@ -3528,7 +3528,7 @@
           <a:p>
             <a:fld id="{D400A843-E78D-45FE-BBE0-0DFBB922583B}" type="datetimeFigureOut">
               <a:rPr lang="it-IT" smtClean="0"/>
-              <a:t>06/12/2017</a:t>
+              <a:t>08/12/17</a:t>
             </a:fld>
             <a:endParaRPr lang="it-IT"/>
           </a:p>
@@ -3591,7 +3591,7 @@
           <a:p>
             <a:fld id="{1B29E90A-79A6-4357-BA0E-73A707E87A6D}" type="slidenum">
               <a:rPr lang="it-IT" smtClean="0"/>
-              <a:t>‹N›</a:t>
+              <a:t>‹#›</a:t>
             </a:fld>
             <a:endParaRPr lang="it-IT"/>
           </a:p>
@@ -3902,7 +3902,7 @@
           <a:p>
             <a:fld id="{D400A843-E78D-45FE-BBE0-0DFBB922583B}" type="datetimeFigureOut">
               <a:rPr lang="it-IT" smtClean="0"/>
-              <a:t>06/12/2017</a:t>
+              <a:t>08/12/17</a:t>
             </a:fld>
             <a:endParaRPr lang="it-IT"/>
           </a:p>
@@ -3944,7 +3944,7 @@
           <a:p>
             <a:fld id="{1B29E90A-79A6-4357-BA0E-73A707E87A6D}" type="slidenum">
               <a:rPr lang="it-IT" smtClean="0"/>
-              <a:t>‹N›</a:t>
+              <a:t>‹#›</a:t>
             </a:fld>
             <a:endParaRPr lang="it-IT"/>
           </a:p>
@@ -4184,7 +4184,7 @@
           <a:p>
             <a:fld id="{D400A843-E78D-45FE-BBE0-0DFBB922583B}" type="datetimeFigureOut">
               <a:rPr lang="it-IT" smtClean="0"/>
-              <a:t>06/12/2017</a:t>
+              <a:t>08/12/17</a:t>
             </a:fld>
             <a:endParaRPr lang="it-IT"/>
           </a:p>
@@ -4258,7 +4258,7 @@
           <a:p>
             <a:fld id="{1B29E90A-79A6-4357-BA0E-73A707E87A6D}" type="slidenum">
               <a:rPr lang="it-IT" smtClean="0"/>
-              <a:t>‹N›</a:t>
+              <a:t>‹#›</a:t>
             </a:fld>
             <a:endParaRPr lang="it-IT"/>
           </a:p>
@@ -5935,7 +5935,6 @@
               <a:rPr lang="it-IT" sz="3600" dirty="0" smtClean="0"/>
               <a:t>Lato minimo del politopo raggiunto dopo un certo numero di iterazioni</a:t>
             </a:r>
-            <a:endParaRPr lang="it-IT" sz="3600" dirty="0" smtClean="0"/>
           </a:p>
           <a:p>
             <a:pPr marL="0" indent="0">
@@ -5950,11 +5949,7 @@
             </a:pPr>
             <a:r>
               <a:rPr lang="it-IT" sz="3600" dirty="0" smtClean="0"/>
-              <a:t>Numero </a:t>
-            </a:r>
-            <a:r>
-              <a:rPr lang="it-IT" sz="3600" dirty="0" smtClean="0"/>
-              <a:t>di iterazioni effettuate</a:t>
+              <a:t>Numero di iterazioni effettuate</a:t>
             </a:r>
             <a:endParaRPr lang="it-IT" sz="3600" dirty="0"/>
           </a:p>
@@ -6168,11 +6163,6 @@
               </a:rPr>
               <a:t> Implementazione del metodo delle penalità</a:t>
             </a:r>
-            <a:endParaRPr lang="it-IT" sz="3600" dirty="0" smtClean="0">
-              <a:solidFill>
-                <a:schemeClr val="tx1"/>
-              </a:solidFill>
-            </a:endParaRPr>
           </a:p>
         </p:txBody>
       </p:sp>
@@ -6568,56 +6558,14 @@
       </p:sp>
       <p:sp>
         <p:nvSpPr>
-          <p:cNvPr id="3" name="Segnaposto contenuto 2"/>
-          <p:cNvSpPr>
-            <a:spLocks noGrp="1"/>
-          </p:cNvSpPr>
-          <p:nvPr>
-            <p:ph idx="1"/>
-          </p:nvPr>
+          <p:cNvPr id="8" name="Rectangle 7"/>
+          <p:cNvSpPr/>
+          <p:nvPr/>
         </p:nvSpPr>
         <p:spPr>
           <a:xfrm>
-            <a:off x="1097280" y="1988896"/>
-            <a:ext cx="10058400" cy="950232"/>
-          </a:xfrm>
-        </p:spPr>
-        <p:txBody>
-          <a:bodyPr>
-            <a:normAutofit/>
-          </a:bodyPr>
-          <a:lstStyle/>
-          <a:p>
-            <a:r>
-              <a:rPr lang="it-IT" dirty="0"/>
-              <a:t>Simplex(@</a:t>
-            </a:r>
-            <a:r>
-              <a:rPr lang="it-IT" dirty="0" err="1"/>
-              <a:t>cost_function</a:t>
-            </a:r>
-            <a:r>
-              <a:rPr lang="it-IT" dirty="0"/>
-              <a:t>, { }, [-.2 .5 .3], .3, </a:t>
-            </a:r>
-            <a:r>
-              <a:rPr lang="it-IT" dirty="0" smtClean="0"/>
-              <a:t>1e-5, 500);</a:t>
-            </a:r>
-            <a:endParaRPr lang="it-IT" dirty="0"/>
-          </a:p>
-        </p:txBody>
-      </p:sp>
-      <p:sp>
-        <p:nvSpPr>
-          <p:cNvPr id="4" name="Rectangle 3"/>
-          <p:cNvSpPr/>
-          <p:nvPr/>
-        </p:nvSpPr>
-        <p:spPr>
-          <a:xfrm>
-            <a:off x="1097280" y="2464012"/>
-            <a:ext cx="5199018" cy="1754326"/>
+            <a:off x="1156527" y="2717948"/>
+            <a:ext cx="5199018" cy="1938992"/>
           </a:xfrm>
           <a:prstGeom prst="rect">
             <a:avLst/>
@@ -6634,7 +6582,7 @@
               <a:buChar char="•"/>
             </a:pPr>
             <a:r>
-              <a:rPr lang="it-IT" dirty="0"/>
+              <a:rPr lang="it-IT" sz="2000" dirty="0"/>
               <a:t>Valore nell’ultimo vertice = 1.6150e-06</a:t>
             </a:r>
           </a:p>
@@ -6644,7 +6592,7 @@
               <a:buChar char="•"/>
             </a:pPr>
             <a:r>
-              <a:rPr lang="it-IT" dirty="0"/>
+              <a:rPr lang="it-IT" sz="2000" dirty="0"/>
               <a:t>risultato =  -0.2799    0.3995    0.4000</a:t>
             </a:r>
           </a:p>
@@ -6654,7 +6602,7 @@
               <a:buChar char="•"/>
             </a:pPr>
             <a:r>
-              <a:rPr lang="it-IT" dirty="0"/>
+              <a:rPr lang="it-IT" sz="2000" dirty="0"/>
               <a:t>iterazioni = 500</a:t>
             </a:r>
           </a:p>
@@ -6664,7 +6612,7 @@
               <a:buChar char="•"/>
             </a:pPr>
             <a:r>
-              <a:rPr lang="it-IT" dirty="0"/>
+              <a:rPr lang="it-IT" sz="2000" dirty="0"/>
               <a:t>dimezzamenti = 13</a:t>
             </a:r>
           </a:p>
@@ -6674,7 +6622,7 @@
               <a:buChar char="•"/>
             </a:pPr>
             <a:r>
-              <a:rPr lang="it-IT" dirty="0"/>
+              <a:rPr lang="it-IT" sz="2000" dirty="0"/>
               <a:t>superficie finale = 7.7591e-04</a:t>
             </a:r>
           </a:p>
@@ -6684,7 +6632,7 @@
               <a:buChar char="•"/>
             </a:pPr>
             <a:r>
-              <a:rPr lang="it-IT" dirty="0"/>
+              <a:rPr lang="it-IT" sz="2000" dirty="0"/>
               <a:t>errore = 0.0201    0.0005    0.0000</a:t>
             </a:r>
           </a:p>
@@ -6692,20 +6640,25 @@
       </p:sp>
       <p:pic>
         <p:nvPicPr>
-          <p:cNvPr id="6" name="Immagine 5"/>
+          <p:cNvPr id="9" name="Immagine 5"/>
           <p:cNvPicPr/>
           <p:nvPr/>
         </p:nvPicPr>
-        <p:blipFill>
-          <a:blip r:embed="rId2"/>
-          <a:stretch>
-            <a:fillRect/>
-          </a:stretch>
+        <p:blipFill rotWithShape="1">
+          <a:blip r:embed="rId2">
+            <a:extLst>
+              <a:ext uri="{28A0092B-C50C-407E-A947-70E740481C1C}">
+                <a14:useLocalDpi xmlns:a14="http://schemas.microsoft.com/office/drawing/2010/main" val="0"/>
+              </a:ext>
+            </a:extLst>
+          </a:blip>
+          <a:srcRect l="19652" t="5769" r="17563" b="4000"/>
+          <a:stretch/>
         </p:blipFill>
         <p:spPr>
           <a:xfrm>
-            <a:off x="8116037" y="330389"/>
-            <a:ext cx="3552632" cy="3317013"/>
+            <a:off x="5420686" y="3315723"/>
+            <a:ext cx="2928136" cy="2706444"/>
           </a:xfrm>
           <a:prstGeom prst="rect">
             <a:avLst/>
@@ -6714,28 +6667,113 @@
       </p:pic>
       <p:pic>
         <p:nvPicPr>
-          <p:cNvPr id="5" name="Immagine 4"/>
+          <p:cNvPr id="10" name="Immagine 4"/>
           <p:cNvPicPr>
             <a:picLocks noChangeAspect="1"/>
           </p:cNvPicPr>
           <p:nvPr/>
         </p:nvPicPr>
-        <p:blipFill>
-          <a:blip r:embed="rId3"/>
-          <a:stretch>
-            <a:fillRect/>
-          </a:stretch>
+        <p:blipFill rotWithShape="1">
+          <a:blip r:embed="rId3">
+            <a:extLst>
+              <a:ext uri="{28A0092B-C50C-407E-A947-70E740481C1C}">
+                <a14:useLocalDpi xmlns:a14="http://schemas.microsoft.com/office/drawing/2010/main" val="0"/>
+              </a:ext>
+            </a:extLst>
+          </a:blip>
+          <a:srcRect l="17031" t="10633" r="14866" b="3846"/>
+          <a:stretch/>
         </p:blipFill>
         <p:spPr>
           <a:xfrm>
-            <a:off x="5780723" y="3414244"/>
-            <a:ext cx="3454717" cy="2906085"/>
+            <a:off x="8479326" y="3315723"/>
+            <a:ext cx="3712674" cy="2772347"/>
           </a:xfrm>
           <a:prstGeom prst="rect">
             <a:avLst/>
           </a:prstGeom>
         </p:spPr>
       </p:pic>
+      <p:sp>
+        <p:nvSpPr>
+          <p:cNvPr id="11" name="Rectangle 10"/>
+          <p:cNvSpPr/>
+          <p:nvPr/>
+        </p:nvSpPr>
+        <p:spPr>
+          <a:xfrm>
+            <a:off x="1156527" y="1916020"/>
+            <a:ext cx="9261469" cy="400110"/>
+          </a:xfrm>
+          <a:prstGeom prst="rect">
+            <a:avLst/>
+          </a:prstGeom>
+        </p:spPr>
+        <p:txBody>
+          <a:bodyPr wrap="square">
+            <a:spAutoFit/>
+          </a:bodyPr>
+          <a:lstStyle/>
+          <a:p>
+            <a:r>
+              <a:rPr lang="en-US" sz="2000" dirty="0">
+                <a:latin typeface="Courier" charset="0"/>
+              </a:rPr>
+              <a:t>Simplex(@</a:t>
+            </a:r>
+            <a:r>
+              <a:rPr lang="en-US" sz="2000" dirty="0" err="1">
+                <a:latin typeface="Courier" charset="0"/>
+              </a:rPr>
+              <a:t>cost_function</a:t>
+            </a:r>
+            <a:r>
+              <a:rPr lang="en-US" sz="2000" dirty="0">
+                <a:latin typeface="Courier" charset="0"/>
+              </a:rPr>
+              <a:t>, { }, [-.2 .5 .3], .3, 1e-5, 500);</a:t>
+            </a:r>
+            <a:endParaRPr lang="en-US" sz="2000" dirty="0">
+              <a:effectLst/>
+              <a:latin typeface="Courier" charset="0"/>
+            </a:endParaRPr>
+          </a:p>
+        </p:txBody>
+      </p:sp>
+      <p:sp>
+        <p:nvSpPr>
+          <p:cNvPr id="12" name="TextBox 11"/>
+          <p:cNvSpPr txBox="1"/>
+          <p:nvPr/>
+        </p:nvSpPr>
+        <p:spPr>
+          <a:xfrm>
+            <a:off x="1156527" y="2348616"/>
+            <a:ext cx="1097801" cy="400110"/>
+          </a:xfrm>
+          <a:prstGeom prst="rect">
+            <a:avLst/>
+          </a:prstGeom>
+          <a:noFill/>
+        </p:spPr>
+        <p:txBody>
+          <a:bodyPr wrap="none" rtlCol="0">
+            <a:spAutoFit/>
+          </a:bodyPr>
+          <a:lstStyle/>
+          <a:p>
+            <a:r>
+              <a:rPr lang="en-US" sz="2000" dirty="0" err="1" smtClean="0"/>
+              <a:t>Risultati</a:t>
+            </a:r>
+            <a:r>
+              <a:rPr lang="en-US" sz="2000" dirty="0" smtClean="0"/>
+              <a:t>:</a:t>
+            </a:r>
+            <a:endParaRPr lang="en-US" sz="2000" dirty="0"/>
+          </a:p>
+        </p:txBody>
+      </p:sp>
     </p:spTree>
     <p:extLst>
       <p:ext uri="{BB962C8B-B14F-4D97-AF65-F5344CB8AC3E}">
@@ -6798,56 +6836,14 @@
       </p:sp>
       <p:sp>
         <p:nvSpPr>
-          <p:cNvPr id="3" name="Segnaposto contenuto 2"/>
-          <p:cNvSpPr>
-            <a:spLocks noGrp="1"/>
-          </p:cNvSpPr>
-          <p:nvPr>
-            <p:ph idx="1"/>
-          </p:nvPr>
-        </p:nvSpPr>
-        <p:spPr>
-          <a:xfrm>
-            <a:off x="1097280" y="1988896"/>
-            <a:ext cx="10058400" cy="950232"/>
-          </a:xfrm>
-        </p:spPr>
-        <p:txBody>
-          <a:bodyPr>
-            <a:normAutofit/>
-          </a:bodyPr>
-          <a:lstStyle/>
-          <a:p>
-            <a:r>
-              <a:rPr lang="it-IT" dirty="0"/>
-              <a:t>Simplex(@</a:t>
-            </a:r>
-            <a:r>
-              <a:rPr lang="it-IT" dirty="0" err="1"/>
-              <a:t>cost_function</a:t>
-            </a:r>
-            <a:r>
-              <a:rPr lang="it-IT" dirty="0"/>
-              <a:t>, { }, [-.2 .5 .3], .3, </a:t>
-            </a:r>
-            <a:r>
-              <a:rPr lang="it-IT" dirty="0" smtClean="0"/>
-              <a:t>1e-5, 500);</a:t>
-            </a:r>
-            <a:endParaRPr lang="it-IT" dirty="0"/>
-          </a:p>
-        </p:txBody>
-      </p:sp>
-      <p:sp>
-        <p:nvSpPr>
-          <p:cNvPr id="4" name="Rectangle 3"/>
+          <p:cNvPr id="9" name="Rectangle 8"/>
           <p:cNvSpPr/>
           <p:nvPr/>
         </p:nvSpPr>
         <p:spPr>
           <a:xfrm>
             <a:off x="1097280" y="3872872"/>
-            <a:ext cx="5199018" cy="1754326"/>
+            <a:ext cx="5199018" cy="1938992"/>
           </a:xfrm>
           <a:prstGeom prst="rect">
             <a:avLst/>
@@ -6864,7 +6860,7 @@
               <a:buChar char="•"/>
             </a:pPr>
             <a:r>
-              <a:rPr lang="it-IT" dirty="0"/>
+              <a:rPr lang="it-IT" sz="2000" dirty="0"/>
               <a:t>Valore nell’ultimo vertice = 0.0012</a:t>
             </a:r>
           </a:p>
@@ -6874,7 +6870,7 @@
               <a:buChar char="•"/>
             </a:pPr>
             <a:r>
-              <a:rPr lang="it-IT" dirty="0"/>
+              <a:rPr lang="it-IT" sz="2000" dirty="0"/>
               <a:t>risultato =   -0.2946    0.4021    0.3999</a:t>
             </a:r>
           </a:p>
@@ -6884,7 +6880,7 @@
               <a:buChar char="•"/>
             </a:pPr>
             <a:r>
-              <a:rPr lang="it-IT" dirty="0"/>
+              <a:rPr lang="it-IT" sz="2000" dirty="0"/>
               <a:t>iterazioni = 500</a:t>
             </a:r>
           </a:p>
@@ -6894,7 +6890,7 @@
               <a:buChar char="•"/>
             </a:pPr>
             <a:r>
-              <a:rPr lang="it-IT" dirty="0"/>
+              <a:rPr lang="it-IT" sz="2000" dirty="0"/>
               <a:t>dimezzamenti = 13</a:t>
             </a:r>
           </a:p>
@@ -6904,7 +6900,7 @@
               <a:buChar char="•"/>
             </a:pPr>
             <a:r>
-              <a:rPr lang="it-IT" dirty="0"/>
+              <a:rPr lang="it-IT" sz="2000" dirty="0"/>
               <a:t>superficie finale = 7.5929e-04</a:t>
             </a:r>
           </a:p>
@@ -6914,17 +6910,17 @@
               <a:buChar char="•"/>
             </a:pPr>
             <a:r>
-              <a:rPr lang="it-IT" dirty="0"/>
+              <a:rPr lang="it-IT" sz="2000" dirty="0"/>
               <a:t>errore = 0.0054    0.0021    0.0001</a:t>
             </a:r>
           </a:p>
         </p:txBody>
       </p:sp>
-      <mc:AlternateContent xmlns:mc="http://schemas.openxmlformats.org/markup-compatibility/2006" xmlns:a14="http://schemas.microsoft.com/office/drawing/2010/main">
-        <mc:Choice Requires="a14">
+      <mc:AlternateContent xmlns:mc="http://schemas.openxmlformats.org/markup-compatibility/2006">
+        <mc:Choice xmlns:a14="http://schemas.microsoft.com/office/drawing/2010/main" Requires="a14">
           <p:sp>
             <p:nvSpPr>
-              <p:cNvPr id="7" name="Segnaposto contenuto 2"/>
+              <p:cNvPr id="10" name="Segnaposto contenuto 2"/>
               <p:cNvSpPr txBox="1">
                 <a:spLocks/>
               </p:cNvSpPr>
@@ -6932,8 +6928,8 @@
             </p:nvSpPr>
             <p:spPr>
               <a:xfrm>
-                <a:off x="1097280" y="2671104"/>
-                <a:ext cx="10058400" cy="950232"/>
+                <a:off x="1156527" y="2494790"/>
+                <a:ext cx="5505530" cy="950232"/>
               </a:xfrm>
               <a:prstGeom prst="rect">
                 <a:avLst/>
@@ -7202,7 +7198,7 @@
                       <m:sSupPr>
                         <m:ctrlPr>
                           <a:rPr lang="it-IT" i="1" smtClean="0">
-                            <a:latin typeface="Cambria Math" panose="02040503050406030204" pitchFamily="18" charset="0"/>
+                            <a:latin typeface="Cambria Math" charset="0"/>
                           </a:rPr>
                         </m:ctrlPr>
                       </m:sSupPr>
@@ -7211,20 +7207,20 @@
                           <m:dPr>
                             <m:ctrlPr>
                               <a:rPr lang="it-IT" i="1">
-                                <a:latin typeface="Cambria Math" panose="02040503050406030204" pitchFamily="18" charset="0"/>
+                                <a:latin typeface="Cambria Math" charset="0"/>
                               </a:rPr>
                             </m:ctrlPr>
                           </m:dPr>
                           <m:e>
                             <m:r>
                               <a:rPr lang="it-IT" i="1">
-                                <a:latin typeface="Cambria Math" panose="02040503050406030204" pitchFamily="18" charset="0"/>
+                                <a:latin typeface="Cambria Math" charset="0"/>
                               </a:rPr>
                               <m:t>𝑥</m:t>
                             </m:r>
                             <m:r>
                               <a:rPr lang="it-IT" i="1">
-                                <a:latin typeface="Cambria Math" panose="02040503050406030204" pitchFamily="18" charset="0"/>
+                                <a:latin typeface="Cambria Math" charset="0"/>
                               </a:rPr>
                               <m:t>+0.6</m:t>
                             </m:r>
@@ -7234,7 +7230,7 @@
                       <m:sup>
                         <m:r>
                           <a:rPr lang="it-IT" i="1">
-                            <a:latin typeface="Cambria Math" panose="02040503050406030204" pitchFamily="18" charset="0"/>
+                            <a:latin typeface="Cambria Math" charset="0"/>
                           </a:rPr>
                           <m:t>2</m:t>
                         </m:r>
@@ -7242,7 +7238,7 @@
                     </m:sSup>
                     <m:r>
                       <a:rPr lang="it-IT" i="1">
-                        <a:latin typeface="Cambria Math" panose="02040503050406030204" pitchFamily="18" charset="0"/>
+                        <a:latin typeface="Cambria Math" charset="0"/>
                       </a:rPr>
                       <m:t>+</m:t>
                     </m:r>
@@ -7250,7 +7246,7 @@
                       <m:sSupPr>
                         <m:ctrlPr>
                           <a:rPr lang="it-IT" i="1">
-                            <a:latin typeface="Cambria Math" panose="02040503050406030204" pitchFamily="18" charset="0"/>
+                            <a:latin typeface="Cambria Math" charset="0"/>
                           </a:rPr>
                         </m:ctrlPr>
                       </m:sSupPr>
@@ -7259,20 +7255,20 @@
                           <m:dPr>
                             <m:ctrlPr>
                               <a:rPr lang="it-IT" i="1">
-                                <a:latin typeface="Cambria Math" panose="02040503050406030204" pitchFamily="18" charset="0"/>
+                                <a:latin typeface="Cambria Math" charset="0"/>
                               </a:rPr>
                             </m:ctrlPr>
                           </m:dPr>
                           <m:e>
                             <m:r>
                               <a:rPr lang="it-IT" i="1">
-                                <a:latin typeface="Cambria Math" panose="02040503050406030204" pitchFamily="18" charset="0"/>
+                                <a:latin typeface="Cambria Math" charset="0"/>
                               </a:rPr>
                               <m:t>𝑦</m:t>
                             </m:r>
                             <m:r>
                               <a:rPr lang="it-IT" i="1">
-                                <a:latin typeface="Cambria Math" panose="02040503050406030204" pitchFamily="18" charset="0"/>
+                                <a:latin typeface="Cambria Math" charset="0"/>
                               </a:rPr>
                               <m:t>−0.6</m:t>
                             </m:r>
@@ -7282,7 +7278,7 @@
                       <m:sup>
                         <m:r>
                           <a:rPr lang="it-IT" i="1">
-                            <a:latin typeface="Cambria Math" panose="02040503050406030204" pitchFamily="18" charset="0"/>
+                            <a:latin typeface="Cambria Math" charset="0"/>
                           </a:rPr>
                           <m:t>2</m:t>
                         </m:r>
@@ -7290,7 +7286,7 @@
                     </m:sSup>
                     <m:r>
                       <a:rPr lang="it-IT" i="1">
-                        <a:latin typeface="Cambria Math" panose="02040503050406030204" pitchFamily="18" charset="0"/>
+                        <a:latin typeface="Cambria Math" charset="0"/>
                       </a:rPr>
                       <m:t>+</m:t>
                     </m:r>
@@ -7298,7 +7294,7 @@
                       <m:sSupPr>
                         <m:ctrlPr>
                           <a:rPr lang="it-IT" i="1">
-                            <a:latin typeface="Cambria Math" panose="02040503050406030204" pitchFamily="18" charset="0"/>
+                            <a:latin typeface="Cambria Math" charset="0"/>
                           </a:rPr>
                         </m:ctrlPr>
                       </m:sSupPr>
@@ -7307,20 +7303,20 @@
                           <m:dPr>
                             <m:ctrlPr>
                               <a:rPr lang="it-IT" i="1">
-                                <a:latin typeface="Cambria Math" panose="02040503050406030204" pitchFamily="18" charset="0"/>
+                                <a:latin typeface="Cambria Math" charset="0"/>
                               </a:rPr>
                             </m:ctrlPr>
                           </m:dPr>
                           <m:e>
                             <m:r>
                               <a:rPr lang="it-IT" i="1">
-                                <a:latin typeface="Cambria Math" panose="02040503050406030204" pitchFamily="18" charset="0"/>
+                                <a:latin typeface="Cambria Math" charset="0"/>
                               </a:rPr>
                               <m:t>𝑧</m:t>
                             </m:r>
                             <m:r>
                               <a:rPr lang="it-IT" i="1">
-                                <a:latin typeface="Cambria Math" panose="02040503050406030204" pitchFamily="18" charset="0"/>
+                                <a:latin typeface="Cambria Math" charset="0"/>
                               </a:rPr>
                               <m:t>−0.5</m:t>
                             </m:r>
@@ -7330,7 +7326,7 @@
                       <m:sup>
                         <m:r>
                           <a:rPr lang="it-IT" i="1">
-                            <a:latin typeface="Cambria Math" panose="02040503050406030204" pitchFamily="18" charset="0"/>
+                            <a:latin typeface="Cambria Math" charset="0"/>
                           </a:rPr>
                           <m:t>2</m:t>
                         </m:r>
@@ -7338,7 +7334,7 @@
                     </m:sSup>
                     <m:r>
                       <a:rPr lang="it-IT" i="1">
-                        <a:latin typeface="Cambria Math" panose="02040503050406030204" pitchFamily="18" charset="0"/>
+                        <a:latin typeface="Cambria Math" charset="0"/>
                       </a:rPr>
                       <m:t>−</m:t>
                     </m:r>
@@ -7346,14 +7342,14 @@
                       <m:sSupPr>
                         <m:ctrlPr>
                           <a:rPr lang="it-IT" i="1">
-                            <a:latin typeface="Cambria Math" panose="02040503050406030204" pitchFamily="18" charset="0"/>
+                            <a:latin typeface="Cambria Math" charset="0"/>
                           </a:rPr>
                         </m:ctrlPr>
                       </m:sSupPr>
                       <m:e>
                         <m:r>
                           <a:rPr lang="it-IT" i="1">
-                            <a:latin typeface="Cambria Math" panose="02040503050406030204" pitchFamily="18" charset="0"/>
+                            <a:latin typeface="Cambria Math" charset="0"/>
                           </a:rPr>
                           <m:t>1.2</m:t>
                         </m:r>
@@ -7361,7 +7357,7 @@
                       <m:sup>
                         <m:r>
                           <a:rPr lang="it-IT" i="1">
-                            <a:latin typeface="Cambria Math" panose="02040503050406030204" pitchFamily="18" charset="0"/>
+                            <a:latin typeface="Cambria Math" charset="0"/>
                           </a:rPr>
                           <m:t>2</m:t>
                         </m:r>
@@ -7369,7 +7365,7 @@
                     </m:sSup>
                     <m:r>
                       <a:rPr lang="it-IT" i="1">
-                        <a:latin typeface="Cambria Math" panose="02040503050406030204" pitchFamily="18" charset="0"/>
+                        <a:latin typeface="Cambria Math" charset="0"/>
                       </a:rPr>
                       <m:t>&lt;0 </m:t>
                     </m:r>
@@ -7380,10 +7376,10 @@
             </p:txBody>
           </p:sp>
         </mc:Choice>
-        <mc:Fallback xmlns="">
+        <mc:Fallback>
           <p:sp>
             <p:nvSpPr>
-              <p:cNvPr id="7" name="Segnaposto contenuto 2"/>
+              <p:cNvPr id="10" name="Segnaposto contenuto 2"/>
               <p:cNvSpPr txBox="1">
                 <a:spLocks noRot="1" noChangeAspect="1" noMove="1" noResize="1" noEditPoints="1" noAdjustHandles="1" noChangeArrowheads="1" noChangeShapeType="1" noTextEdit="1"/>
               </p:cNvSpPr>
@@ -7391,16 +7387,16 @@
             </p:nvSpPr>
             <p:spPr>
               <a:xfrm>
-                <a:off x="1097280" y="2671104"/>
-                <a:ext cx="10058400" cy="950232"/>
+                <a:off x="1156527" y="2494790"/>
+                <a:ext cx="5505530" cy="950232"/>
               </a:xfrm>
               <a:prstGeom prst="rect">
                 <a:avLst/>
               </a:prstGeom>
-              <a:blipFill>
+              <a:blipFill rotWithShape="0">
                 <a:blip r:embed="rId2"/>
                 <a:stretch>
-                  <a:fillRect l="-606" t="-6410"/>
+                  <a:fillRect l="-1218" t="-6410" b="-39744"/>
                 </a:stretch>
               </a:blipFill>
             </p:spPr>
@@ -7409,7 +7405,7 @@
               <a:lstStyle/>
               <a:p>
                 <a:r>
-                  <a:rPr lang="it-IT">
+                  <a:rPr lang="en-US">
                     <a:noFill/>
                   </a:rPr>
                   <a:t> </a:t>
@@ -7421,26 +7417,112 @@
       </mc:AlternateContent>
       <p:pic>
         <p:nvPicPr>
-          <p:cNvPr id="8" name="Immagine 7"/>
+          <p:cNvPr id="11" name="Immagine 7"/>
           <p:cNvPicPr/>
           <p:nvPr/>
         </p:nvPicPr>
         <p:blipFill>
-          <a:blip r:embed="rId3"/>
+          <a:blip r:embed="rId3">
+            <a:extLst>
+              <a:ext uri="{28A0092B-C50C-407E-A947-70E740481C1C}">
+                <a14:useLocalDpi xmlns:a14="http://schemas.microsoft.com/office/drawing/2010/main" val="0"/>
+              </a:ext>
+            </a:extLst>
+          </a:blip>
           <a:stretch>
             <a:fillRect/>
           </a:stretch>
         </p:blipFill>
         <p:spPr>
           <a:xfrm>
-            <a:off x="7169150" y="1737360"/>
-            <a:ext cx="5022850" cy="4549775"/>
+            <a:off x="6804561" y="2588822"/>
+            <a:ext cx="5078681" cy="3681350"/>
           </a:xfrm>
           <a:prstGeom prst="rect">
             <a:avLst/>
           </a:prstGeom>
         </p:spPr>
       </p:pic>
+      <p:sp>
+        <p:nvSpPr>
+          <p:cNvPr id="12" name="Rectangle 11"/>
+          <p:cNvSpPr/>
+          <p:nvPr/>
+        </p:nvSpPr>
+        <p:spPr>
+          <a:xfrm>
+            <a:off x="1156527" y="1916020"/>
+            <a:ext cx="9261469" cy="400110"/>
+          </a:xfrm>
+          <a:prstGeom prst="rect">
+            <a:avLst/>
+          </a:prstGeom>
+        </p:spPr>
+        <p:txBody>
+          <a:bodyPr wrap="square">
+            <a:spAutoFit/>
+          </a:bodyPr>
+          <a:lstStyle/>
+          <a:p>
+            <a:r>
+              <a:rPr lang="en-US" sz="2000" dirty="0">
+                <a:latin typeface="Courier" charset="0"/>
+              </a:rPr>
+              <a:t>Simplex(@</a:t>
+            </a:r>
+            <a:r>
+              <a:rPr lang="en-US" sz="2000" dirty="0" err="1">
+                <a:latin typeface="Courier" charset="0"/>
+              </a:rPr>
+              <a:t>cost_function</a:t>
+            </a:r>
+            <a:r>
+              <a:rPr lang="en-US" sz="2000" dirty="0">
+                <a:latin typeface="Courier" charset="0"/>
+              </a:rPr>
+              <a:t>, { }, [-.2 .5 .3], .3, 1e-5, 500);</a:t>
+            </a:r>
+            <a:endParaRPr lang="en-US" sz="2000" dirty="0">
+              <a:effectLst/>
+              <a:latin typeface="Courier" charset="0"/>
+            </a:endParaRPr>
+          </a:p>
+        </p:txBody>
+      </p:sp>
+      <p:sp>
+        <p:nvSpPr>
+          <p:cNvPr id="13" name="TextBox 12"/>
+          <p:cNvSpPr txBox="1"/>
+          <p:nvPr/>
+        </p:nvSpPr>
+        <p:spPr>
+          <a:xfrm>
+            <a:off x="1156527" y="3545722"/>
+            <a:ext cx="1097801" cy="400110"/>
+          </a:xfrm>
+          <a:prstGeom prst="rect">
+            <a:avLst/>
+          </a:prstGeom>
+          <a:noFill/>
+        </p:spPr>
+        <p:txBody>
+          <a:bodyPr wrap="none" rtlCol="0">
+            <a:spAutoFit/>
+          </a:bodyPr>
+          <a:lstStyle/>
+          <a:p>
+            <a:r>
+              <a:rPr lang="en-US" sz="2000" dirty="0" err="1" smtClean="0"/>
+              <a:t>Risultati</a:t>
+            </a:r>
+            <a:r>
+              <a:rPr lang="en-US" sz="2000" dirty="0" smtClean="0"/>
+              <a:t>:</a:t>
+            </a:r>
+            <a:endParaRPr lang="en-US" sz="2000" dirty="0"/>
+          </a:p>
+        </p:txBody>
+      </p:sp>
     </p:spTree>
     <p:extLst>
       <p:ext uri="{BB962C8B-B14F-4D97-AF65-F5344CB8AC3E}">
@@ -7503,59 +7585,14 @@
       </p:sp>
       <p:sp>
         <p:nvSpPr>
-          <p:cNvPr id="3" name="Segnaposto contenuto 2"/>
-          <p:cNvSpPr>
-            <a:spLocks noGrp="1"/>
-          </p:cNvSpPr>
-          <p:nvPr>
-            <p:ph idx="1"/>
-          </p:nvPr>
+          <p:cNvPr id="7" name="Rectangle 6"/>
+          <p:cNvSpPr/>
+          <p:nvPr/>
         </p:nvSpPr>
         <p:spPr>
           <a:xfrm>
-            <a:off x="1097280" y="1988896"/>
-            <a:ext cx="10058400" cy="950232"/>
-          </a:xfrm>
-        </p:spPr>
-        <p:txBody>
-          <a:bodyPr>
-            <a:normAutofit/>
-          </a:bodyPr>
-          <a:lstStyle/>
-          <a:p>
-            <a:r>
-              <a:rPr lang="it-IT" dirty="0"/>
-              <a:t>Simplex(@</a:t>
-            </a:r>
-            <a:r>
-              <a:rPr lang="it-IT" dirty="0" err="1"/>
-              <a:t>cost_function</a:t>
-            </a:r>
-            <a:r>
-              <a:rPr lang="it-IT" dirty="0"/>
-              <a:t>, {</a:t>
-            </a:r>
-            <a:r>
-              <a:rPr lang="it-IT" dirty="0" smtClean="0"/>
-              <a:t>}, [-.3 .4 .4], .</a:t>
-            </a:r>
-            <a:r>
-              <a:rPr lang="it-IT" dirty="0"/>
-              <a:t>3, 1e-5, 500);</a:t>
-            </a:r>
-          </a:p>
-        </p:txBody>
-      </p:sp>
-      <p:sp>
-        <p:nvSpPr>
-          <p:cNvPr id="4" name="Rectangle 3"/>
-          <p:cNvSpPr/>
-          <p:nvPr/>
-        </p:nvSpPr>
-        <p:spPr>
-          <a:xfrm>
-            <a:off x="1097280" y="2858805"/>
-            <a:ext cx="5199018" cy="1754326"/>
+            <a:off x="1097279" y="3238815"/>
+            <a:ext cx="4887884" cy="1938992"/>
           </a:xfrm>
           <a:prstGeom prst="rect">
             <a:avLst/>
@@ -7572,7 +7609,7 @@
               <a:buChar char="•"/>
             </a:pPr>
             <a:r>
-              <a:rPr lang="it-IT" dirty="0"/>
+              <a:rPr lang="it-IT" sz="2000" dirty="0"/>
               <a:t>Valore nell’ultimo vertice = 0</a:t>
             </a:r>
           </a:p>
@@ -7582,7 +7619,7 @@
               <a:buChar char="•"/>
             </a:pPr>
             <a:r>
-              <a:rPr lang="it-IT" dirty="0"/>
+              <a:rPr lang="it-IT" sz="2000" dirty="0"/>
               <a:t>Risultato  = -0.3000    0.4000    0.4000</a:t>
             </a:r>
           </a:p>
@@ -7592,7 +7629,7 @@
               <a:buChar char="•"/>
             </a:pPr>
             <a:r>
-              <a:rPr lang="it-IT" dirty="0"/>
+              <a:rPr lang="it-IT" sz="2000" dirty="0"/>
               <a:t>iterazioni = 35</a:t>
             </a:r>
           </a:p>
@@ -7602,7 +7639,7 @@
               <a:buChar char="•"/>
             </a:pPr>
             <a:r>
-              <a:rPr lang="it-IT" dirty="0"/>
+              <a:rPr lang="it-IT" sz="2000" dirty="0"/>
               <a:t>dimezzamenti = 20</a:t>
             </a:r>
           </a:p>
@@ -7612,7 +7649,7 @@
               <a:buChar char="•"/>
             </a:pPr>
             <a:r>
-              <a:rPr lang="it-IT" dirty="0"/>
+              <a:rPr lang="it-IT" sz="2000" dirty="0"/>
               <a:t>superficie finale = 6.7356e-06</a:t>
             </a:r>
           </a:p>
@@ -7622,7 +7659,7 @@
               <a:buChar char="•"/>
             </a:pPr>
             <a:r>
-              <a:rPr lang="it-IT" dirty="0"/>
+              <a:rPr lang="it-IT" sz="2000" dirty="0"/>
               <a:t>errore = 0     0     0</a:t>
             </a:r>
           </a:p>
@@ -7630,26 +7667,123 @@
       </p:sp>
       <p:pic>
         <p:nvPicPr>
-          <p:cNvPr id="9" name="Immagine 8"/>
+          <p:cNvPr id="8" name="Immagine 8"/>
           <p:cNvPicPr/>
           <p:nvPr/>
         </p:nvPicPr>
-        <p:blipFill>
-          <a:blip r:embed="rId2"/>
-          <a:stretch>
-            <a:fillRect/>
-          </a:stretch>
+        <p:blipFill rotWithShape="1">
+          <a:blip r:embed="rId2">
+            <a:extLst>
+              <a:ext uri="{28A0092B-C50C-407E-A947-70E740481C1C}">
+                <a14:useLocalDpi xmlns:a14="http://schemas.microsoft.com/office/drawing/2010/main" val="0"/>
+              </a:ext>
+            </a:extLst>
+          </a:blip>
+          <a:srcRect l="16081" t="8764" r="15127" b="4562"/>
+          <a:stretch/>
         </p:blipFill>
         <p:spPr>
           <a:xfrm>
-            <a:off x="6788537" y="1737360"/>
-            <a:ext cx="5403463" cy="4592320"/>
+            <a:off x="7274299" y="2660071"/>
+            <a:ext cx="4161637" cy="3431969"/>
           </a:xfrm>
           <a:prstGeom prst="rect">
             <a:avLst/>
           </a:prstGeom>
         </p:spPr>
       </p:pic>
+      <p:sp>
+        <p:nvSpPr>
+          <p:cNvPr id="10" name="Rectangle 9"/>
+          <p:cNvSpPr/>
+          <p:nvPr/>
+        </p:nvSpPr>
+        <p:spPr>
+          <a:xfrm>
+            <a:off x="1097279" y="1887043"/>
+            <a:ext cx="8794865" cy="400110"/>
+          </a:xfrm>
+          <a:prstGeom prst="rect">
+            <a:avLst/>
+          </a:prstGeom>
+        </p:spPr>
+        <p:txBody>
+          <a:bodyPr wrap="square">
+            <a:spAutoFit/>
+          </a:bodyPr>
+          <a:lstStyle/>
+          <a:p>
+            <a:r>
+              <a:rPr lang="en-US" sz="2000" dirty="0">
+                <a:latin typeface="Courier" charset="0"/>
+              </a:rPr>
+              <a:t>Simplex(@</a:t>
+            </a:r>
+            <a:r>
+              <a:rPr lang="en-US" sz="2000" dirty="0" err="1" smtClean="0">
+                <a:latin typeface="Courier" charset="0"/>
+              </a:rPr>
+              <a:t>cost_function</a:t>
+            </a:r>
+            <a:r>
+              <a:rPr lang="en-US" sz="2000" dirty="0" smtClean="0">
+                <a:latin typeface="Courier" charset="0"/>
+              </a:rPr>
+              <a:t>, </a:t>
+            </a:r>
+            <a:r>
+              <a:rPr lang="en-US" sz="2000" dirty="0">
+                <a:latin typeface="Courier" charset="0"/>
+              </a:rPr>
+              <a:t>{}, [-.3 .4 .4], .3, 1e-5, 500</a:t>
+            </a:r>
+            <a:r>
+              <a:rPr lang="en-US" sz="2000" dirty="0" smtClean="0">
+                <a:latin typeface="Courier" charset="0"/>
+              </a:rPr>
+              <a:t>); </a:t>
+            </a:r>
+            <a:endParaRPr lang="en-US" sz="2000" dirty="0">
+              <a:effectLst/>
+              <a:latin typeface="Courier" charset="0"/>
+            </a:endParaRPr>
+          </a:p>
+        </p:txBody>
+      </p:sp>
+      <p:sp>
+        <p:nvSpPr>
+          <p:cNvPr id="11" name="TextBox 10"/>
+          <p:cNvSpPr txBox="1"/>
+          <p:nvPr/>
+        </p:nvSpPr>
+        <p:spPr>
+          <a:xfrm>
+            <a:off x="1097279" y="2893563"/>
+            <a:ext cx="1155509" cy="400110"/>
+          </a:xfrm>
+          <a:prstGeom prst="rect">
+            <a:avLst/>
+          </a:prstGeom>
+          <a:noFill/>
+        </p:spPr>
+        <p:txBody>
+          <a:bodyPr wrap="none" rtlCol="0">
+            <a:spAutoFit/>
+          </a:bodyPr>
+          <a:lstStyle/>
+          <a:p>
+            <a:r>
+              <a:rPr lang="en-US" sz="2000" dirty="0" err="1" smtClean="0"/>
+              <a:t>Risultati</a:t>
+            </a:r>
+            <a:r>
+              <a:rPr lang="en-US" sz="2000" dirty="0" smtClean="0"/>
+              <a:t>: </a:t>
+            </a:r>
+            <a:endParaRPr lang="en-US" sz="2000" dirty="0"/>
+          </a:p>
+        </p:txBody>
+      </p:sp>
     </p:spTree>
     <p:extLst>
       <p:ext uri="{BB962C8B-B14F-4D97-AF65-F5344CB8AC3E}">
@@ -7976,15 +8110,7 @@
                   <a:schemeClr val="tx1"/>
                 </a:solidFill>
               </a:rPr>
-              <a:t>3.2 </a:t>
-            </a:r>
-            <a:r>
-              <a:rPr lang="it-IT" dirty="0" smtClean="0">
-                <a:solidFill>
-                  <a:schemeClr val="tx1"/>
-                </a:solidFill>
-              </a:rPr>
-              <a:t>Parametri iniziali</a:t>
+              <a:t>3.2 Parametri iniziali</a:t>
             </a:r>
           </a:p>
           <a:p>
@@ -8000,11 +8126,6 @@
               </a:rPr>
               <a:t> 3.3 Condizioni di arresto</a:t>
             </a:r>
-            <a:endParaRPr lang="it-IT" dirty="0" smtClean="0">
-              <a:solidFill>
-                <a:schemeClr val="tx1"/>
-              </a:solidFill>
-            </a:endParaRPr>
           </a:p>
           <a:p>
             <a:pPr>
@@ -10056,8 +10177,8 @@
           </a:p>
         </p:txBody>
       </p:sp>
-      <mc:AlternateContent xmlns:mc="http://schemas.openxmlformats.org/markup-compatibility/2006">
-        <mc:Choice xmlns:a14="http://schemas.microsoft.com/office/drawing/2010/main" Requires="a14">
+      <mc:AlternateContent xmlns:mc="http://schemas.openxmlformats.org/markup-compatibility/2006" xmlns:a14="http://schemas.microsoft.com/office/drawing/2010/main">
+        <mc:Choice Requires="a14">
           <p:sp>
             <p:nvSpPr>
               <p:cNvPr id="3" name="Segnaposto contenuto 2"/>
@@ -10113,12 +10234,16 @@
                     <m:sSub>
                       <m:sSubPr>
                         <m:ctrlPr>
-                          <a:rPr lang="it-IT" i="1"/>
+                          <a:rPr lang="it-IT" i="1">
+                            <a:latin typeface="Cambria Math" charset="0"/>
+                          </a:rPr>
                         </m:ctrlPr>
                       </m:sSubPr>
                       <m:e>
                         <m:r>
-                          <a:rPr lang="it-IT" i="1"/>
+                          <a:rPr lang="it-IT" i="1">
+                            <a:latin typeface="Cambria Math" charset="0"/>
+                          </a:rPr>
                           <m:t>𝑉</m:t>
                         </m:r>
                       </m:e>
@@ -10177,7 +10302,7 @@
                       <m:sSubPr>
                         <m:ctrlPr>
                           <a:rPr lang="it-IT" i="1">
-                            <a:latin typeface="Cambria Math" panose="02040503050406030204" pitchFamily="18" charset="0"/>
+                            <a:latin typeface="Cambria Math" charset="0"/>
                           </a:rPr>
                         </m:ctrlPr>
                       </m:sSubPr>
@@ -10236,7 +10361,7 @@
                       <m:sSubPr>
                         <m:ctrlPr>
                           <a:rPr lang="it-IT" i="1">
-                            <a:latin typeface="Cambria Math" panose="02040503050406030204" pitchFamily="18" charset="0"/>
+                            <a:latin typeface="Cambria Math" charset="0"/>
                           </a:rPr>
                         </m:ctrlPr>
                       </m:sSubPr>
@@ -10273,7 +10398,7 @@
                       <m:sSubPr>
                         <m:ctrlPr>
                           <a:rPr lang="it-IT" i="1">
-                            <a:latin typeface="Cambria Math" panose="02040503050406030204" pitchFamily="18" charset="0"/>
+                            <a:latin typeface="Cambria Math" charset="0"/>
                           </a:rPr>
                         </m:ctrlPr>
                       </m:sSubPr>
@@ -10310,7 +10435,7 @@
                       <m:sSubPr>
                         <m:ctrlPr>
                           <a:rPr lang="it-IT" i="1">
-                            <a:latin typeface="Cambria Math" panose="02040503050406030204" pitchFamily="18" charset="0"/>
+                            <a:latin typeface="Cambria Math" charset="0"/>
                           </a:rPr>
                         </m:ctrlPr>
                       </m:sSubPr>
@@ -10366,37 +10491,8 @@
                       <a:schemeClr val="tx1"/>
                     </a:solidFill>
                   </a:rPr>
-                  <a:t> contente le cariche per </a:t>
+                  <a:t> contente le cariche per evitare singolarità</a:t>
                 </a:r>
-                <a:r>
-                  <a:rPr lang="it-IT" dirty="0" smtClean="0">
-                    <a:solidFill>
-                      <a:schemeClr val="tx1"/>
-                    </a:solidFill>
-                  </a:rPr>
-                  <a:t>evitare </a:t>
-                </a:r>
-                <a:r>
-                  <a:rPr lang="it-IT" dirty="0" smtClean="0">
-                    <a:solidFill>
-                      <a:schemeClr val="tx1"/>
-                    </a:solidFill>
-                  </a:rPr>
-                  <a:t>singolarit</a:t>
-                </a:r>
-                <a:r>
-                  <a:rPr lang="it-IT" dirty="0" smtClean="0">
-                    <a:solidFill>
-                      <a:schemeClr val="tx1"/>
-                    </a:solidFill>
-                  </a:rPr>
-                  <a:t>à</a:t>
-                </a:r>
-                <a:endParaRPr lang="it-IT" dirty="0" smtClean="0">
-                  <a:solidFill>
-                    <a:schemeClr val="tx1"/>
-                  </a:solidFill>
-                </a:endParaRPr>
               </a:p>
               <a:p>
                 <a:pPr>
@@ -10409,29 +10505,8 @@
                       <a:schemeClr val="tx1"/>
                     </a:solidFill>
                   </a:rPr>
-                  <a:t> I </a:t>
+                  <a:t> I misuratori rilevano il potenziale totale delle N cariche</a:t>
                 </a:r>
-                <a:r>
-                  <a:rPr lang="it-IT" dirty="0" smtClean="0">
-                    <a:solidFill>
-                      <a:schemeClr val="tx1"/>
-                    </a:solidFill>
-                  </a:rPr>
-                  <a:t>misuratori </a:t>
-                </a:r>
-                <a:r>
-                  <a:rPr lang="it-IT" dirty="0" smtClean="0">
-                    <a:solidFill>
-                      <a:schemeClr val="tx1"/>
-                    </a:solidFill>
-                  </a:rPr>
-                  <a:t>rilevano il potenziale totale delle N cariche</a:t>
-                </a:r>
-                <a:endParaRPr lang="it-IT" dirty="0" smtClean="0">
-                  <a:solidFill>
-                    <a:schemeClr val="tx1"/>
-                  </a:solidFill>
-                </a:endParaRPr>
               </a:p>
               <a:p>
                 <a:pPr>
@@ -10455,7 +10530,7 @@
             </p:txBody>
           </p:sp>
         </mc:Choice>
-        <mc:Fallback>
+        <mc:Fallback xmlns="">
           <p:sp>
             <p:nvSpPr>
               <p:cNvPr id="3" name="Segnaposto contenuto 2"/>
@@ -10553,8 +10628,8 @@
           </a:p>
         </p:txBody>
       </p:sp>
-      <mc:AlternateContent xmlns:mc="http://schemas.openxmlformats.org/markup-compatibility/2006">
-        <mc:Choice xmlns:a14="http://schemas.microsoft.com/office/drawing/2010/main" Requires="a14">
+      <mc:AlternateContent xmlns:mc="http://schemas.openxmlformats.org/markup-compatibility/2006" xmlns:a14="http://schemas.microsoft.com/office/drawing/2010/main">
+        <mc:Choice Requires="a14">
           <p:sp>
             <p:nvSpPr>
               <p:cNvPr id="3" name="Segnaposto contenuto 2"/>
@@ -10620,7 +10695,7 @@
                             <a:solidFill>
                               <a:schemeClr val="tx1"/>
                             </a:solidFill>
-                            <a:latin typeface="Cambria Math" panose="02040503050406030204" pitchFamily="18" charset="0"/>
+                            <a:latin typeface="Cambria Math" charset="0"/>
                           </a:rPr>
                         </m:ctrlPr>
                       </m:fPr>
@@ -10672,7 +10747,7 @@
                             <a:solidFill>
                               <a:schemeClr val="tx1"/>
                             </a:solidFill>
-                            <a:latin typeface="Cambria Math" panose="02040503050406030204" pitchFamily="18" charset="0"/>
+                            <a:latin typeface="Cambria Math" charset="0"/>
                           </a:rPr>
                         </m:ctrlPr>
                       </m:fPr>
@@ -10758,7 +10833,7 @@
                       <m:sSubPr>
                         <m:ctrlPr>
                           <a:rPr lang="it-IT" i="1">
-                            <a:latin typeface="Cambria Math" panose="02040503050406030204" pitchFamily="18" charset="0"/>
+                            <a:latin typeface="Cambria Math" charset="0"/>
                           </a:rPr>
                         </m:ctrlPr>
                       </m:sSubPr>
@@ -10789,7 +10864,7 @@
                       <m:fPr>
                         <m:ctrlPr>
                           <a:rPr lang="it-IT" i="1">
-                            <a:latin typeface="Cambria Math" panose="02040503050406030204" pitchFamily="18" charset="0"/>
+                            <a:latin typeface="Cambria Math" charset="0"/>
                           </a:rPr>
                         </m:ctrlPr>
                       </m:fPr>
@@ -10828,7 +10903,7 @@
                         <m:limLoc m:val="undOvr"/>
                         <m:ctrlPr>
                           <a:rPr lang="it-IT" i="1">
-                            <a:latin typeface="Cambria Math" panose="02040503050406030204" pitchFamily="18" charset="0"/>
+                            <a:latin typeface="Cambria Math" charset="0"/>
                           </a:rPr>
                         </m:ctrlPr>
                       </m:naryPr>
@@ -10859,7 +10934,7 @@
                           <m:fPr>
                             <m:ctrlPr>
                               <a:rPr lang="it-IT" i="1">
-                                <a:latin typeface="Cambria Math" panose="02040503050406030204" pitchFamily="18" charset="0"/>
+                                <a:latin typeface="Cambria Math" charset="0"/>
                               </a:rPr>
                             </m:ctrlPr>
                           </m:fPr>
@@ -10868,7 +10943,7 @@
                               <m:sSubPr>
                                 <m:ctrlPr>
                                   <a:rPr lang="it-IT" i="1">
-                                    <a:latin typeface="Cambria Math" panose="02040503050406030204" pitchFamily="18" charset="0"/>
+                                    <a:latin typeface="Cambria Math" charset="0"/>
                                   </a:rPr>
                                 </m:ctrlPr>
                               </m:sSubPr>
@@ -10902,7 +10977,7 @@
                                 <m:chr m:val="⃗"/>
                                 <m:ctrlPr>
                                   <a:rPr lang="it-IT" b="1" i="1">
-                                    <a:latin typeface="Cambria Math" panose="02040503050406030204" pitchFamily="18" charset="0"/>
+                                    <a:latin typeface="Cambria Math" charset="0"/>
                                   </a:rPr>
                                 </m:ctrlPr>
                               </m:accPr>
@@ -10911,7 +10986,7 @@
                                   <m:sSubPr>
                                     <m:ctrlPr>
                                       <a:rPr lang="it-IT" b="1" i="1">
-                                        <a:latin typeface="Cambria Math" panose="02040503050406030204" pitchFamily="18" charset="0"/>
+                                        <a:latin typeface="Cambria Math" charset="0"/>
                                       </a:rPr>
                                     </m:ctrlPr>
                                   </m:sSubPr>
@@ -10945,7 +11020,7 @@
                                 <m:chr m:val="⃗"/>
                                 <m:ctrlPr>
                                   <a:rPr lang="it-IT" b="1" i="1">
-                                    <a:latin typeface="Cambria Math" panose="02040503050406030204" pitchFamily="18" charset="0"/>
+                                    <a:latin typeface="Cambria Math" charset="0"/>
                                   </a:rPr>
                                 </m:ctrlPr>
                               </m:accPr>
@@ -10979,7 +11054,7 @@
             </p:txBody>
           </p:sp>
         </mc:Choice>
-        <mc:Fallback>
+        <mc:Fallback xmlns="">
           <p:sp>
             <p:nvSpPr>
               <p:cNvPr id="3" name="Segnaposto contenuto 2"/>
@@ -11077,8 +11152,8 @@
           </a:p>
         </p:txBody>
       </p:sp>
-      <mc:AlternateContent xmlns:mc="http://schemas.openxmlformats.org/markup-compatibility/2006">
-        <mc:Choice xmlns:a14="http://schemas.microsoft.com/office/drawing/2010/main" Requires="a14">
+      <mc:AlternateContent xmlns:mc="http://schemas.openxmlformats.org/markup-compatibility/2006" xmlns:a14="http://schemas.microsoft.com/office/drawing/2010/main">
+        <mc:Choice Requires="a14">
           <p:sp>
             <p:nvSpPr>
               <p:cNvPr id="3" name="Segnaposto contenuto 2"/>
@@ -11107,29 +11182,8 @@
                       <a:schemeClr val="tx1"/>
                     </a:solidFill>
                   </a:rPr>
-                  <a:t>Possiamo effettuare </a:t>
+                  <a:t>Possiamo effettuare 2 tipi di normalizzazioni: </a:t>
                 </a:r>
-                <a:r>
-                  <a:rPr lang="it-IT" dirty="0" smtClean="0">
-                    <a:solidFill>
-                      <a:schemeClr val="tx1"/>
-                    </a:solidFill>
-                  </a:rPr>
-                  <a:t>2 </a:t>
-                </a:r>
-                <a:r>
-                  <a:rPr lang="it-IT" dirty="0" smtClean="0">
-                    <a:solidFill>
-                      <a:schemeClr val="tx1"/>
-                    </a:solidFill>
-                  </a:rPr>
-                  <a:t>tipi di normalizzazioni: </a:t>
-                </a:r>
-                <a:endParaRPr lang="it-IT" dirty="0" smtClean="0">
-                  <a:solidFill>
-                    <a:schemeClr val="tx1"/>
-                  </a:solidFill>
-                </a:endParaRPr>
               </a:p>
               <a:p>
                 <a:endParaRPr lang="it-IT" dirty="0" smtClean="0">
@@ -11167,7 +11221,7 @@
                       <m:fPr>
                         <m:ctrlPr>
                           <a:rPr lang="en-US" sz="2400" i="1">
-                            <a:latin typeface="Cambria Math" panose="02040503050406030204" pitchFamily="18" charset="0"/>
+                            <a:latin typeface="Cambria Math" charset="0"/>
                           </a:rPr>
                         </m:ctrlPr>
                       </m:fPr>
@@ -11249,7 +11303,7 @@
             </p:txBody>
           </p:sp>
         </mc:Choice>
-        <mc:Fallback>
+        <mc:Fallback xmlns="">
           <p:sp>
             <p:nvSpPr>
               <p:cNvPr id="3" name="Segnaposto contenuto 2"/>
@@ -11341,18 +11395,14 @@
           <a:p>
             <a:r>
               <a:rPr lang="en-US" dirty="0" smtClean="0"/>
-              <a:t>FUNZIONE </a:t>
-            </a:r>
-            <a:r>
-              <a:rPr lang="en-US" dirty="0" smtClean="0"/>
-              <a:t>OBIETTIVO</a:t>
+              <a:t>FUNZIONE OBIETTIVO</a:t>
             </a:r>
             <a:endParaRPr lang="en-US" dirty="0"/>
           </a:p>
         </p:txBody>
       </p:sp>
-      <mc:AlternateContent xmlns:mc="http://schemas.openxmlformats.org/markup-compatibility/2006">
-        <mc:Choice xmlns:a14="http://schemas.microsoft.com/office/drawing/2010/main" Requires="a14">
+      <mc:AlternateContent xmlns:mc="http://schemas.openxmlformats.org/markup-compatibility/2006" xmlns:a14="http://schemas.microsoft.com/office/drawing/2010/main">
+        <mc:Choice Requires="a14">
           <p:sp>
             <p:nvSpPr>
               <p:cNvPr id="7" name="TextBox 6"/>
@@ -11385,7 +11435,7 @@
                       <m:sSubPr>
                         <m:ctrlPr>
                           <a:rPr lang="it-IT" i="1">
-                            <a:latin typeface="Cambria Math" panose="02040503050406030204" pitchFamily="18" charset="0"/>
+                            <a:latin typeface="Cambria Math" charset="0"/>
                           </a:rPr>
                         </m:ctrlPr>
                       </m:sSubPr>
@@ -11434,7 +11484,7 @@
                       <m:sSubPr>
                         <m:ctrlPr>
                           <a:rPr lang="it-IT" i="1" smtClean="0">
-                            <a:latin typeface="Cambria Math" panose="02040503050406030204" pitchFamily="18" charset="0"/>
+                            <a:latin typeface="Cambria Math" charset="0"/>
                           </a:rPr>
                         </m:ctrlPr>
                       </m:sSubPr>
@@ -11467,7 +11517,7 @@
                       <m:sSubPr>
                         <m:ctrlPr>
                           <a:rPr lang="it-IT" i="1">
-                            <a:latin typeface="Cambria Math" panose="02040503050406030204" pitchFamily="18" charset="0"/>
+                            <a:latin typeface="Cambria Math" charset="0"/>
                           </a:rPr>
                         </m:ctrlPr>
                       </m:sSubPr>
@@ -11516,7 +11566,7 @@
                         <m:sSubPr>
                           <m:ctrlPr>
                             <a:rPr lang="it-IT" i="1">
-                              <a:latin typeface="Cambria Math" panose="02040503050406030204" pitchFamily="18" charset="0"/>
+                              <a:latin typeface="Cambria Math" charset="0"/>
                             </a:rPr>
                           </m:ctrlPr>
                         </m:sSubPr>
@@ -11547,7 +11597,7 @@
                         <m:sSubPr>
                           <m:ctrlPr>
                             <a:rPr lang="it-IT" i="1">
-                              <a:latin typeface="Cambria Math" panose="02040503050406030204" pitchFamily="18" charset="0"/>
+                              <a:latin typeface="Cambria Math" charset="0"/>
                             </a:rPr>
                           </m:ctrlPr>
                         </m:sSubPr>
@@ -11596,7 +11646,7 @@
                         <m:sSubPr>
                           <m:ctrlPr>
                             <a:rPr lang="it-IT" i="1">
-                              <a:latin typeface="Cambria Math" panose="02040503050406030204" pitchFamily="18" charset="0"/>
+                              <a:latin typeface="Cambria Math" charset="0"/>
                             </a:rPr>
                           </m:ctrlPr>
                         </m:sSubPr>
@@ -11627,7 +11677,7 @@
                         <m:fPr>
                           <m:ctrlPr>
                             <a:rPr lang="it-IT" i="1">
-                              <a:latin typeface="Cambria Math" panose="02040503050406030204" pitchFamily="18" charset="0"/>
+                              <a:latin typeface="Cambria Math" charset="0"/>
                             </a:rPr>
                           </m:ctrlPr>
                         </m:fPr>
@@ -11636,7 +11686,7 @@
                             <m:sSubPr>
                               <m:ctrlPr>
                                 <a:rPr lang="it-IT" i="1">
-                                  <a:latin typeface="Cambria Math" panose="02040503050406030204" pitchFamily="18" charset="0"/>
+                                  <a:latin typeface="Cambria Math" charset="0"/>
                                 </a:rPr>
                               </m:ctrlPr>
                             </m:sSubPr>
@@ -11665,7 +11715,7 @@
                               <m:endChr m:val="|"/>
                               <m:ctrlPr>
                                 <a:rPr lang="it-IT" i="1">
-                                  <a:latin typeface="Cambria Math" panose="02040503050406030204" pitchFamily="18" charset="0"/>
+                                  <a:latin typeface="Cambria Math" charset="0"/>
                                 </a:rPr>
                               </m:ctrlPr>
                             </m:dPr>
@@ -11676,7 +11726,7 @@
                                   <m:endChr m:val="|"/>
                                   <m:ctrlPr>
                                     <a:rPr lang="it-IT" i="1">
-                                      <a:latin typeface="Cambria Math" panose="02040503050406030204" pitchFamily="18" charset="0"/>
+                                      <a:latin typeface="Cambria Math" charset="0"/>
                                     </a:rPr>
                                   </m:ctrlPr>
                                 </m:dPr>
@@ -11686,7 +11736,7 @@
                                       <m:chr m:val="⃗"/>
                                       <m:ctrlPr>
                                         <a:rPr lang="it-IT" b="1" i="1">
-                                          <a:latin typeface="Cambria Math" panose="02040503050406030204" pitchFamily="18" charset="0"/>
+                                          <a:latin typeface="Cambria Math" charset="0"/>
                                         </a:rPr>
                                       </m:ctrlPr>
                                     </m:accPr>
@@ -11695,7 +11745,7 @@
                                         <m:sSubPr>
                                           <m:ctrlPr>
                                             <a:rPr lang="it-IT" b="1" i="1">
-                                              <a:latin typeface="Cambria Math" panose="02040503050406030204" pitchFamily="18" charset="0"/>
+                                              <a:latin typeface="Cambria Math" charset="0"/>
                                             </a:rPr>
                                           </m:ctrlPr>
                                         </m:sSubPr>
@@ -11729,7 +11779,7 @@
                                       <m:chr m:val="⃗"/>
                                       <m:ctrlPr>
                                         <a:rPr lang="it-IT" b="1" i="1">
-                                          <a:latin typeface="Cambria Math" panose="02040503050406030204" pitchFamily="18" charset="0"/>
+                                          <a:latin typeface="Cambria Math" charset="0"/>
                                         </a:rPr>
                                       </m:ctrlPr>
                                     </m:accPr>
@@ -11767,7 +11817,7 @@
                       <m:sSubPr>
                         <m:ctrlPr>
                           <a:rPr lang="it-IT" i="1">
-                            <a:latin typeface="Cambria Math" panose="02040503050406030204" pitchFamily="18" charset="0"/>
+                            <a:latin typeface="Cambria Math" charset="0"/>
                           </a:rPr>
                         </m:ctrlPr>
                       </m:sSubPr>
@@ -11792,11 +11842,7 @@
                 </a14:m>
                 <a:r>
                   <a:rPr lang="it-IT" dirty="0" smtClean="0"/>
-                  <a:t> </a:t>
-                </a:r>
-                <a:r>
-                  <a:rPr lang="it-IT" dirty="0" smtClean="0"/>
-                  <a:t>e quello di una generica carica </a:t>
+                  <a:t> e quello di una generica carica </a:t>
                 </a:r>
                 <a:r>
                   <a:rPr lang="it-IT" b="1" dirty="0"/>
@@ -11849,7 +11895,7 @@
                         <m:sSubPr>
                           <m:ctrlPr>
                             <a:rPr lang="it-IT" i="1">
-                              <a:latin typeface="Cambria Math" panose="02040503050406030204" pitchFamily="18" charset="0"/>
+                              <a:latin typeface="Cambria Math" charset="0"/>
                             </a:rPr>
                           </m:ctrlPr>
                         </m:sSubPr>
@@ -11898,7 +11944,7 @@
                         <m:sSupPr>
                           <m:ctrlPr>
                             <a:rPr lang="it-IT" i="1">
-                              <a:latin typeface="Cambria Math" panose="02040503050406030204" pitchFamily="18" charset="0"/>
+                              <a:latin typeface="Cambria Math" charset="0"/>
                             </a:rPr>
                           </m:ctrlPr>
                         </m:sSupPr>
@@ -11929,7 +11975,7 @@
                         <m:sSubPr>
                           <m:ctrlPr>
                             <a:rPr lang="it-IT" i="1">
-                              <a:latin typeface="Cambria Math" panose="02040503050406030204" pitchFamily="18" charset="0"/>
+                              <a:latin typeface="Cambria Math" charset="0"/>
                             </a:rPr>
                           </m:ctrlPr>
                         </m:sSubPr>
@@ -11960,7 +12006,7 @@
                         <m:fPr>
                           <m:ctrlPr>
                             <a:rPr lang="it-IT" i="1">
-                              <a:latin typeface="Cambria Math" panose="02040503050406030204" pitchFamily="18" charset="0"/>
+                              <a:latin typeface="Cambria Math" charset="0"/>
                             </a:rPr>
                           </m:ctrlPr>
                         </m:fPr>
@@ -11969,7 +12015,7 @@
                             <m:sSupPr>
                               <m:ctrlPr>
                                 <a:rPr lang="it-IT" i="1">
-                                  <a:latin typeface="Cambria Math" panose="02040503050406030204" pitchFamily="18" charset="0"/>
+                                  <a:latin typeface="Cambria Math" charset="0"/>
                                 </a:rPr>
                               </m:ctrlPr>
                             </m:sSupPr>
@@ -12004,7 +12050,7 @@
                               <m:endChr m:val="|"/>
                               <m:ctrlPr>
                                 <a:rPr lang="it-IT" i="1">
-                                  <a:latin typeface="Cambria Math" panose="02040503050406030204" pitchFamily="18" charset="0"/>
+                                  <a:latin typeface="Cambria Math" charset="0"/>
                                 </a:rPr>
                               </m:ctrlPr>
                             </m:dPr>
@@ -12015,7 +12061,7 @@
                                   <m:endChr m:val="|"/>
                                   <m:ctrlPr>
                                     <a:rPr lang="it-IT" i="1">
-                                      <a:latin typeface="Cambria Math" panose="02040503050406030204" pitchFamily="18" charset="0"/>
+                                      <a:latin typeface="Cambria Math" charset="0"/>
                                     </a:rPr>
                                   </m:ctrlPr>
                                 </m:dPr>
@@ -12025,7 +12071,7 @@
                                       <m:chr m:val="⃗"/>
                                       <m:ctrlPr>
                                         <a:rPr lang="it-IT" b="1" i="1">
-                                          <a:latin typeface="Cambria Math" panose="02040503050406030204" pitchFamily="18" charset="0"/>
+                                          <a:latin typeface="Cambria Math" charset="0"/>
                                         </a:rPr>
                                       </m:ctrlPr>
                                     </m:accPr>
@@ -12034,7 +12080,7 @@
                                         <m:sSupPr>
                                           <m:ctrlPr>
                                             <a:rPr lang="it-IT" b="1" i="1">
-                                              <a:latin typeface="Cambria Math" panose="02040503050406030204" pitchFamily="18" charset="0"/>
+                                              <a:latin typeface="Cambria Math" charset="0"/>
                                             </a:rPr>
                                           </m:ctrlPr>
                                         </m:sSupPr>
@@ -12068,7 +12114,7 @@
                                       <m:chr m:val="⃗"/>
                                       <m:ctrlPr>
                                         <a:rPr lang="it-IT" b="1" i="1">
-                                          <a:latin typeface="Cambria Math" panose="02040503050406030204" pitchFamily="18" charset="0"/>
+                                          <a:latin typeface="Cambria Math" charset="0"/>
                                         </a:rPr>
                                       </m:ctrlPr>
                                     </m:accPr>
@@ -12101,15 +12147,7 @@
               <a:p>
                 <a:r>
                   <a:rPr lang="it-IT" dirty="0" smtClean="0"/>
-                  <a:t>La funzione </a:t>
-                </a:r>
-                <a:r>
-                  <a:rPr lang="it-IT" dirty="0" smtClean="0"/>
-                  <a:t>obiettivo </a:t>
-                </a:r>
-                <a:r>
-                  <a:rPr lang="it-IT" dirty="0" smtClean="0"/>
-                  <a:t>è somma quadratica delle differenze di potenziale viste da ogni misuratore</a:t>
+                  <a:t>La funzione obiettivo è somma quadratica delle differenze di potenziale viste da ogni misuratore</a:t>
                 </a:r>
                 <a:endParaRPr lang="it-IT" dirty="0"/>
               </a:p>
@@ -12125,7 +12163,7 @@
                         <m:fPr>
                           <m:ctrlPr>
                             <a:rPr lang="it-IT" i="1">
-                              <a:latin typeface="Cambria Math" panose="02040503050406030204" pitchFamily="18" charset="0"/>
+                              <a:latin typeface="Cambria Math" charset="0"/>
                             </a:rPr>
                           </m:ctrlPr>
                         </m:fPr>
@@ -12140,7 +12178,7 @@
                             <m:dPr>
                               <m:ctrlPr>
                                 <a:rPr lang="it-IT" i="1">
-                                  <a:latin typeface="Cambria Math" panose="02040503050406030204" pitchFamily="18" charset="0"/>
+                                  <a:latin typeface="Cambria Math" charset="0"/>
                                 </a:rPr>
                               </m:ctrlPr>
                             </m:dPr>
@@ -12149,7 +12187,7 @@
                                 <m:sSupPr>
                                   <m:ctrlPr>
                                     <a:rPr lang="it-IT" i="1">
-                                      <a:latin typeface="Cambria Math" panose="02040503050406030204" pitchFamily="18" charset="0"/>
+                                      <a:latin typeface="Cambria Math" charset="0"/>
                                     </a:rPr>
                                   </m:ctrlPr>
                                 </m:sSupPr>
@@ -12181,7 +12219,7 @@
                                   <m:chr m:val="⃗"/>
                                   <m:ctrlPr>
                                     <a:rPr lang="it-IT" b="1" i="1">
-                                      <a:latin typeface="Cambria Math" panose="02040503050406030204" pitchFamily="18" charset="0"/>
+                                      <a:latin typeface="Cambria Math" charset="0"/>
                                     </a:rPr>
                                   </m:ctrlPr>
                                 </m:accPr>
@@ -12190,7 +12228,7 @@
                                     <m:sSupPr>
                                       <m:ctrlPr>
                                         <a:rPr lang="it-IT" b="1" i="1">
-                                          <a:latin typeface="Cambria Math" panose="02040503050406030204" pitchFamily="18" charset="0"/>
+                                          <a:latin typeface="Cambria Math" charset="0"/>
                                         </a:rPr>
                                       </m:ctrlPr>
                                     </m:sSupPr>
@@ -12237,7 +12275,7 @@
                           <m:limLoc m:val="undOvr"/>
                           <m:ctrlPr>
                             <a:rPr lang="it-IT" i="1">
-                              <a:latin typeface="Cambria Math" panose="02040503050406030204" pitchFamily="18" charset="0"/>
+                              <a:latin typeface="Cambria Math" charset="0"/>
                             </a:rPr>
                           </m:ctrlPr>
                         </m:naryPr>
@@ -12268,7 +12306,7 @@
                             <m:sSubSupPr>
                               <m:ctrlPr>
                                 <a:rPr lang="it-IT" i="1">
-                                  <a:latin typeface="Cambria Math" panose="02040503050406030204" pitchFamily="18" charset="0"/>
+                                  <a:latin typeface="Cambria Math" charset="0"/>
                                 </a:rPr>
                               </m:ctrlPr>
                             </m:sSubSupPr>
@@ -12279,7 +12317,7 @@
                                   <m:endChr m:val="|"/>
                                   <m:ctrlPr>
                                     <a:rPr lang="it-IT" i="1">
-                                      <a:latin typeface="Cambria Math" panose="02040503050406030204" pitchFamily="18" charset="0"/>
+                                      <a:latin typeface="Cambria Math" charset="0"/>
                                     </a:rPr>
                                   </m:ctrlPr>
                                 </m:dPr>
@@ -12328,7 +12366,7 @@
                                 <m:sSubPr>
                                   <m:ctrlPr>
                                     <a:rPr lang="it-IT" i="1">
-                                      <a:latin typeface="Cambria Math" panose="02040503050406030204" pitchFamily="18" charset="0"/>
+                                      <a:latin typeface="Cambria Math" charset="0"/>
                                     </a:rPr>
                                   </m:ctrlPr>
                                 </m:sSubPr>
@@ -12366,7 +12404,7 @@
                           <m:limLoc m:val="undOvr"/>
                           <m:ctrlPr>
                             <a:rPr lang="it-IT" i="1">
-                              <a:latin typeface="Cambria Math" panose="02040503050406030204" pitchFamily="18" charset="0"/>
+                              <a:latin typeface="Cambria Math" charset="0"/>
                             </a:rPr>
                           </m:ctrlPr>
                         </m:naryPr>
@@ -12397,7 +12435,7 @@
                             <m:sSupPr>
                               <m:ctrlPr>
                                 <a:rPr lang="it-IT" i="1">
-                                  <a:latin typeface="Cambria Math" panose="02040503050406030204" pitchFamily="18" charset="0"/>
+                                  <a:latin typeface="Cambria Math" charset="0"/>
                                 </a:rPr>
                               </m:ctrlPr>
                             </m:sSupPr>
@@ -12406,7 +12444,7 @@
                                 <m:dPr>
                                   <m:ctrlPr>
                                     <a:rPr lang="it-IT" i="1">
-                                      <a:latin typeface="Cambria Math" panose="02040503050406030204" pitchFamily="18" charset="0"/>
+                                      <a:latin typeface="Cambria Math" charset="0"/>
                                     </a:rPr>
                                   </m:ctrlPr>
                                 </m:dPr>
@@ -12415,7 +12453,7 @@
                                     <m:sSubPr>
                                       <m:ctrlPr>
                                         <a:rPr lang="it-IT" i="1">
-                                          <a:latin typeface="Cambria Math" panose="02040503050406030204" pitchFamily="18" charset="0"/>
+                                          <a:latin typeface="Cambria Math" charset="0"/>
                                         </a:rPr>
                                       </m:ctrlPr>
                                     </m:sSubPr>
@@ -12452,7 +12490,7 @@
                                     <m:fPr>
                                       <m:ctrlPr>
                                         <a:rPr lang="it-IT" i="1">
-                                          <a:latin typeface="Cambria Math" panose="02040503050406030204" pitchFamily="18" charset="0"/>
+                                          <a:latin typeface="Cambria Math" charset="0"/>
                                         </a:rPr>
                                       </m:ctrlPr>
                                     </m:fPr>
@@ -12461,7 +12499,7 @@
                                         <m:sSupPr>
                                           <m:ctrlPr>
                                             <a:rPr lang="it-IT" i="1">
-                                              <a:latin typeface="Cambria Math" panose="02040503050406030204" pitchFamily="18" charset="0"/>
+                                              <a:latin typeface="Cambria Math" charset="0"/>
                                             </a:rPr>
                                           </m:ctrlPr>
                                         </m:sSupPr>
@@ -12496,7 +12534,7 @@
                                           <m:endChr m:val="|"/>
                                           <m:ctrlPr>
                                             <a:rPr lang="it-IT" i="1">
-                                              <a:latin typeface="Cambria Math" panose="02040503050406030204" pitchFamily="18" charset="0"/>
+                                              <a:latin typeface="Cambria Math" charset="0"/>
                                             </a:rPr>
                                           </m:ctrlPr>
                                         </m:dPr>
@@ -12507,7 +12545,7 @@
                                               <m:endChr m:val="|"/>
                                               <m:ctrlPr>
                                                 <a:rPr lang="it-IT" i="1">
-                                                  <a:latin typeface="Cambria Math" panose="02040503050406030204" pitchFamily="18" charset="0"/>
+                                                  <a:latin typeface="Cambria Math" charset="0"/>
                                                 </a:rPr>
                                               </m:ctrlPr>
                                             </m:dPr>
@@ -12517,7 +12555,7 @@
                                                   <m:chr m:val="⃗"/>
                                                   <m:ctrlPr>
                                                     <a:rPr lang="it-IT" b="1" i="1">
-                                                      <a:latin typeface="Cambria Math" panose="02040503050406030204" pitchFamily="18" charset="0"/>
+                                                      <a:latin typeface="Cambria Math" charset="0"/>
                                                     </a:rPr>
                                                   </m:ctrlPr>
                                                 </m:accPr>
@@ -12526,7 +12564,7 @@
                                                     <m:sSupPr>
                                                       <m:ctrlPr>
                                                         <a:rPr lang="it-IT" b="1" i="1">
-                                                          <a:latin typeface="Cambria Math" panose="02040503050406030204" pitchFamily="18" charset="0"/>
+                                                          <a:latin typeface="Cambria Math" charset="0"/>
                                                         </a:rPr>
                                                       </m:ctrlPr>
                                                     </m:sSupPr>
@@ -12560,7 +12598,7 @@
                                                   <m:chr m:val="⃗"/>
                                                   <m:ctrlPr>
                                                     <a:rPr lang="it-IT" b="1" i="1">
-                                                      <a:latin typeface="Cambria Math" panose="02040503050406030204" pitchFamily="18" charset="0"/>
+                                                      <a:latin typeface="Cambria Math" charset="0"/>
                                                     </a:rPr>
                                                   </m:ctrlPr>
                                                 </m:accPr>
@@ -12569,7 +12607,7 @@
                                                     <m:sSubPr>
                                                       <m:ctrlPr>
                                                         <a:rPr lang="it-IT" b="1" i="1">
-                                                          <a:latin typeface="Cambria Math" panose="02040503050406030204" pitchFamily="18" charset="0"/>
+                                                          <a:latin typeface="Cambria Math" charset="0"/>
                                                         </a:rPr>
                                                       </m:ctrlPr>
                                                     </m:sSubPr>
@@ -12632,7 +12670,7 @@
             </p:txBody>
           </p:sp>
         </mc:Choice>
-        <mc:Fallback>
+        <mc:Fallback xmlns="">
           <p:sp>
             <p:nvSpPr>
               <p:cNvPr id="7" name="TextBox 6"/>
@@ -12847,15 +12885,7 @@
             </a:r>
             <a:r>
               <a:rPr lang="it-IT" sz="2000" dirty="0" smtClean="0"/>
-              <a:t>ribaltat</a:t>
-            </a:r>
-            <a:r>
-              <a:rPr lang="it-IT" sz="2000" dirty="0" smtClean="0"/>
-              <a:t>o creando un nuovo politopo. In caso di ribaltamenti ripetuti attorno ad un minimo </a:t>
-            </a:r>
-            <a:r>
-              <a:rPr lang="it-IT" sz="2000" dirty="0" smtClean="0"/>
-              <a:t>si </a:t>
+              <a:t>ribaltato creando un nuovo politopo. In caso di ribaltamenti ripetuti attorno ad un minimo si </a:t>
             </a:r>
             <a:r>
               <a:rPr lang="it-IT" sz="2000" dirty="0"/>
@@ -12983,7 +13013,7 @@
           <p:cNvPr id="9" name="Rectangle 8">
             <a:extLst>
               <a:ext uri="{FF2B5EF4-FFF2-40B4-BE49-F238E27FC236}">
-                <a16:creationId xmlns:a16="http://schemas.microsoft.com/office/drawing/2014/main" id="{4E4490D0-3672-446A-AC12-B4830333BDDD}"/>
+                <a16:creationId xmlns:a16="http://schemas.microsoft.com/office/drawing/2014/main" xmlns="" id="{4E4490D0-3672-446A-AC12-B4830333BDDD}"/>
               </a:ext>
             </a:extLst>
           </p:cNvPr>
@@ -13035,7 +13065,7 @@
           <p:cNvPr id="11" name="Rectangle 10">
             <a:extLst>
               <a:ext uri="{FF2B5EF4-FFF2-40B4-BE49-F238E27FC236}">
-                <a16:creationId xmlns:a16="http://schemas.microsoft.com/office/drawing/2014/main" id="{39CB82C2-DF65-4EC1-8280-F201D50F570B}"/>
+                <a16:creationId xmlns:a16="http://schemas.microsoft.com/office/drawing/2014/main" xmlns="" id="{39CB82C2-DF65-4EC1-8280-F201D50F570B}"/>
               </a:ext>
             </a:extLst>
           </p:cNvPr>
@@ -13087,7 +13117,7 @@
           <p:cNvPr id="13" name="Straight Connector 12">
             <a:extLst>
               <a:ext uri="{FF2B5EF4-FFF2-40B4-BE49-F238E27FC236}">
-                <a16:creationId xmlns:a16="http://schemas.microsoft.com/office/drawing/2014/main" id="{7E1D4427-852B-4B37-8E76-0E9F1810BA2A}"/>
+                <a16:creationId xmlns:a16="http://schemas.microsoft.com/office/drawing/2014/main" xmlns="" id="{7E1D4427-852B-4B37-8E76-0E9F1810BA2A}"/>
               </a:ext>
             </a:extLst>
           </p:cNvPr>
@@ -13139,7 +13169,7 @@
           <p:cNvPr id="15" name="Rectangle 14">
             <a:extLst>
               <a:ext uri="{FF2B5EF4-FFF2-40B4-BE49-F238E27FC236}">
-                <a16:creationId xmlns:a16="http://schemas.microsoft.com/office/drawing/2014/main" id="{5A1B47C8-47A0-4A88-8830-6DEA3B5DE392}"/>
+                <a16:creationId xmlns:a16="http://schemas.microsoft.com/office/drawing/2014/main" xmlns="" id="{5A1B47C8-47A0-4A88-8830-6DEA3B5DE392}"/>
               </a:ext>
             </a:extLst>
           </p:cNvPr>
@@ -13228,7 +13258,7 @@
           <p:cNvPr id="17" name="Rectangle 16">
             <a:extLst>
               <a:ext uri="{FF2B5EF4-FFF2-40B4-BE49-F238E27FC236}">
-                <a16:creationId xmlns:a16="http://schemas.microsoft.com/office/drawing/2014/main" id="{984BBFDD-E720-4805-A9C8-129FBBF6DD70}"/>
+                <a16:creationId xmlns:a16="http://schemas.microsoft.com/office/drawing/2014/main" xmlns="" id="{984BBFDD-E720-4805-A9C8-129FBBF6DD70}"/>
               </a:ext>
             </a:extLst>
           </p:cNvPr>
@@ -13280,7 +13310,7 @@
           <p:cNvPr id="19" name="Rectangle 18">
             <a:extLst>
               <a:ext uri="{FF2B5EF4-FFF2-40B4-BE49-F238E27FC236}">
-                <a16:creationId xmlns:a16="http://schemas.microsoft.com/office/drawing/2014/main" id="{5AC4BE46-4A77-42FE-9D15-065CDB2F847C}"/>
+                <a16:creationId xmlns:a16="http://schemas.microsoft.com/office/drawing/2014/main" xmlns="" id="{5AC4BE46-4A77-42FE-9D15-065CDB2F847C}"/>
               </a:ext>
             </a:extLst>
           </p:cNvPr>

</xml_diff>

<commit_message>
Nessuno ha fatto niente
Nessuno ha fatto niente e lo sto scoprendo il giorno prima
</commit_message>
<xml_diff>
--- a/IDENTICAZIONE SISTEMA DI CARICHE PUNTIFORMI DA MISURE DI.pptx
+++ b/IDENTICAZIONE SISTEMA DI CARICHE PUNTIFORMI DA MISURE DI.pptx
@@ -10406,8 +10406,12 @@
               <a:buChar char="•"/>
             </a:pPr>
             <a:r>
+              <a:rPr lang="it-IT" sz="2000" dirty="0"/>
+              <a:t>lato </a:t>
+            </a:r>
+            <a:r>
               <a:rPr lang="it-IT" sz="2000" dirty="0" smtClean="0"/>
-              <a:t>superficie finale = </a:t>
+              <a:t>finale = </a:t>
             </a:r>
             <a:r>
               <a:rPr lang="it-IT" dirty="0" smtClean="0"/>
@@ -11461,7 +11465,11 @@
             </a:pPr>
             <a:r>
               <a:rPr lang="it-IT" sz="2000" dirty="0"/>
-              <a:t>superficie finale = </a:t>
+              <a:t>lato </a:t>
+            </a:r>
+            <a:r>
+              <a:rPr lang="it-IT" sz="2000" dirty="0"/>
+              <a:t>finale = </a:t>
             </a:r>
             <a:r>
               <a:rPr lang="it-IT" sz="2000" dirty="0" smtClean="0"/>
@@ -12511,7 +12519,11 @@
             </a:pPr>
             <a:r>
               <a:rPr lang="it-IT" sz="2000" dirty="0"/>
-              <a:t>superficie finale = 6.7356e-06</a:t>
+              <a:t>lato </a:t>
+            </a:r>
+            <a:r>
+              <a:rPr lang="it-IT" sz="2000" dirty="0"/>
+              <a:t>finale = 6.7356e-06</a:t>
             </a:r>
           </a:p>
           <a:p>
@@ -13166,7 +13178,11 @@
             </a:pPr>
             <a:r>
               <a:rPr lang="it-IT" sz="2000" dirty="0"/>
-              <a:t>superficie finale = </a:t>
+              <a:t>lato </a:t>
+            </a:r>
+            <a:r>
+              <a:rPr lang="it-IT" sz="2000" dirty="0"/>
+              <a:t>finale = </a:t>
             </a:r>
             <a:r>
               <a:rPr lang="it-IT" dirty="0" smtClean="0"/>
@@ -13706,8 +13722,8 @@
           </a:p>
         </p:txBody>
       </p:sp>
-      <mc:AlternateContent xmlns:mc="http://schemas.openxmlformats.org/markup-compatibility/2006" xmlns:a14="http://schemas.microsoft.com/office/drawing/2010/main">
-        <mc:Choice Requires="a14">
+      <mc:AlternateContent xmlns:mc="http://schemas.openxmlformats.org/markup-compatibility/2006">
+        <mc:Choice xmlns:a14="http://schemas.microsoft.com/office/drawing/2010/main" Requires="a14">
           <p:sp>
             <p:nvSpPr>
               <p:cNvPr id="8" name="Rectangle 7"/>
@@ -14008,7 +14024,11 @@
                 </a:pPr>
                 <a:r>
                   <a:rPr lang="it-IT" sz="2000" dirty="0"/>
-                  <a:t>superficie finale = </a:t>
+                  <a:t>lato </a:t>
+                </a:r>
+                <a:r>
+                  <a:rPr lang="it-IT" sz="2000" dirty="0"/>
+                  <a:t>finale = </a:t>
                 </a:r>
                 <a:r>
                   <a:rPr lang="it-IT" dirty="0" smtClean="0"/>
@@ -14065,7 +14085,7 @@
             </p:txBody>
           </p:sp>
         </mc:Choice>
-        <mc:Fallback xmlns="">
+        <mc:Fallback>
           <p:sp>
             <p:nvSpPr>
               <p:cNvPr id="8" name="Rectangle 7"/>
@@ -15420,7 +15440,7 @@
             </a:pPr>
             <a:r>
               <a:rPr lang="it-IT" sz="2000" dirty="0" smtClean="0"/>
-              <a:t>superficie </a:t>
+              <a:t>lato </a:t>
             </a:r>
             <a:r>
               <a:rPr lang="it-IT" sz="2000" dirty="0"/>

</xml_diff>